<commit_message>
Font ontbrak in vorige pdf
</commit_message>
<xml_diff>
--- a/Schwartz Basis Menselijke Waarden.pptx
+++ b/Schwartz Basis Menselijke Waarden.pptx
@@ -1,6 +1,6 @@
 
 <file path=ppt/presentation.xml><?xml version="1.0" encoding="utf-8"?>
-<p:presentation xmlns:a="http://schemas.openxmlformats.org/drawingml/2006/main" xmlns:r="http://schemas.openxmlformats.org/officeDocument/2006/relationships" xmlns:p="http://schemas.openxmlformats.org/presentationml/2006/main" saveSubsetFonts="1" autoCompressPictures="0">
+<p:presentation xmlns:a="http://schemas.openxmlformats.org/drawingml/2006/main" xmlns:r="http://schemas.openxmlformats.org/officeDocument/2006/relationships" xmlns:p="http://schemas.openxmlformats.org/presentationml/2006/main" embedTrueTypeFonts="1" autoCompressPictures="0">
   <p:sldMasterIdLst>
     <p:sldMasterId id="2147483715" r:id="rId1"/>
     <p:sldMasterId id="2147483731" r:id="rId2"/>
@@ -52,6 +52,28 @@
   </p:sldIdLst>
   <p:sldSz cx="7775575" cy="5543550"/>
   <p:notesSz cx="9144000" cy="6858000"/>
+  <p:embeddedFontLst>
+    <p:embeddedFont>
+      <p:font typeface="American Captain" pitchFamily="2" charset="77"/>
+      <p:regular r:id="rId44"/>
+    </p:embeddedFont>
+    <p:embeddedFont>
+      <p:font typeface="Marvel" pitchFamily="2" charset="0"/>
+      <p:regular r:id="rId45"/>
+    </p:embeddedFont>
+    <p:embeddedFont>
+      <p:font typeface="Ubuntu" panose="020B0504030602030204" pitchFamily="34" charset="0"/>
+      <p:regular r:id="rId46"/>
+      <p:bold r:id="rId47"/>
+      <p:italic r:id="rId48"/>
+      <p:boldItalic r:id="rId49"/>
+    </p:embeddedFont>
+    <p:embeddedFont>
+      <p:font typeface="Ubuntu Light" panose="020B0304030602030204" pitchFamily="34" charset="0"/>
+      <p:regular r:id="rId50"/>
+      <p:italic r:id="rId51"/>
+    </p:embeddedFont>
+  </p:embeddedFontLst>
   <p:defaultTextStyle>
     <a:defPPr>
       <a:defRPr lang="en-US"/>

</xml_diff>

<commit_message>
Secties in de PDF en hedonisme verdubbeld. deze valt onder 2 clusters!
</commit_message>
<xml_diff>
--- a/Schwartz Basis Menselijke Waarden.pptx
+++ b/Schwartz Basis Menselijke Waarden.pptx
@@ -8,7 +8,7 @@
     <p:sldMasterId id="2147483755" r:id="rId4"/>
   </p:sldMasterIdLst>
   <p:notesMasterIdLst>
-    <p:notesMasterId r:id="rId43"/>
+    <p:notesMasterId r:id="rId45"/>
   </p:notesMasterIdLst>
   <p:sldIdLst>
     <p:sldId id="256" r:id="rId5"/>
@@ -35,43 +35,45 @@
     <p:sldId id="277" r:id="rId26"/>
     <p:sldId id="278" r:id="rId27"/>
     <p:sldId id="279" r:id="rId28"/>
-    <p:sldId id="280" r:id="rId29"/>
-    <p:sldId id="281" r:id="rId30"/>
-    <p:sldId id="282" r:id="rId31"/>
-    <p:sldId id="283" r:id="rId32"/>
-    <p:sldId id="284" r:id="rId33"/>
-    <p:sldId id="285" r:id="rId34"/>
-    <p:sldId id="286" r:id="rId35"/>
-    <p:sldId id="287" r:id="rId36"/>
-    <p:sldId id="288" r:id="rId37"/>
-    <p:sldId id="289" r:id="rId38"/>
-    <p:sldId id="290" r:id="rId39"/>
-    <p:sldId id="291" r:id="rId40"/>
-    <p:sldId id="292" r:id="rId41"/>
-    <p:sldId id="293" r:id="rId42"/>
+    <p:sldId id="294" r:id="rId29"/>
+    <p:sldId id="295" r:id="rId30"/>
+    <p:sldId id="280" r:id="rId31"/>
+    <p:sldId id="281" r:id="rId32"/>
+    <p:sldId id="282" r:id="rId33"/>
+    <p:sldId id="283" r:id="rId34"/>
+    <p:sldId id="284" r:id="rId35"/>
+    <p:sldId id="285" r:id="rId36"/>
+    <p:sldId id="286" r:id="rId37"/>
+    <p:sldId id="287" r:id="rId38"/>
+    <p:sldId id="288" r:id="rId39"/>
+    <p:sldId id="289" r:id="rId40"/>
+    <p:sldId id="290" r:id="rId41"/>
+    <p:sldId id="291" r:id="rId42"/>
+    <p:sldId id="292" r:id="rId43"/>
+    <p:sldId id="293" r:id="rId44"/>
   </p:sldIdLst>
   <p:sldSz cx="7775575" cy="5543550"/>
   <p:notesSz cx="9144000" cy="6858000"/>
   <p:embeddedFontLst>
     <p:embeddedFont>
       <p:font typeface="American Captain" pitchFamily="2" charset="77"/>
-      <p:regular r:id="rId44"/>
+      <p:regular r:id="rId46"/>
     </p:embeddedFont>
     <p:embeddedFont>
       <p:font typeface="Marvel" pitchFamily="2" charset="0"/>
-      <p:regular r:id="rId45"/>
+      <p:regular r:id="rId47"/>
     </p:embeddedFont>
     <p:embeddedFont>
       <p:font typeface="Ubuntu" panose="020B0504030602030204" pitchFamily="34" charset="0"/>
-      <p:regular r:id="rId46"/>
-      <p:bold r:id="rId47"/>
-      <p:italic r:id="rId48"/>
-      <p:boldItalic r:id="rId49"/>
+      <p:regular r:id="rId48"/>
+      <p:bold r:id="rId49"/>
+      <p:italic r:id="rId50"/>
+      <p:boldItalic r:id="rId51"/>
     </p:embeddedFont>
     <p:embeddedFont>
       <p:font typeface="Ubuntu Light" panose="020B0304030602030204" pitchFamily="34" charset="0"/>
-      <p:regular r:id="rId50"/>
-      <p:italic r:id="rId51"/>
+      <p:regular r:id="rId52"/>
+      <p:italic r:id="rId53"/>
     </p:embeddedFont>
   </p:embeddedFontLst>
   <p:defaultTextStyle>
@@ -170,6 +172,66 @@
     </a:lvl9pPr>
   </p:defaultTextStyle>
   <p:extLst>
+    <p:ext uri="{521415D9-36F7-43E2-AB2F-B90AF26B5E84}">
+      <p14:sectionLst xmlns:p14="http://schemas.microsoft.com/office/powerpoint/2010/main">
+        <p14:section name="Default Section" id="{0BE78EE3-BA28-5341-90E0-B52AAFCFBDF3}">
+          <p14:sldIdLst>
+            <p14:sldId id="256"/>
+            <p14:sldId id="257"/>
+          </p14:sldIdLst>
+        </p14:section>
+        <p14:section name="Waardenclusters" id="{84E789E4-D18B-3542-B6E2-A5288CBED33B}">
+          <p14:sldIdLst>
+            <p14:sldId id="258"/>
+            <p14:sldId id="259"/>
+            <p14:sldId id="260"/>
+            <p14:sldId id="261"/>
+            <p14:sldId id="262"/>
+            <p14:sldId id="263"/>
+            <p14:sldId id="264"/>
+            <p14:sldId id="265"/>
+          </p14:sldIdLst>
+        </p14:section>
+        <p14:section name="Waardencluster beschrijvingen" id="{66A63E44-4BA7-8244-B5C1-67BA513BA0DA}">
+          <p14:sldIdLst>
+            <p14:sldId id="266"/>
+            <p14:sldId id="267"/>
+            <p14:sldId id="268"/>
+            <p14:sldId id="269"/>
+            <p14:sldId id="270"/>
+            <p14:sldId id="271"/>
+            <p14:sldId id="272"/>
+            <p14:sldId id="273"/>
+          </p14:sldIdLst>
+        </p14:section>
+        <p14:section name="De tien basiswaarden (hedonisme is bewust dubbel!)" id="{23647D78-F4A7-F446-9E27-F74700138EF3}">
+          <p14:sldIdLst>
+            <p14:sldId id="274"/>
+            <p14:sldId id="275"/>
+            <p14:sldId id="276"/>
+            <p14:sldId id="277"/>
+            <p14:sldId id="278"/>
+            <p14:sldId id="279"/>
+            <p14:sldId id="294"/>
+            <p14:sldId id="295"/>
+            <p14:sldId id="280"/>
+            <p14:sldId id="281"/>
+            <p14:sldId id="282"/>
+            <p14:sldId id="283"/>
+            <p14:sldId id="284"/>
+            <p14:sldId id="285"/>
+            <p14:sldId id="286"/>
+            <p14:sldId id="287"/>
+            <p14:sldId id="288"/>
+            <p14:sldId id="289"/>
+            <p14:sldId id="290"/>
+            <p14:sldId id="291"/>
+            <p14:sldId id="292"/>
+            <p14:sldId id="293"/>
+          </p14:sldIdLst>
+        </p14:section>
+      </p14:sectionLst>
+    </p:ext>
     <p:ext uri="{EFAFB233-063F-42B5-8137-9DF3F51BA10A}">
       <p15:sldGuideLst xmlns:p15="http://schemas.microsoft.com/office/powerpoint/2012/main"/>
     </p:ext>
@@ -19821,7 +19883,7 @@
           <a:p>
             <a:r>
               <a:rPr lang="en-NL" dirty="0"/>
-              <a:t>Stimulatie</a:t>
+              <a:t>Hedonisme</a:t>
             </a:r>
           </a:p>
         </p:txBody>
@@ -19829,7 +19891,7 @@
     </p:spTree>
     <p:extLst>
       <p:ext uri="{BB962C8B-B14F-4D97-AF65-F5344CB8AC3E}">
-        <p14:creationId xmlns:p14="http://schemas.microsoft.com/office/powerpoint/2010/main" val="1614795807"/>
+        <p14:creationId xmlns:p14="http://schemas.microsoft.com/office/powerpoint/2010/main" val="4060855271"/>
       </p:ext>
     </p:extLst>
   </p:cSld>
@@ -19879,7 +19941,47 @@
           <a:p>
             <a:r>
               <a:rPr lang="en-GB" dirty="0" err="1"/>
-              <a:t>Opwinding</a:t>
+              <a:t>Genot</a:t>
+            </a:r>
+            <a:r>
+              <a:rPr lang="en-GB" dirty="0"/>
+              <a:t> of </a:t>
+            </a:r>
+            <a:r>
+              <a:rPr lang="en-GB" dirty="0" err="1"/>
+              <a:t>sensuele</a:t>
+            </a:r>
+            <a:r>
+              <a:rPr lang="en-GB" dirty="0"/>
+              <a:t> </a:t>
+            </a:r>
+            <a:r>
+              <a:rPr lang="en-GB" dirty="0" err="1"/>
+              <a:t>voldoening</a:t>
+            </a:r>
+            <a:r>
+              <a:rPr lang="en-GB" dirty="0"/>
+              <a:t> </a:t>
+            </a:r>
+            <a:r>
+              <a:rPr lang="en-GB" dirty="0" err="1"/>
+              <a:t>voor</a:t>
+            </a:r>
+            <a:r>
+              <a:rPr lang="en-GB" dirty="0"/>
+              <a:t> </a:t>
+            </a:r>
+            <a:r>
+              <a:rPr lang="en-GB" dirty="0" err="1"/>
+              <a:t>zichzelf</a:t>
+            </a:r>
+            <a:r>
+              <a:rPr lang="en-GB" dirty="0"/>
+              <a:t> (</a:t>
+            </a:r>
+            <a:r>
+              <a:rPr lang="en-GB" dirty="0" err="1"/>
+              <a:t>plezier</a:t>
             </a:r>
             <a:r>
               <a:rPr lang="en-GB" dirty="0"/>
@@ -19887,35 +19989,11 @@
             </a:r>
             <a:r>
               <a:rPr lang="en-GB" dirty="0" err="1"/>
-              <a:t>ontdekken</a:t>
+              <a:t>genieten</a:t>
             </a:r>
             <a:r>
               <a:rPr lang="en-GB" dirty="0"/>
-              <a:t> </a:t>
-            </a:r>
-            <a:r>
-              <a:rPr lang="en-GB" dirty="0" err="1"/>
-              <a:t>en</a:t>
-            </a:r>
-            <a:r>
-              <a:rPr lang="en-GB" dirty="0"/>
-              <a:t> </a:t>
-            </a:r>
-            <a:r>
-              <a:rPr lang="en-GB" dirty="0" err="1"/>
-              <a:t>uitdaging</a:t>
-            </a:r>
-            <a:r>
-              <a:rPr lang="en-GB" dirty="0"/>
-              <a:t> </a:t>
-            </a:r>
-            <a:r>
-              <a:rPr lang="en-GB" dirty="0" err="1"/>
-              <a:t>zien</a:t>
-            </a:r>
-            <a:r>
-              <a:rPr lang="en-GB" dirty="0"/>
-              <a:t> in het </a:t>
+              <a:t> van het </a:t>
             </a:r>
             <a:r>
               <a:rPr lang="en-GB" dirty="0" err="1"/>
@@ -19923,63 +20001,7 @@
             </a:r>
             <a:r>
               <a:rPr lang="en-GB" dirty="0"/>
-              <a:t> (</a:t>
-            </a:r>
-            <a:r>
-              <a:rPr lang="en-GB" dirty="0" err="1"/>
-              <a:t>gedurfd</a:t>
-            </a:r>
-            <a:r>
-              <a:rPr lang="en-GB" dirty="0"/>
-              <a:t> </a:t>
-            </a:r>
-            <a:r>
-              <a:rPr lang="en-GB" dirty="0" err="1"/>
-              <a:t>en</a:t>
-            </a:r>
-            <a:r>
-              <a:rPr lang="en-GB" dirty="0"/>
-              <a:t> </a:t>
-            </a:r>
-            <a:r>
-              <a:rPr lang="en-GB" dirty="0" err="1"/>
-              <a:t>variërend</a:t>
-            </a:r>
-            <a:r>
-              <a:rPr lang="en-GB" dirty="0"/>
-              <a:t> </a:t>
-            </a:r>
-            <a:r>
-              <a:rPr lang="en-GB" dirty="0" err="1"/>
-              <a:t>leven</a:t>
-            </a:r>
-            <a:r>
-              <a:rPr lang="en-GB" dirty="0"/>
-              <a:t>, </a:t>
-            </a:r>
-            <a:r>
-              <a:rPr lang="en-GB" dirty="0" err="1"/>
-              <a:t>een</a:t>
-            </a:r>
-            <a:r>
-              <a:rPr lang="en-GB" dirty="0"/>
-              <a:t> </a:t>
-            </a:r>
-            <a:r>
-              <a:rPr lang="en-GB" dirty="0" err="1"/>
-              <a:t>opwindend</a:t>
-            </a:r>
-            <a:r>
-              <a:rPr lang="en-GB" dirty="0"/>
-              <a:t> </a:t>
-            </a:r>
-            <a:r>
-              <a:rPr lang="en-GB" dirty="0" err="1"/>
-              <a:t>leven</a:t>
-            </a:r>
-            <a:r>
-              <a:rPr lang="en-GB" dirty="0"/>
-              <a:t>). </a:t>
+              <a:t>) </a:t>
             </a:r>
             <a:endParaRPr lang="en-NL" dirty="0"/>
           </a:p>
@@ -19988,7 +20010,7 @@
     </p:spTree>
     <p:extLst>
       <p:ext uri="{BB962C8B-B14F-4D97-AF65-F5344CB8AC3E}">
-        <p14:creationId xmlns:p14="http://schemas.microsoft.com/office/powerpoint/2010/main" val="606745599"/>
+        <p14:creationId xmlns:p14="http://schemas.microsoft.com/office/powerpoint/2010/main" val="1110464759"/>
       </p:ext>
     </p:extLst>
   </p:cSld>
@@ -20037,8 +20059,8 @@
           <a:lstStyle/>
           <a:p>
             <a:r>
-              <a:rPr lang="en-NL" sz="9700" dirty="0"/>
-              <a:t>Zelfsturing</a:t>
+              <a:rPr lang="en-NL" dirty="0"/>
+              <a:t>Stimulatie</a:t>
             </a:r>
           </a:p>
         </p:txBody>
@@ -20046,7 +20068,7 @@
     </p:spTree>
     <p:extLst>
       <p:ext uri="{BB962C8B-B14F-4D97-AF65-F5344CB8AC3E}">
-        <p14:creationId xmlns:p14="http://schemas.microsoft.com/office/powerpoint/2010/main" val="1121888239"/>
+        <p14:creationId xmlns:p14="http://schemas.microsoft.com/office/powerpoint/2010/main" val="1614795807"/>
       </p:ext>
     </p:extLst>
   </p:cSld>
@@ -20096,7 +20118,15 @@
           <a:p>
             <a:r>
               <a:rPr lang="en-GB" dirty="0" err="1"/>
-              <a:t>Onafhankelijke</a:t>
+              <a:t>Opwinding</a:t>
+            </a:r>
+            <a:r>
+              <a:rPr lang="en-GB" dirty="0"/>
+              <a:t>, </a:t>
+            </a:r>
+            <a:r>
+              <a:rPr lang="en-GB" dirty="0" err="1"/>
+              <a:t>ontdekken</a:t>
             </a:r>
             <a:r>
               <a:rPr lang="en-GB" dirty="0"/>
@@ -20104,7 +20134,7 @@
             </a:r>
             <a:r>
               <a:rPr lang="en-GB" dirty="0" err="1"/>
-              <a:t>gedachten</a:t>
+              <a:t>en</a:t>
             </a:r>
             <a:r>
               <a:rPr lang="en-GB" dirty="0"/>
@@ -20112,7 +20142,7 @@
             </a:r>
             <a:r>
               <a:rPr lang="en-GB" dirty="0" err="1"/>
-              <a:t>en</a:t>
+              <a:t>uitdaging</a:t>
             </a:r>
             <a:r>
               <a:rPr lang="en-GB" dirty="0"/>
@@ -20120,15 +20150,23 @@
             </a:r>
             <a:r>
               <a:rPr lang="en-GB" dirty="0" err="1"/>
-              <a:t>acties</a:t>
+              <a:t>zien</a:t>
             </a:r>
             <a:r>
               <a:rPr lang="en-GB" dirty="0"/>
-              <a:t>; </a:t>
+              <a:t> in het </a:t>
             </a:r>
             <a:r>
               <a:rPr lang="en-GB" dirty="0" err="1"/>
-              <a:t>zelf</a:t>
+              <a:t>leven</a:t>
+            </a:r>
+            <a:r>
+              <a:rPr lang="en-GB" dirty="0"/>
+              <a:t> (</a:t>
+            </a:r>
+            <a:r>
+              <a:rPr lang="en-GB" dirty="0" err="1"/>
+              <a:t>gedurfd</a:t>
             </a:r>
             <a:r>
               <a:rPr lang="en-GB" dirty="0"/>
@@ -20136,7 +20174,23 @@
             </a:r>
             <a:r>
               <a:rPr lang="en-GB" dirty="0" err="1"/>
-              <a:t>kiezen</a:t>
+              <a:t>en</a:t>
+            </a:r>
+            <a:r>
+              <a:rPr lang="en-GB" dirty="0"/>
+              <a:t> </a:t>
+            </a:r>
+            <a:r>
+              <a:rPr lang="en-GB" dirty="0" err="1"/>
+              <a:t>variërend</a:t>
+            </a:r>
+            <a:r>
+              <a:rPr lang="en-GB" dirty="0"/>
+              <a:t> </a:t>
+            </a:r>
+            <a:r>
+              <a:rPr lang="en-GB" dirty="0" err="1"/>
+              <a:t>leven</a:t>
             </a:r>
             <a:r>
               <a:rPr lang="en-GB" dirty="0"/>
@@ -20144,59 +20198,27 @@
             </a:r>
             <a:r>
               <a:rPr lang="en-GB" dirty="0" err="1"/>
-              <a:t>creëren</a:t>
+              <a:t>een</a:t>
             </a:r>
             <a:r>
               <a:rPr lang="en-GB" dirty="0"/>
-              <a:t>, </a:t>
+              <a:t> </a:t>
             </a:r>
             <a:r>
               <a:rPr lang="en-GB" dirty="0" err="1"/>
-              <a:t>ontdekken</a:t>
+              <a:t>opwindend</a:t>
             </a:r>
             <a:r>
               <a:rPr lang="en-GB" dirty="0"/>
-              <a:t> (</a:t>
+              <a:t> </a:t>
             </a:r>
             <a:r>
               <a:rPr lang="en-GB" dirty="0" err="1"/>
-              <a:t>creativiteit</a:t>
+              <a:t>leven</a:t>
             </a:r>
             <a:r>
               <a:rPr lang="en-GB" dirty="0"/>
-              <a:t>, </a:t>
-            </a:r>
-            <a:r>
-              <a:rPr lang="en-GB" dirty="0" err="1"/>
-              <a:t>vrijheid</a:t>
-            </a:r>
-            <a:r>
-              <a:rPr lang="en-GB" dirty="0"/>
-              <a:t>, </a:t>
-            </a:r>
-            <a:r>
-              <a:rPr lang="en-GB" dirty="0" err="1"/>
-              <a:t>onafhankelijk-heid</a:t>
-            </a:r>
-            <a:r>
-              <a:rPr lang="en-GB" dirty="0"/>
-              <a:t>, </a:t>
-            </a:r>
-            <a:r>
-              <a:rPr lang="en-GB" dirty="0" err="1"/>
-              <a:t>mogelijkheden</a:t>
-            </a:r>
-            <a:r>
-              <a:rPr lang="en-GB" dirty="0"/>
-              <a:t>, </a:t>
-            </a:r>
-            <a:r>
-              <a:rPr lang="en-GB" dirty="0" err="1"/>
-              <a:t>wijsheid</a:t>
-            </a:r>
-            <a:r>
-              <a:rPr lang="en-GB" dirty="0"/>
-              <a:t>).</a:t>
+              <a:t>). </a:t>
             </a:r>
             <a:endParaRPr lang="en-NL" dirty="0"/>
           </a:p>
@@ -20205,7 +20227,7 @@
     </p:spTree>
     <p:extLst>
       <p:ext uri="{BB962C8B-B14F-4D97-AF65-F5344CB8AC3E}">
-        <p14:creationId xmlns:p14="http://schemas.microsoft.com/office/powerpoint/2010/main" val="2711087666"/>
+        <p14:creationId xmlns:p14="http://schemas.microsoft.com/office/powerpoint/2010/main" val="606745599"/>
       </p:ext>
     </p:extLst>
   </p:cSld>
@@ -20255,7 +20277,7 @@
           <a:p>
             <a:r>
               <a:rPr lang="en-NL" sz="9700" dirty="0"/>
-              <a:t>Conformiteit</a:t>
+              <a:t>Zelfsturing</a:t>
             </a:r>
           </a:p>
         </p:txBody>
@@ -20263,7 +20285,7 @@
     </p:spTree>
     <p:extLst>
       <p:ext uri="{BB962C8B-B14F-4D97-AF65-F5344CB8AC3E}">
-        <p14:creationId xmlns:p14="http://schemas.microsoft.com/office/powerpoint/2010/main" val="2375419149"/>
+        <p14:creationId xmlns:p14="http://schemas.microsoft.com/office/powerpoint/2010/main" val="1121888239"/>
       </p:ext>
     </p:extLst>
   </p:cSld>
@@ -20376,231 +20398,117 @@
           <a:lstStyle/>
           <a:p>
             <a:r>
-              <a:rPr lang="en-GB" sz="3200" dirty="0" err="1"/>
-              <a:t>Afzien</a:t>
-            </a:r>
-            <a:r>
-              <a:rPr lang="en-GB" sz="3200" dirty="0"/>
-              <a:t> van </a:t>
-            </a:r>
-            <a:r>
-              <a:rPr lang="en-GB" sz="3200" dirty="0" err="1"/>
+              <a:rPr lang="en-GB" dirty="0" err="1"/>
+              <a:t>Onafhankelijke</a:t>
+            </a:r>
+            <a:r>
+              <a:rPr lang="en-GB" dirty="0"/>
+              <a:t> </a:t>
+            </a:r>
+            <a:r>
+              <a:rPr lang="en-GB" dirty="0" err="1"/>
+              <a:t>gedachten</a:t>
+            </a:r>
+            <a:r>
+              <a:rPr lang="en-GB" dirty="0"/>
+              <a:t> </a:t>
+            </a:r>
+            <a:r>
+              <a:rPr lang="en-GB" dirty="0" err="1"/>
+              <a:t>en</a:t>
+            </a:r>
+            <a:r>
+              <a:rPr lang="en-GB" dirty="0"/>
+              <a:t> </a:t>
+            </a:r>
+            <a:r>
+              <a:rPr lang="en-GB" dirty="0" err="1"/>
               <a:t>acties</a:t>
             </a:r>
             <a:r>
-              <a:rPr lang="en-GB" sz="3200" dirty="0"/>
+              <a:rPr lang="en-GB" dirty="0"/>
+              <a:t>; </a:t>
+            </a:r>
+            <a:r>
+              <a:rPr lang="en-GB" dirty="0" err="1"/>
+              <a:t>zelf</a:t>
+            </a:r>
+            <a:r>
+              <a:rPr lang="en-GB" dirty="0"/>
+              <a:t> </a:t>
+            </a:r>
+            <a:r>
+              <a:rPr lang="en-GB" dirty="0" err="1"/>
+              <a:t>kiezen</a:t>
+            </a:r>
+            <a:r>
+              <a:rPr lang="en-GB" dirty="0"/>
               <a:t>, </a:t>
             </a:r>
-          </a:p>
-          <a:p>
-            <a:r>
-              <a:rPr lang="en-GB" sz="3200" dirty="0" err="1"/>
-              <a:t>neigingen</a:t>
-            </a:r>
-            <a:r>
-              <a:rPr lang="en-GB" sz="3200" dirty="0"/>
+            <a:r>
+              <a:rPr lang="en-GB" dirty="0" err="1"/>
+              <a:t>creëren</a:t>
+            </a:r>
+            <a:r>
+              <a:rPr lang="en-GB" dirty="0"/>
               <a:t>, </a:t>
             </a:r>
             <a:r>
-              <a:rPr lang="en-GB" sz="3200" dirty="0" err="1"/>
-              <a:t>en</a:t>
-            </a:r>
-            <a:r>
-              <a:rPr lang="en-GB" sz="3200" dirty="0"/>
-              <a:t> </a:t>
-            </a:r>
-            <a:r>
-              <a:rPr lang="en-GB" sz="3200" dirty="0" err="1"/>
-              <a:t>impulsen</a:t>
-            </a:r>
-            <a:r>
-              <a:rPr lang="en-GB" sz="3200" dirty="0"/>
-              <a:t> </a:t>
-            </a:r>
-            <a:r>
-              <a:rPr lang="en-GB" sz="3200" dirty="0" err="1"/>
-              <a:t>waar</a:t>
-            </a:r>
-            <a:r>
-              <a:rPr lang="en-GB" sz="3200" dirty="0"/>
-              <a:t> </a:t>
-            </a:r>
-            <a:r>
-              <a:rPr lang="en-GB" sz="3200" dirty="0" err="1"/>
-              <a:t>mensen</a:t>
-            </a:r>
-            <a:r>
-              <a:rPr lang="en-GB" sz="3200" dirty="0"/>
-              <a:t> </a:t>
-            </a:r>
-            <a:r>
-              <a:rPr lang="en-GB" sz="3200" dirty="0" err="1"/>
-              <a:t>waarschijnlijk</a:t>
-            </a:r>
-            <a:r>
-              <a:rPr lang="en-GB" sz="3200" dirty="0"/>
-              <a:t> </a:t>
-            </a:r>
-            <a:r>
-              <a:rPr lang="en-GB" sz="3200" dirty="0" err="1"/>
-              <a:t>overstuur</a:t>
-            </a:r>
-            <a:r>
-              <a:rPr lang="en-GB" sz="3200" dirty="0"/>
-              <a:t> van </a:t>
-            </a:r>
-            <a:r>
-              <a:rPr lang="en-GB" sz="3200" dirty="0" err="1"/>
-              <a:t>raken</a:t>
-            </a:r>
-            <a:r>
-              <a:rPr lang="en-GB" sz="3200" dirty="0"/>
-              <a:t> of </a:t>
-            </a:r>
-            <a:r>
-              <a:rPr lang="en-GB" sz="3200" dirty="0" err="1"/>
-              <a:t>schade</a:t>
-            </a:r>
-            <a:r>
-              <a:rPr lang="en-GB" sz="3200" dirty="0"/>
-              <a:t> toe </a:t>
-            </a:r>
-            <a:r>
-              <a:rPr lang="en-GB" sz="3200" dirty="0" err="1"/>
-              <a:t>kunnen</a:t>
-            </a:r>
-            <a:r>
-              <a:rPr lang="en-GB" sz="3200" dirty="0"/>
-              <a:t> </a:t>
-            </a:r>
-            <a:r>
-              <a:rPr lang="en-GB" sz="3200" dirty="0" err="1"/>
-              <a:t>brengen</a:t>
-            </a:r>
-            <a:r>
-              <a:rPr lang="en-GB" sz="3200" dirty="0"/>
-              <a:t> </a:t>
-            </a:r>
-            <a:r>
-              <a:rPr lang="en-GB" sz="3200" dirty="0" err="1"/>
-              <a:t>aan</a:t>
-            </a:r>
-            <a:r>
-              <a:rPr lang="en-GB" sz="3200" dirty="0"/>
-              <a:t> </a:t>
-            </a:r>
-            <a:r>
-              <a:rPr lang="en-GB" sz="3200" dirty="0" err="1"/>
-              <a:t>anderen</a:t>
-            </a:r>
-            <a:r>
-              <a:rPr lang="en-GB" sz="3200" dirty="0"/>
-              <a:t> </a:t>
-            </a:r>
-            <a:r>
-              <a:rPr lang="en-GB" sz="3200" dirty="0" err="1"/>
-              <a:t>en</a:t>
-            </a:r>
-            <a:r>
-              <a:rPr lang="en-GB" sz="3200" dirty="0"/>
-              <a:t> die de </a:t>
-            </a:r>
-            <a:r>
-              <a:rPr lang="en-GB" sz="3200" dirty="0" err="1"/>
-              <a:t>sociale</a:t>
-            </a:r>
-            <a:r>
-              <a:rPr lang="en-GB" sz="3200" dirty="0"/>
-              <a:t> norm </a:t>
-            </a:r>
-            <a:r>
-              <a:rPr lang="en-GB" sz="3200" dirty="0" err="1"/>
-              <a:t>en</a:t>
-            </a:r>
-            <a:r>
-              <a:rPr lang="en-GB" sz="3200" dirty="0"/>
-              <a:t> </a:t>
-            </a:r>
-            <a:r>
-              <a:rPr lang="en-GB" sz="3200" dirty="0" err="1"/>
-              <a:t>verwachtingen</a:t>
-            </a:r>
-            <a:r>
-              <a:rPr lang="en-GB" sz="3200" dirty="0"/>
-              <a:t> </a:t>
-            </a:r>
-            <a:r>
-              <a:rPr lang="en-GB" sz="3200" dirty="0" err="1"/>
-              <a:t>overtreden</a:t>
-            </a:r>
-            <a:r>
-              <a:rPr lang="en-GB" sz="3200" dirty="0"/>
+              <a:rPr lang="en-GB" dirty="0" err="1"/>
+              <a:t>ontdekken</a:t>
+            </a:r>
+            <a:r>
+              <a:rPr lang="en-GB" dirty="0"/>
               <a:t> (</a:t>
             </a:r>
             <a:r>
-              <a:rPr lang="en-GB" sz="3200" dirty="0" err="1"/>
-              <a:t>zelfdiscipline</a:t>
-            </a:r>
-            <a:r>
-              <a:rPr lang="en-GB" sz="3200" dirty="0"/>
+              <a:rPr lang="en-GB" dirty="0" err="1"/>
+              <a:t>creativiteit</a:t>
+            </a:r>
+            <a:r>
+              <a:rPr lang="en-GB" dirty="0"/>
               <a:t>, </a:t>
             </a:r>
             <a:r>
-              <a:rPr lang="en-GB" sz="3200" dirty="0" err="1"/>
-              <a:t>netjes</a:t>
-            </a:r>
-            <a:r>
-              <a:rPr lang="en-GB" sz="3200" dirty="0"/>
-              <a:t>, het </a:t>
-            </a:r>
-            <a:r>
-              <a:rPr lang="en-GB" sz="3200" dirty="0" err="1"/>
-              <a:t>eren</a:t>
-            </a:r>
-            <a:r>
-              <a:rPr lang="en-GB" sz="3200" dirty="0"/>
-              <a:t> van de </a:t>
-            </a:r>
-            <a:r>
-              <a:rPr lang="en-GB" sz="3200" dirty="0" err="1"/>
-              <a:t>ouders</a:t>
-            </a:r>
-            <a:r>
-              <a:rPr lang="en-GB" sz="3200" dirty="0"/>
-              <a:t> </a:t>
-            </a:r>
-            <a:r>
-              <a:rPr lang="en-GB" sz="3200" dirty="0" err="1"/>
-              <a:t>en</a:t>
-            </a:r>
-            <a:r>
-              <a:rPr lang="en-GB" sz="3200" dirty="0"/>
-              <a:t> </a:t>
-            </a:r>
-            <a:r>
-              <a:rPr lang="en-GB" sz="3200" dirty="0" err="1"/>
-              <a:t>ouderen</a:t>
-            </a:r>
-            <a:r>
-              <a:rPr lang="en-GB" sz="3200" dirty="0"/>
+              <a:rPr lang="en-GB" dirty="0" err="1"/>
+              <a:t>vrijheid</a:t>
+            </a:r>
+            <a:r>
+              <a:rPr lang="en-GB" dirty="0"/>
               <a:t>, </a:t>
             </a:r>
             <a:r>
-              <a:rPr lang="en-GB" sz="3200" dirty="0" err="1"/>
-              <a:t>gehoorzaamheid</a:t>
-            </a:r>
-            <a:r>
-              <a:rPr lang="en-GB" sz="3200" dirty="0"/>
+              <a:rPr lang="en-GB" dirty="0" err="1"/>
+              <a:t>onafhankelijk-heid</a:t>
+            </a:r>
+            <a:r>
+              <a:rPr lang="en-GB" dirty="0"/>
+              <a:t>, </a:t>
+            </a:r>
+            <a:r>
+              <a:rPr lang="en-GB" dirty="0" err="1"/>
+              <a:t>mogelijkheden</a:t>
+            </a:r>
+            <a:r>
+              <a:rPr lang="en-GB" dirty="0"/>
+              <a:t>, </a:t>
+            </a:r>
+            <a:r>
+              <a:rPr lang="en-GB" dirty="0" err="1"/>
+              <a:t>wijsheid</a:t>
+            </a:r>
+            <a:r>
+              <a:rPr lang="en-GB" dirty="0"/>
               <a:t>).</a:t>
             </a:r>
-            <a:endParaRPr lang="en-NL" sz="3200" dirty="0"/>
+            <a:endParaRPr lang="en-NL" dirty="0"/>
           </a:p>
         </p:txBody>
       </p:sp>
     </p:spTree>
     <p:extLst>
       <p:ext uri="{BB962C8B-B14F-4D97-AF65-F5344CB8AC3E}">
-        <p14:creationId xmlns:p14="http://schemas.microsoft.com/office/powerpoint/2010/main" val="1641957288"/>
+        <p14:creationId xmlns:p14="http://schemas.microsoft.com/office/powerpoint/2010/main" val="2711087666"/>
       </p:ext>
     </p:extLst>
   </p:cSld>
@@ -20649,8 +20557,8 @@
           <a:lstStyle/>
           <a:p>
             <a:r>
-              <a:rPr lang="en-NL" sz="8000" dirty="0"/>
-              <a:t>Welwillendheid</a:t>
+              <a:rPr lang="en-NL" sz="9700" dirty="0"/>
+              <a:t>Conformiteit</a:t>
             </a:r>
           </a:p>
         </p:txBody>
@@ -20658,7 +20566,7 @@
     </p:spTree>
     <p:extLst>
       <p:ext uri="{BB962C8B-B14F-4D97-AF65-F5344CB8AC3E}">
-        <p14:creationId xmlns:p14="http://schemas.microsoft.com/office/powerpoint/2010/main" val="3244602468"/>
+        <p14:creationId xmlns:p14="http://schemas.microsoft.com/office/powerpoint/2010/main" val="2375419149"/>
       </p:ext>
     </p:extLst>
   </p:cSld>
@@ -20707,129 +20615,231 @@
           <a:lstStyle/>
           <a:p>
             <a:r>
-              <a:rPr lang="en-GB" sz="4000" dirty="0"/>
-              <a:t>Het </a:t>
-            </a:r>
-            <a:r>
-              <a:rPr lang="en-GB" sz="4000" dirty="0" err="1"/>
-              <a:t>behouden</a:t>
-            </a:r>
-            <a:r>
-              <a:rPr lang="en-GB" sz="4000" dirty="0"/>
+              <a:rPr lang="en-GB" sz="3200" dirty="0" err="1"/>
+              <a:t>Afzien</a:t>
+            </a:r>
+            <a:r>
+              <a:rPr lang="en-GB" sz="3200" dirty="0"/>
+              <a:t> van </a:t>
+            </a:r>
+            <a:r>
+              <a:rPr lang="en-GB" sz="3200" dirty="0" err="1"/>
+              <a:t>acties</a:t>
+            </a:r>
+            <a:r>
+              <a:rPr lang="en-GB" sz="3200" dirty="0"/>
+              <a:t>, </a:t>
+            </a:r>
+          </a:p>
+          <a:p>
+            <a:r>
+              <a:rPr lang="en-GB" sz="3200" dirty="0" err="1"/>
+              <a:t>neigingen</a:t>
+            </a:r>
+            <a:r>
+              <a:rPr lang="en-GB" sz="3200" dirty="0"/>
+              <a:t>, </a:t>
+            </a:r>
+            <a:r>
+              <a:rPr lang="en-GB" sz="3200" dirty="0" err="1"/>
+              <a:t>en</a:t>
+            </a:r>
+            <a:r>
+              <a:rPr lang="en-GB" sz="3200" dirty="0"/>
               <a:t> </a:t>
             </a:r>
             <a:r>
-              <a:rPr lang="en-GB" sz="4000" dirty="0" err="1"/>
+              <a:rPr lang="en-GB" sz="3200" dirty="0" err="1"/>
+              <a:t>impulsen</a:t>
+            </a:r>
+            <a:r>
+              <a:rPr lang="en-GB" sz="3200" dirty="0"/>
+              <a:t> </a:t>
+            </a:r>
+            <a:r>
+              <a:rPr lang="en-GB" sz="3200" dirty="0" err="1"/>
+              <a:t>waar</a:t>
+            </a:r>
+            <a:r>
+              <a:rPr lang="en-GB" sz="3200" dirty="0"/>
+              <a:t> </a:t>
+            </a:r>
+            <a:r>
+              <a:rPr lang="en-GB" sz="3200" dirty="0" err="1"/>
+              <a:t>mensen</a:t>
+            </a:r>
+            <a:r>
+              <a:rPr lang="en-GB" sz="3200" dirty="0"/>
+              <a:t> </a:t>
+            </a:r>
+            <a:r>
+              <a:rPr lang="en-GB" sz="3200" dirty="0" err="1"/>
+              <a:t>waarschijnlijk</a:t>
+            </a:r>
+            <a:r>
+              <a:rPr lang="en-GB" sz="3200" dirty="0"/>
+              <a:t> </a:t>
+            </a:r>
+            <a:r>
+              <a:rPr lang="en-GB" sz="3200" dirty="0" err="1"/>
+              <a:t>overstuur</a:t>
+            </a:r>
+            <a:r>
+              <a:rPr lang="en-GB" sz="3200" dirty="0"/>
+              <a:t> van </a:t>
+            </a:r>
+            <a:r>
+              <a:rPr lang="en-GB" sz="3200" dirty="0" err="1"/>
+              <a:t>raken</a:t>
+            </a:r>
+            <a:r>
+              <a:rPr lang="en-GB" sz="3200" dirty="0"/>
+              <a:t> of </a:t>
+            </a:r>
+            <a:r>
+              <a:rPr lang="en-GB" sz="3200" dirty="0" err="1"/>
+              <a:t>schade</a:t>
+            </a:r>
+            <a:r>
+              <a:rPr lang="en-GB" sz="3200" dirty="0"/>
+              <a:t> toe </a:t>
+            </a:r>
+            <a:r>
+              <a:rPr lang="en-GB" sz="3200" dirty="0" err="1"/>
+              <a:t>kunnen</a:t>
+            </a:r>
+            <a:r>
+              <a:rPr lang="en-GB" sz="3200" dirty="0"/>
+              <a:t> </a:t>
+            </a:r>
+            <a:r>
+              <a:rPr lang="en-GB" sz="3200" dirty="0" err="1"/>
+              <a:t>brengen</a:t>
+            </a:r>
+            <a:r>
+              <a:rPr lang="en-GB" sz="3200" dirty="0"/>
+              <a:t> </a:t>
+            </a:r>
+            <a:r>
+              <a:rPr lang="en-GB" sz="3200" dirty="0" err="1"/>
+              <a:t>aan</a:t>
+            </a:r>
+            <a:r>
+              <a:rPr lang="en-GB" sz="3200" dirty="0"/>
+              <a:t> </a:t>
+            </a:r>
+            <a:r>
+              <a:rPr lang="en-GB" sz="3200" dirty="0" err="1"/>
+              <a:t>anderen</a:t>
+            </a:r>
+            <a:r>
+              <a:rPr lang="en-GB" sz="3200" dirty="0"/>
+              <a:t> </a:t>
+            </a:r>
+            <a:r>
+              <a:rPr lang="en-GB" sz="3200" dirty="0" err="1"/>
               <a:t>en</a:t>
             </a:r>
             <a:r>
-              <a:rPr lang="en-GB" sz="4000" dirty="0"/>
+              <a:rPr lang="en-GB" sz="3200" dirty="0"/>
+              <a:t> die de </a:t>
+            </a:r>
+            <a:r>
+              <a:rPr lang="en-GB" sz="3200" dirty="0" err="1"/>
+              <a:t>sociale</a:t>
+            </a:r>
+            <a:r>
+              <a:rPr lang="en-GB" sz="3200" dirty="0"/>
+              <a:t> norm </a:t>
+            </a:r>
+            <a:r>
+              <a:rPr lang="en-GB" sz="3200" dirty="0" err="1"/>
+              <a:t>en</a:t>
+            </a:r>
+            <a:r>
+              <a:rPr lang="en-GB" sz="3200" dirty="0"/>
               <a:t> </a:t>
             </a:r>
             <a:r>
-              <a:rPr lang="en-GB" sz="4000" dirty="0" err="1"/>
-              <a:t>verbeteren</a:t>
-            </a:r>
-            <a:r>
-              <a:rPr lang="en-GB" sz="4000" dirty="0"/>
-              <a:t> van het </a:t>
-            </a:r>
-            <a:r>
-              <a:rPr lang="en-GB" sz="4000" dirty="0" err="1"/>
-              <a:t>welzijn</a:t>
-            </a:r>
-            <a:r>
-              <a:rPr lang="en-GB" sz="4000" dirty="0"/>
-              <a:t> van </a:t>
-            </a:r>
-            <a:r>
-              <a:rPr lang="en-GB" sz="4000" dirty="0" err="1"/>
-              <a:t>mensen</a:t>
-            </a:r>
-            <a:r>
-              <a:rPr lang="en-GB" sz="4000" dirty="0"/>
+              <a:rPr lang="en-GB" sz="3200" dirty="0" err="1"/>
+              <a:t>verwachtingen</a:t>
+            </a:r>
+            <a:r>
+              <a:rPr lang="en-GB" sz="3200" dirty="0"/>
               <a:t> </a:t>
             </a:r>
             <a:r>
-              <a:rPr lang="en-GB" sz="4000" dirty="0" err="1"/>
-              <a:t>waarmee</a:t>
-            </a:r>
-            <a:r>
-              <a:rPr lang="en-GB" sz="4000" dirty="0"/>
-              <a:t> je frequent </a:t>
-            </a:r>
-            <a:r>
-              <a:rPr lang="en-GB" sz="4000" dirty="0" err="1"/>
-              <a:t>persoonlijk</a:t>
-            </a:r>
-            <a:r>
-              <a:rPr lang="en-GB" sz="4000" dirty="0"/>
-              <a:t> contact </a:t>
-            </a:r>
-            <a:r>
-              <a:rPr lang="en-GB" sz="4000" dirty="0" err="1"/>
-              <a:t>hebt</a:t>
-            </a:r>
-            <a:r>
-              <a:rPr lang="en-GB" sz="4000" dirty="0"/>
+              <a:rPr lang="en-GB" sz="3200" dirty="0" err="1"/>
+              <a:t>overtreden</a:t>
+            </a:r>
+            <a:r>
+              <a:rPr lang="en-GB" sz="3200" dirty="0"/>
               <a:t> (</a:t>
             </a:r>
             <a:r>
-              <a:rPr lang="en-GB" sz="4000" dirty="0" err="1"/>
-              <a:t>wil</a:t>
-            </a:r>
-            <a:r>
-              <a:rPr lang="en-GB" sz="4000" dirty="0"/>
-              <a:t> om </a:t>
-            </a:r>
-            <a:r>
-              <a:rPr lang="en-GB" sz="4000" dirty="0" err="1"/>
-              <a:t>te</a:t>
-            </a:r>
-            <a:r>
-              <a:rPr lang="en-GB" sz="4000" dirty="0"/>
+              <a:rPr lang="en-GB" sz="3200" dirty="0" err="1"/>
+              <a:t>zelfdiscipline</a:t>
+            </a:r>
+            <a:r>
+              <a:rPr lang="en-GB" sz="3200" dirty="0"/>
+              <a:t>, </a:t>
+            </a:r>
+            <a:r>
+              <a:rPr lang="en-GB" sz="3200" dirty="0" err="1"/>
+              <a:t>netjes</a:t>
+            </a:r>
+            <a:r>
+              <a:rPr lang="en-GB" sz="3200" dirty="0"/>
+              <a:t>, het </a:t>
+            </a:r>
+            <a:r>
+              <a:rPr lang="en-GB" sz="3200" dirty="0" err="1"/>
+              <a:t>eren</a:t>
+            </a:r>
+            <a:r>
+              <a:rPr lang="en-GB" sz="3200" dirty="0"/>
+              <a:t> van de </a:t>
+            </a:r>
+            <a:r>
+              <a:rPr lang="en-GB" sz="3200" dirty="0" err="1"/>
+              <a:t>ouders</a:t>
+            </a:r>
+            <a:r>
+              <a:rPr lang="en-GB" sz="3200" dirty="0"/>
               <a:t> </a:t>
             </a:r>
             <a:r>
-              <a:rPr lang="en-GB" sz="4000" dirty="0" err="1"/>
-              <a:t>helpen</a:t>
-            </a:r>
-            <a:r>
-              <a:rPr lang="en-GB" sz="4000" dirty="0"/>
+              <a:rPr lang="en-GB" sz="3200" dirty="0" err="1"/>
+              <a:t>en</a:t>
+            </a:r>
+            <a:r>
+              <a:rPr lang="en-GB" sz="3200" dirty="0"/>
+              <a:t> </a:t>
+            </a:r>
+            <a:r>
+              <a:rPr lang="en-GB" sz="3200" dirty="0" err="1"/>
+              <a:t>ouderen</a:t>
+            </a:r>
+            <a:r>
+              <a:rPr lang="en-GB" sz="3200" dirty="0"/>
               <a:t>, </a:t>
             </a:r>
             <a:r>
-              <a:rPr lang="en-GB" sz="4000" dirty="0" err="1"/>
-              <a:t>vergevingsgezind</a:t>
-            </a:r>
-            <a:r>
-              <a:rPr lang="en-GB" sz="4000" dirty="0"/>
-              <a:t>, </a:t>
-            </a:r>
-            <a:r>
-              <a:rPr lang="en-GB" sz="4000" dirty="0" err="1"/>
-              <a:t>sociale</a:t>
-            </a:r>
-            <a:r>
-              <a:rPr lang="en-GB" sz="4000" dirty="0"/>
-              <a:t> </a:t>
-            </a:r>
-            <a:r>
-              <a:rPr lang="en-GB" sz="4000" dirty="0" err="1"/>
-              <a:t>gerechtigheid</a:t>
-            </a:r>
-            <a:r>
-              <a:rPr lang="en-GB" sz="4000" dirty="0"/>
+              <a:rPr lang="en-GB" sz="3200" dirty="0" err="1"/>
+              <a:t>gehoorzaamheid</a:t>
+            </a:r>
+            <a:r>
+              <a:rPr lang="en-GB" sz="3200" dirty="0"/>
               <a:t>).</a:t>
             </a:r>
-            <a:endParaRPr lang="en-NL" sz="4000" dirty="0"/>
+            <a:endParaRPr lang="en-NL" sz="3200" dirty="0"/>
           </a:p>
         </p:txBody>
       </p:sp>
     </p:spTree>
     <p:extLst>
       <p:ext uri="{BB962C8B-B14F-4D97-AF65-F5344CB8AC3E}">
-        <p14:creationId xmlns:p14="http://schemas.microsoft.com/office/powerpoint/2010/main" val="3384667048"/>
+        <p14:creationId xmlns:p14="http://schemas.microsoft.com/office/powerpoint/2010/main" val="1641957288"/>
       </p:ext>
     </p:extLst>
   </p:cSld>
@@ -20878,8 +20888,8 @@
           <a:lstStyle/>
           <a:p>
             <a:r>
-              <a:rPr lang="en-NL" dirty="0"/>
-              <a:t>Traditie</a:t>
+              <a:rPr lang="en-NL" sz="8000" dirty="0"/>
+              <a:t>Welwillendheid</a:t>
             </a:r>
           </a:p>
         </p:txBody>
@@ -20887,7 +20897,7 @@
     </p:spTree>
     <p:extLst>
       <p:ext uri="{BB962C8B-B14F-4D97-AF65-F5344CB8AC3E}">
-        <p14:creationId xmlns:p14="http://schemas.microsoft.com/office/powerpoint/2010/main" val="1514717625"/>
+        <p14:creationId xmlns:p14="http://schemas.microsoft.com/office/powerpoint/2010/main" val="3244602468"/>
       </p:ext>
     </p:extLst>
   </p:cSld>
@@ -20936,145 +20946,129 @@
           <a:lstStyle/>
           <a:p>
             <a:r>
-              <a:rPr lang="en-GB" sz="3600" dirty="0"/>
-              <a:t>Respect, </a:t>
-            </a:r>
-            <a:r>
-              <a:rPr lang="en-GB" sz="3600" dirty="0" err="1"/>
-              <a:t>toewijding</a:t>
-            </a:r>
-            <a:r>
-              <a:rPr lang="en-GB" sz="3600" dirty="0"/>
+              <a:rPr lang="en-GB" sz="4000" dirty="0"/>
+              <a:t>Het </a:t>
+            </a:r>
+            <a:r>
+              <a:rPr lang="en-GB" sz="4000" dirty="0" err="1"/>
+              <a:t>behouden</a:t>
+            </a:r>
+            <a:r>
+              <a:rPr lang="en-GB" sz="4000" dirty="0"/>
+              <a:t> </a:t>
+            </a:r>
+            <a:r>
+              <a:rPr lang="en-GB" sz="4000" dirty="0" err="1"/>
+              <a:t>en</a:t>
+            </a:r>
+            <a:r>
+              <a:rPr lang="en-GB" sz="4000" dirty="0"/>
+              <a:t> </a:t>
+            </a:r>
+            <a:r>
+              <a:rPr lang="en-GB" sz="4000" dirty="0" err="1"/>
+              <a:t>verbeteren</a:t>
+            </a:r>
+            <a:r>
+              <a:rPr lang="en-GB" sz="4000" dirty="0"/>
+              <a:t> van het </a:t>
+            </a:r>
+            <a:r>
+              <a:rPr lang="en-GB" sz="4000" dirty="0" err="1"/>
+              <a:t>welzijn</a:t>
+            </a:r>
+            <a:r>
+              <a:rPr lang="en-GB" sz="4000" dirty="0"/>
+              <a:t> van </a:t>
+            </a:r>
+            <a:r>
+              <a:rPr lang="en-GB" sz="4000" dirty="0" err="1"/>
+              <a:t>mensen</a:t>
+            </a:r>
+            <a:r>
+              <a:rPr lang="en-GB" sz="4000" dirty="0"/>
+              <a:t> </a:t>
+            </a:r>
+            <a:r>
+              <a:rPr lang="en-GB" sz="4000" dirty="0" err="1"/>
+              <a:t>waarmee</a:t>
+            </a:r>
+            <a:r>
+              <a:rPr lang="en-GB" sz="4000" dirty="0"/>
+              <a:t> je frequent </a:t>
+            </a:r>
+            <a:r>
+              <a:rPr lang="en-GB" sz="4000" dirty="0" err="1"/>
+              <a:t>persoonlijk</a:t>
+            </a:r>
+            <a:r>
+              <a:rPr lang="en-GB" sz="4000" dirty="0"/>
+              <a:t> contact </a:t>
+            </a:r>
+            <a:r>
+              <a:rPr lang="en-GB" sz="4000" dirty="0" err="1"/>
+              <a:t>hebt</a:t>
+            </a:r>
+            <a:r>
+              <a:rPr lang="en-GB" sz="4000" dirty="0"/>
+              <a:t> (</a:t>
+            </a:r>
+            <a:r>
+              <a:rPr lang="en-GB" sz="4000" dirty="0" err="1"/>
+              <a:t>wil</a:t>
+            </a:r>
+            <a:r>
+              <a:rPr lang="en-GB" sz="4000" dirty="0"/>
+              <a:t> om </a:t>
+            </a:r>
+            <a:r>
+              <a:rPr lang="en-GB" sz="4000" dirty="0" err="1"/>
+              <a:t>te</a:t>
+            </a:r>
+            <a:r>
+              <a:rPr lang="en-GB" sz="4000" dirty="0"/>
+              <a:t> </a:t>
+            </a:r>
+            <a:r>
+              <a:rPr lang="en-GB" sz="4000" dirty="0" err="1"/>
+              <a:t>helpen</a:t>
+            </a:r>
+            <a:r>
+              <a:rPr lang="en-GB" sz="4000" dirty="0"/>
               <a:t>, </a:t>
             </a:r>
             <a:r>
-              <a:rPr lang="en-GB" sz="3600" dirty="0" err="1"/>
-              <a:t>en</a:t>
-            </a:r>
-            <a:r>
-              <a:rPr lang="en-GB" sz="3600" dirty="0"/>
+              <a:rPr lang="en-GB" sz="4000" dirty="0" err="1"/>
+              <a:t>vergevingsgezind</a:t>
+            </a:r>
+            <a:r>
+              <a:rPr lang="en-GB" sz="4000" dirty="0"/>
+              <a:t>, </a:t>
+            </a:r>
+            <a:r>
+              <a:rPr lang="en-GB" sz="4000" dirty="0" err="1"/>
+              <a:t>sociale</a:t>
+            </a:r>
+            <a:r>
+              <a:rPr lang="en-GB" sz="4000" dirty="0"/>
               <a:t> </a:t>
             </a:r>
             <a:r>
-              <a:rPr lang="en-GB" sz="3600" dirty="0" err="1"/>
-              <a:t>acceptatie</a:t>
-            </a:r>
-            <a:r>
-              <a:rPr lang="en-GB" sz="3600" dirty="0"/>
-              <a:t> van </a:t>
-            </a:r>
-            <a:r>
-              <a:rPr lang="en-GB" sz="3600" dirty="0" err="1"/>
-              <a:t>gewoontes</a:t>
-            </a:r>
-            <a:r>
-              <a:rPr lang="en-GB" sz="3600" dirty="0"/>
-              <a:t> </a:t>
-            </a:r>
-            <a:r>
-              <a:rPr lang="en-GB" sz="3600" dirty="0" err="1"/>
-              <a:t>en</a:t>
-            </a:r>
-            <a:r>
-              <a:rPr lang="en-GB" sz="3600" dirty="0"/>
-              <a:t> </a:t>
-            </a:r>
-            <a:r>
-              <a:rPr lang="en-GB" sz="3600" dirty="0" err="1"/>
-              <a:t>ideeën</a:t>
-            </a:r>
-            <a:r>
-              <a:rPr lang="en-GB" sz="3600" dirty="0"/>
-              <a:t> die </a:t>
-            </a:r>
-            <a:r>
-              <a:rPr lang="en-GB" sz="3600" dirty="0" err="1"/>
-              <a:t>traditionele</a:t>
-            </a:r>
-            <a:r>
-              <a:rPr lang="en-GB" sz="3600" dirty="0"/>
-              <a:t> </a:t>
-            </a:r>
-            <a:r>
-              <a:rPr lang="en-GB" sz="3600" dirty="0" err="1"/>
-              <a:t>culturen</a:t>
-            </a:r>
-            <a:r>
-              <a:rPr lang="en-GB" sz="3600" dirty="0"/>
-              <a:t> of </a:t>
-            </a:r>
-            <a:r>
-              <a:rPr lang="en-GB" sz="3600" dirty="0" err="1"/>
-              <a:t>religie</a:t>
-            </a:r>
-            <a:r>
-              <a:rPr lang="en-GB" sz="3600" dirty="0"/>
-              <a:t> </a:t>
-            </a:r>
-            <a:r>
-              <a:rPr lang="en-GB" sz="3600" dirty="0" err="1"/>
-              <a:t>geven</a:t>
-            </a:r>
-            <a:r>
-              <a:rPr lang="en-GB" sz="3600" dirty="0"/>
-              <a:t> (</a:t>
-            </a:r>
-            <a:r>
-              <a:rPr lang="en-GB" sz="3600" dirty="0" err="1"/>
-              <a:t>toewijding</a:t>
-            </a:r>
-            <a:r>
-              <a:rPr lang="en-GB" sz="3600" dirty="0"/>
-              <a:t>, respect </a:t>
-            </a:r>
-            <a:r>
-              <a:rPr lang="en-GB" sz="3600" dirty="0" err="1"/>
-              <a:t>voor</a:t>
-            </a:r>
-            <a:r>
-              <a:rPr lang="en-GB" sz="3600" dirty="0"/>
-              <a:t> </a:t>
-            </a:r>
-            <a:r>
-              <a:rPr lang="en-GB" sz="3600" dirty="0" err="1"/>
-              <a:t>traditie</a:t>
-            </a:r>
-            <a:r>
-              <a:rPr lang="en-GB" sz="3600" dirty="0"/>
-              <a:t>, </a:t>
-            </a:r>
-            <a:r>
-              <a:rPr lang="en-GB" sz="3600" dirty="0" err="1"/>
-              <a:t>nederigheid</a:t>
-            </a:r>
-            <a:r>
-              <a:rPr lang="en-GB" sz="3600" dirty="0"/>
-              <a:t>, </a:t>
-            </a:r>
-            <a:r>
-              <a:rPr lang="en-GB" sz="3600" dirty="0" err="1"/>
-              <a:t>spiritueel</a:t>
-            </a:r>
-            <a:r>
-              <a:rPr lang="en-GB" sz="3600" dirty="0"/>
-              <a:t> </a:t>
-            </a:r>
-            <a:r>
-              <a:rPr lang="en-GB" sz="3600" dirty="0" err="1"/>
-              <a:t>leven</a:t>
-            </a:r>
-            <a:r>
-              <a:rPr lang="en-GB" sz="3600" dirty="0"/>
-              <a:t>)</a:t>
-            </a:r>
-            <a:endParaRPr lang="en-NL" sz="3600" dirty="0"/>
+              <a:rPr lang="en-GB" sz="4000" dirty="0" err="1"/>
+              <a:t>gerechtigheid</a:t>
+            </a:r>
+            <a:r>
+              <a:rPr lang="en-GB" sz="4000" dirty="0"/>
+              <a:t>).</a:t>
+            </a:r>
+            <a:endParaRPr lang="en-NL" sz="4000" dirty="0"/>
           </a:p>
         </p:txBody>
       </p:sp>
     </p:spTree>
     <p:extLst>
       <p:ext uri="{BB962C8B-B14F-4D97-AF65-F5344CB8AC3E}">
-        <p14:creationId xmlns:p14="http://schemas.microsoft.com/office/powerpoint/2010/main" val="3211012477"/>
+        <p14:creationId xmlns:p14="http://schemas.microsoft.com/office/powerpoint/2010/main" val="3384667048"/>
       </p:ext>
     </p:extLst>
   </p:cSld>
@@ -21123,8 +21117,8 @@
           <a:lstStyle/>
           <a:p>
             <a:r>
-              <a:rPr lang="en-NL" sz="8800" dirty="0"/>
-              <a:t>Universalisme</a:t>
+              <a:rPr lang="en-NL" dirty="0"/>
+              <a:t>Traditie</a:t>
             </a:r>
           </a:p>
         </p:txBody>
@@ -21132,7 +21126,7 @@
     </p:spTree>
     <p:extLst>
       <p:ext uri="{BB962C8B-B14F-4D97-AF65-F5344CB8AC3E}">
-        <p14:creationId xmlns:p14="http://schemas.microsoft.com/office/powerpoint/2010/main" val="1529808827"/>
+        <p14:creationId xmlns:p14="http://schemas.microsoft.com/office/powerpoint/2010/main" val="1514717625"/>
       </p:ext>
     </p:extLst>
   </p:cSld>
@@ -21181,8 +21175,12 @@
           <a:lstStyle/>
           <a:p>
             <a:r>
+              <a:rPr lang="en-GB" sz="3600" dirty="0"/>
+              <a:t>Respect, </a:t>
+            </a:r>
+            <a:r>
               <a:rPr lang="en-GB" sz="3600" dirty="0" err="1"/>
-              <a:t>Begrijpen</a:t>
+              <a:t>toewijding</a:t>
             </a:r>
             <a:r>
               <a:rPr lang="en-GB" sz="3600" dirty="0"/>
@@ -21190,7 +21188,7 @@
             </a:r>
             <a:r>
               <a:rPr lang="en-GB" sz="3600" dirty="0" err="1"/>
-              <a:t>kunnen</a:t>
+              <a:t>en</a:t>
             </a:r>
             <a:r>
               <a:rPr lang="en-GB" sz="3600" dirty="0"/>
@@ -21198,7 +21196,87 @@
             </a:r>
             <a:r>
               <a:rPr lang="en-GB" sz="3600" dirty="0" err="1"/>
-              <a:t>waarderen</a:t>
+              <a:t>acceptatie</a:t>
+            </a:r>
+            <a:r>
+              <a:rPr lang="en-GB" sz="3600" dirty="0"/>
+              <a:t> van </a:t>
+            </a:r>
+            <a:r>
+              <a:rPr lang="en-GB" sz="3600" dirty="0" err="1"/>
+              <a:t>gewoontes</a:t>
+            </a:r>
+            <a:r>
+              <a:rPr lang="en-GB" sz="3600" dirty="0"/>
+              <a:t> </a:t>
+            </a:r>
+            <a:r>
+              <a:rPr lang="en-GB" sz="3600" dirty="0" err="1"/>
+              <a:t>en</a:t>
+            </a:r>
+            <a:r>
+              <a:rPr lang="en-GB" sz="3600" dirty="0"/>
+              <a:t> </a:t>
+            </a:r>
+            <a:r>
+              <a:rPr lang="en-GB" sz="3600" dirty="0" err="1"/>
+              <a:t>ideeën</a:t>
+            </a:r>
+            <a:r>
+              <a:rPr lang="en-GB" sz="3600" dirty="0"/>
+              <a:t> die </a:t>
+            </a:r>
+            <a:r>
+              <a:rPr lang="en-GB" sz="3600" dirty="0" err="1"/>
+              <a:t>traditionele</a:t>
+            </a:r>
+            <a:r>
+              <a:rPr lang="en-GB" sz="3600" dirty="0"/>
+              <a:t> </a:t>
+            </a:r>
+            <a:r>
+              <a:rPr lang="en-GB" sz="3600" dirty="0" err="1"/>
+              <a:t>culturen</a:t>
+            </a:r>
+            <a:r>
+              <a:rPr lang="en-GB" sz="3600" dirty="0"/>
+              <a:t> of </a:t>
+            </a:r>
+            <a:r>
+              <a:rPr lang="en-GB" sz="3600" dirty="0" err="1"/>
+              <a:t>religie</a:t>
+            </a:r>
+            <a:r>
+              <a:rPr lang="en-GB" sz="3600" dirty="0"/>
+              <a:t> </a:t>
+            </a:r>
+            <a:r>
+              <a:rPr lang="en-GB" sz="3600" dirty="0" err="1"/>
+              <a:t>geven</a:t>
+            </a:r>
+            <a:r>
+              <a:rPr lang="en-GB" sz="3600" dirty="0"/>
+              <a:t> (</a:t>
+            </a:r>
+            <a:r>
+              <a:rPr lang="en-GB" sz="3600" dirty="0" err="1"/>
+              <a:t>toewijding</a:t>
+            </a:r>
+            <a:r>
+              <a:rPr lang="en-GB" sz="3600" dirty="0"/>
+              <a:t>, respect </a:t>
+            </a:r>
+            <a:r>
+              <a:rPr lang="en-GB" sz="3600" dirty="0" err="1"/>
+              <a:t>voor</a:t>
+            </a:r>
+            <a:r>
+              <a:rPr lang="en-GB" sz="3600" dirty="0"/>
+              <a:t> </a:t>
+            </a:r>
+            <a:r>
+              <a:rPr lang="en-GB" sz="3600" dirty="0" err="1"/>
+              <a:t>traditie</a:t>
             </a:r>
             <a:r>
               <a:rPr lang="en-GB" sz="3600" dirty="0"/>
@@ -21206,7 +21284,7 @@
             </a:r>
             <a:r>
               <a:rPr lang="en-GB" sz="3600" dirty="0" err="1"/>
-              <a:t>tolerantie</a:t>
+              <a:t>nederigheid</a:t>
             </a:r>
             <a:r>
               <a:rPr lang="en-GB" sz="3600" dirty="0"/>
@@ -21214,31 +21292,7 @@
             </a:r>
             <a:r>
               <a:rPr lang="en-GB" sz="3600" dirty="0" err="1"/>
-              <a:t>en</a:t>
-            </a:r>
-            <a:r>
-              <a:rPr lang="en-GB" sz="3600" dirty="0"/>
-              <a:t> het </a:t>
-            </a:r>
-            <a:r>
-              <a:rPr lang="en-GB" sz="3600" dirty="0" err="1"/>
-              <a:t>beschermen</a:t>
-            </a:r>
-            <a:r>
-              <a:rPr lang="en-GB" sz="3600" dirty="0"/>
-              <a:t> van het </a:t>
-            </a:r>
-            <a:r>
-              <a:rPr lang="en-GB" sz="3600" dirty="0" err="1"/>
-              <a:t>welzijn</a:t>
-            </a:r>
-            <a:r>
-              <a:rPr lang="en-GB" sz="3600" dirty="0"/>
-              <a:t> van alle </a:t>
-            </a:r>
-            <a:r>
-              <a:rPr lang="en-GB" sz="3600" dirty="0" err="1"/>
-              <a:t>mensen</a:t>
+              <a:t>spiritueel</a:t>
             </a:r>
             <a:r>
               <a:rPr lang="en-GB" sz="3600" dirty="0"/>
@@ -21246,67 +21300,11 @@
             </a:r>
             <a:r>
               <a:rPr lang="en-GB" sz="3600" dirty="0" err="1"/>
-              <a:t>en</a:t>
+              <a:t>leven</a:t>
             </a:r>
             <a:r>
               <a:rPr lang="en-GB" sz="3600" dirty="0"/>
-              <a:t> de </a:t>
-            </a:r>
-            <a:r>
-              <a:rPr lang="en-GB" sz="3600" dirty="0" err="1"/>
-              <a:t>natuur</a:t>
-            </a:r>
-            <a:r>
-              <a:rPr lang="en-GB" sz="3600" dirty="0"/>
-              <a:t> (</a:t>
-            </a:r>
-            <a:r>
-              <a:rPr lang="en-GB" sz="3600" dirty="0" err="1"/>
-              <a:t>eerlijkheid</a:t>
-            </a:r>
-            <a:r>
-              <a:rPr lang="en-GB" sz="3600" dirty="0"/>
-              <a:t>, breed </a:t>
-            </a:r>
-            <a:r>
-              <a:rPr lang="en-GB" sz="3600" dirty="0" err="1"/>
-              <a:t>denkbeeld</a:t>
-            </a:r>
-            <a:r>
-              <a:rPr lang="en-GB" sz="3600" dirty="0"/>
-              <a:t>, </a:t>
-            </a:r>
-            <a:r>
-              <a:rPr lang="en-GB" sz="3600" dirty="0" err="1"/>
-              <a:t>beschermen</a:t>
-            </a:r>
-            <a:r>
-              <a:rPr lang="en-GB" sz="3600" dirty="0"/>
-              <a:t> van de </a:t>
-            </a:r>
-            <a:r>
-              <a:rPr lang="en-GB" sz="3600" dirty="0" err="1"/>
-              <a:t>omgeving</a:t>
-            </a:r>
-            <a:r>
-              <a:rPr lang="en-GB" sz="3600" dirty="0"/>
-              <a:t>, </a:t>
-            </a:r>
-            <a:r>
-              <a:rPr lang="en-GB" sz="3600" dirty="0" err="1"/>
-              <a:t>doel</a:t>
-            </a:r>
-            <a:r>
-              <a:rPr lang="en-GB" sz="3600" dirty="0"/>
-              <a:t> van het </a:t>
-            </a:r>
-            <a:r>
-              <a:rPr lang="en-GB" sz="3600" dirty="0" err="1"/>
-              <a:t>leven</a:t>
-            </a:r>
-            <a:r>
-              <a:rPr lang="en-GB" sz="3600" dirty="0"/>
-              <a:t>). </a:t>
+              <a:t>)</a:t>
             </a:r>
             <a:endParaRPr lang="en-NL" sz="3600" dirty="0"/>
           </a:p>
@@ -21315,7 +21313,7 @@
     </p:spTree>
     <p:extLst>
       <p:ext uri="{BB962C8B-B14F-4D97-AF65-F5344CB8AC3E}">
-        <p14:creationId xmlns:p14="http://schemas.microsoft.com/office/powerpoint/2010/main" val="667236633"/>
+        <p14:creationId xmlns:p14="http://schemas.microsoft.com/office/powerpoint/2010/main" val="3211012477"/>
       </p:ext>
     </p:extLst>
   </p:cSld>
@@ -21364,8 +21362,8 @@
           <a:lstStyle/>
           <a:p>
             <a:r>
-              <a:rPr lang="en-NL" dirty="0"/>
-              <a:t>Veiligheid</a:t>
+              <a:rPr lang="en-NL" sz="8800" dirty="0"/>
+              <a:t>Universalisme</a:t>
             </a:r>
           </a:p>
         </p:txBody>
@@ -21373,7 +21371,7 @@
     </p:spTree>
     <p:extLst>
       <p:ext uri="{BB962C8B-B14F-4D97-AF65-F5344CB8AC3E}">
-        <p14:creationId xmlns:p14="http://schemas.microsoft.com/office/powerpoint/2010/main" val="863788849"/>
+        <p14:creationId xmlns:p14="http://schemas.microsoft.com/office/powerpoint/2010/main" val="1529808827"/>
       </p:ext>
     </p:extLst>
   </p:cSld>
@@ -21422,93 +21420,199 @@
           <a:lstStyle/>
           <a:p>
             <a:r>
-              <a:rPr lang="en-GB" sz="4000" dirty="0" err="1"/>
-              <a:t>Veiligheid</a:t>
-            </a:r>
-            <a:r>
-              <a:rPr lang="en-GB" sz="4000" dirty="0"/>
+              <a:rPr lang="en-GB" sz="3600" dirty="0" err="1"/>
+              <a:t>Begrijpen</a:t>
+            </a:r>
+            <a:r>
+              <a:rPr lang="en-GB" sz="3600" dirty="0"/>
               <a:t>, </a:t>
             </a:r>
             <a:r>
-              <a:rPr lang="en-GB" sz="4000" dirty="0" err="1"/>
-              <a:t>harmonie</a:t>
-            </a:r>
-            <a:r>
-              <a:rPr lang="en-GB" sz="4000" dirty="0"/>
+              <a:rPr lang="en-GB" sz="3600" dirty="0" err="1"/>
+              <a:t>kunnen</a:t>
+            </a:r>
+            <a:r>
+              <a:rPr lang="en-GB" sz="3600" dirty="0"/>
+              <a:t> </a:t>
+            </a:r>
+            <a:r>
+              <a:rPr lang="en-GB" sz="3600" dirty="0" err="1"/>
+              <a:t>waarderen</a:t>
+            </a:r>
+            <a:r>
+              <a:rPr lang="en-GB" sz="3600" dirty="0"/>
               <a:t>, </a:t>
             </a:r>
             <a:r>
-              <a:rPr lang="en-GB" sz="4000" dirty="0" err="1"/>
+              <a:rPr lang="en-GB" sz="3600" dirty="0" err="1"/>
+              <a:t>tolerantie</a:t>
+            </a:r>
+            <a:r>
+              <a:rPr lang="en-GB" sz="3600" dirty="0"/>
+              <a:t>, </a:t>
+            </a:r>
+            <a:r>
+              <a:rPr lang="en-GB" sz="3600" dirty="0" err="1"/>
               <a:t>en</a:t>
             </a:r>
             <a:r>
-              <a:rPr lang="en-GB" sz="4000" dirty="0"/>
+              <a:rPr lang="en-GB" sz="3600" dirty="0"/>
+              <a:t> het </a:t>
+            </a:r>
+            <a:r>
+              <a:rPr lang="en-GB" sz="3600" dirty="0" err="1"/>
+              <a:t>beschermen</a:t>
+            </a:r>
+            <a:r>
+              <a:rPr lang="en-GB" sz="3600" dirty="0"/>
+              <a:t> van het </a:t>
+            </a:r>
+            <a:r>
+              <a:rPr lang="en-GB" sz="3600" dirty="0" err="1"/>
+              <a:t>welzijn</a:t>
+            </a:r>
+            <a:r>
+              <a:rPr lang="en-GB" sz="3600" dirty="0"/>
+              <a:t> van alle </a:t>
+            </a:r>
+            <a:r>
+              <a:rPr lang="en-GB" sz="3600" dirty="0" err="1"/>
+              <a:t>mensen</a:t>
+            </a:r>
+            <a:r>
+              <a:rPr lang="en-GB" sz="3600" dirty="0"/>
               <a:t> </a:t>
             </a:r>
             <a:r>
-              <a:rPr lang="en-GB" sz="4000" dirty="0" err="1"/>
-              <a:t>stabiliteit</a:t>
-            </a:r>
-            <a:r>
-              <a:rPr lang="en-GB" sz="4000" dirty="0"/>
-              <a:t> in de </a:t>
-            </a:r>
-            <a:r>
-              <a:rPr lang="en-GB" sz="4000" dirty="0" err="1"/>
-              <a:t>samenleving</a:t>
-            </a:r>
-            <a:r>
-              <a:rPr lang="en-GB" sz="4000" dirty="0"/>
-              <a:t>, of </a:t>
-            </a:r>
-            <a:r>
-              <a:rPr lang="en-GB" sz="4000" dirty="0" err="1"/>
-              <a:t>relaties</a:t>
-            </a:r>
-            <a:r>
-              <a:rPr lang="en-GB" sz="4000" dirty="0"/>
+              <a:rPr lang="en-GB" sz="3600" dirty="0" err="1"/>
+              <a:t>en</a:t>
+            </a:r>
+            <a:r>
+              <a:rPr lang="en-GB" sz="3600" dirty="0"/>
+              <a:t> de </a:t>
+            </a:r>
+            <a:r>
+              <a:rPr lang="en-GB" sz="3600" dirty="0" err="1"/>
+              <a:t>natuur</a:t>
+            </a:r>
+            <a:r>
+              <a:rPr lang="en-GB" sz="3600" dirty="0"/>
+              <a:t> (</a:t>
+            </a:r>
+            <a:r>
+              <a:rPr lang="en-GB" sz="3600" dirty="0" err="1"/>
+              <a:t>eerlijkheid</a:t>
+            </a:r>
+            <a:r>
+              <a:rPr lang="en-GB" sz="3600" dirty="0"/>
+              <a:t>, breed </a:t>
+            </a:r>
+            <a:r>
+              <a:rPr lang="en-GB" sz="3600" dirty="0" err="1"/>
+              <a:t>denkbeeld</a:t>
+            </a:r>
+            <a:r>
+              <a:rPr lang="en-GB" sz="3600" dirty="0"/>
               <a:t>, </a:t>
             </a:r>
             <a:r>
-              <a:rPr lang="en-GB" sz="4000" dirty="0" err="1"/>
-              <a:t>en</a:t>
-            </a:r>
-            <a:r>
-              <a:rPr lang="en-GB" sz="4000" dirty="0"/>
-              <a:t> </a:t>
-            </a:r>
-            <a:r>
-              <a:rPr lang="en-GB" sz="4000" dirty="0" err="1"/>
-              <a:t>zichzelf</a:t>
-            </a:r>
-            <a:r>
-              <a:rPr lang="en-GB" sz="4000" dirty="0"/>
-              <a:t> (family security, national security, </a:t>
-            </a:r>
-            <a:r>
-              <a:rPr lang="en-GB" sz="4000" dirty="0" err="1"/>
-              <a:t>sociale</a:t>
-            </a:r>
-            <a:r>
-              <a:rPr lang="en-GB" sz="4000" dirty="0"/>
-              <a:t> </a:t>
-            </a:r>
-            <a:r>
-              <a:rPr lang="en-GB" sz="4000" dirty="0" err="1"/>
-              <a:t>orde</a:t>
-            </a:r>
-            <a:r>
-              <a:rPr lang="en-GB" sz="4000" dirty="0"/>
-              <a:t>.)</a:t>
-            </a:r>
-            <a:endParaRPr lang="en-NL" sz="4000" dirty="0"/>
+              <a:rPr lang="en-GB" sz="3600" dirty="0" err="1"/>
+              <a:t>beschermen</a:t>
+            </a:r>
+            <a:r>
+              <a:rPr lang="en-GB" sz="3600" dirty="0"/>
+              <a:t> van de </a:t>
+            </a:r>
+            <a:r>
+              <a:rPr lang="en-GB" sz="3600" dirty="0" err="1"/>
+              <a:t>omgeving</a:t>
+            </a:r>
+            <a:r>
+              <a:rPr lang="en-GB" sz="3600" dirty="0"/>
+              <a:t>, </a:t>
+            </a:r>
+            <a:r>
+              <a:rPr lang="en-GB" sz="3600" dirty="0" err="1"/>
+              <a:t>doel</a:t>
+            </a:r>
+            <a:r>
+              <a:rPr lang="en-GB" sz="3600" dirty="0"/>
+              <a:t> van het </a:t>
+            </a:r>
+            <a:r>
+              <a:rPr lang="en-GB" sz="3600" dirty="0" err="1"/>
+              <a:t>leven</a:t>
+            </a:r>
+            <a:r>
+              <a:rPr lang="en-GB" sz="3600" dirty="0"/>
+              <a:t>). </a:t>
+            </a:r>
+            <a:endParaRPr lang="en-NL" sz="3600" dirty="0"/>
           </a:p>
         </p:txBody>
       </p:sp>
     </p:spTree>
     <p:extLst>
       <p:ext uri="{BB962C8B-B14F-4D97-AF65-F5344CB8AC3E}">
-        <p14:creationId xmlns:p14="http://schemas.microsoft.com/office/powerpoint/2010/main" val="1824187628"/>
+        <p14:creationId xmlns:p14="http://schemas.microsoft.com/office/powerpoint/2010/main" val="667236633"/>
+      </p:ext>
+    </p:extLst>
+  </p:cSld>
+  <p:clrMapOvr>
+    <a:masterClrMapping/>
+  </p:clrMapOvr>
+</p:sld>
+</file>
+
+<file path=ppt/slides/slide39.xml><?xml version="1.0" encoding="utf-8"?>
+<p:sld xmlns:a="http://schemas.openxmlformats.org/drawingml/2006/main" xmlns:r="http://schemas.openxmlformats.org/officeDocument/2006/relationships" xmlns:p="http://schemas.openxmlformats.org/presentationml/2006/main">
+  <p:cSld>
+    <p:spTree>
+      <p:nvGrpSpPr>
+        <p:cNvPr id="1" name=""/>
+        <p:cNvGrpSpPr/>
+        <p:nvPr/>
+      </p:nvGrpSpPr>
+      <p:grpSpPr>
+        <a:xfrm>
+          <a:off x="0" y="0"/>
+          <a:ext cx="0" cy="0"/>
+          <a:chOff x="0" y="0"/>
+          <a:chExt cx="0" cy="0"/>
+        </a:xfrm>
+      </p:grpSpPr>
+      <p:sp>
+        <p:nvSpPr>
+          <p:cNvPr id="2" name="Text Placeholder 1">
+            <a:extLst>
+              <a:ext uri="{FF2B5EF4-FFF2-40B4-BE49-F238E27FC236}">
+                <a16:creationId xmlns:a16="http://schemas.microsoft.com/office/drawing/2014/main" id="{42D16AD4-0F80-FEE6-AEE9-F8FC38D238C6}"/>
+              </a:ext>
+            </a:extLst>
+          </p:cNvPr>
+          <p:cNvSpPr>
+            <a:spLocks noGrp="1"/>
+          </p:cNvSpPr>
+          <p:nvPr>
+            <p:ph type="body" sz="quarter" idx="12"/>
+          </p:nvPr>
+        </p:nvSpPr>
+        <p:spPr/>
+        <p:txBody>
+          <a:bodyPr/>
+          <a:lstStyle/>
+          <a:p>
+            <a:r>
+              <a:rPr lang="en-NL" dirty="0"/>
+              <a:t>Veiligheid</a:t>
+            </a:r>
+          </a:p>
+        </p:txBody>
+      </p:sp>
+    </p:spTree>
+    <p:extLst>
+      <p:ext uri="{BB962C8B-B14F-4D97-AF65-F5344CB8AC3E}">
+        <p14:creationId xmlns:p14="http://schemas.microsoft.com/office/powerpoint/2010/main" val="863788849"/>
       </p:ext>
     </p:extLst>
   </p:cSld>
@@ -21579,6 +21683,141 @@
     <p:extLst>
       <p:ext uri="{BB962C8B-B14F-4D97-AF65-F5344CB8AC3E}">
         <p14:creationId xmlns:p14="http://schemas.microsoft.com/office/powerpoint/2010/main" val="1024230205"/>
+      </p:ext>
+    </p:extLst>
+  </p:cSld>
+  <p:clrMapOvr>
+    <a:masterClrMapping/>
+  </p:clrMapOvr>
+</p:sld>
+</file>
+
+<file path=ppt/slides/slide40.xml><?xml version="1.0" encoding="utf-8"?>
+<p:sld xmlns:a="http://schemas.openxmlformats.org/drawingml/2006/main" xmlns:r="http://schemas.openxmlformats.org/officeDocument/2006/relationships" xmlns:p="http://schemas.openxmlformats.org/presentationml/2006/main">
+  <p:cSld>
+    <p:spTree>
+      <p:nvGrpSpPr>
+        <p:cNvPr id="1" name=""/>
+        <p:cNvGrpSpPr/>
+        <p:nvPr/>
+      </p:nvGrpSpPr>
+      <p:grpSpPr>
+        <a:xfrm>
+          <a:off x="0" y="0"/>
+          <a:ext cx="0" cy="0"/>
+          <a:chOff x="0" y="0"/>
+          <a:chExt cx="0" cy="0"/>
+        </a:xfrm>
+      </p:grpSpPr>
+      <p:sp>
+        <p:nvSpPr>
+          <p:cNvPr id="2" name="Text Placeholder 1">
+            <a:extLst>
+              <a:ext uri="{FF2B5EF4-FFF2-40B4-BE49-F238E27FC236}">
+                <a16:creationId xmlns:a16="http://schemas.microsoft.com/office/drawing/2014/main" id="{D737BCE5-9576-8FF8-A898-6FEF04DFDB26}"/>
+              </a:ext>
+            </a:extLst>
+          </p:cNvPr>
+          <p:cNvSpPr>
+            <a:spLocks noGrp="1"/>
+          </p:cNvSpPr>
+          <p:nvPr>
+            <p:ph type="body" sz="quarter" idx="12"/>
+          </p:nvPr>
+        </p:nvSpPr>
+        <p:spPr/>
+        <p:txBody>
+          <a:bodyPr/>
+          <a:lstStyle/>
+          <a:p>
+            <a:r>
+              <a:rPr lang="en-GB" sz="4000" dirty="0" err="1"/>
+              <a:t>Veiligheid</a:t>
+            </a:r>
+            <a:r>
+              <a:rPr lang="en-GB" sz="4000" dirty="0"/>
+              <a:t>, </a:t>
+            </a:r>
+            <a:r>
+              <a:rPr lang="en-GB" sz="4000" dirty="0" err="1"/>
+              <a:t>harmonie</a:t>
+            </a:r>
+            <a:r>
+              <a:rPr lang="en-GB" sz="4000" dirty="0"/>
+              <a:t>, </a:t>
+            </a:r>
+            <a:r>
+              <a:rPr lang="en-GB" sz="4000" dirty="0" err="1"/>
+              <a:t>en</a:t>
+            </a:r>
+            <a:r>
+              <a:rPr lang="en-GB" sz="4000" dirty="0"/>
+              <a:t> </a:t>
+            </a:r>
+            <a:r>
+              <a:rPr lang="en-GB" sz="4000" dirty="0" err="1"/>
+              <a:t>stabiliteit</a:t>
+            </a:r>
+            <a:r>
+              <a:rPr lang="en-GB" sz="4000" dirty="0"/>
+              <a:t> in de </a:t>
+            </a:r>
+            <a:r>
+              <a:rPr lang="en-GB" sz="4000" dirty="0" err="1"/>
+              <a:t>samenleving</a:t>
+            </a:r>
+            <a:r>
+              <a:rPr lang="en-GB" sz="4000" dirty="0"/>
+              <a:t>, of </a:t>
+            </a:r>
+            <a:r>
+              <a:rPr lang="en-GB" sz="4000" dirty="0" err="1"/>
+              <a:t>relaties</a:t>
+            </a:r>
+            <a:r>
+              <a:rPr lang="en-GB" sz="4000" dirty="0"/>
+              <a:t>, </a:t>
+            </a:r>
+            <a:r>
+              <a:rPr lang="en-GB" sz="4000" dirty="0" err="1"/>
+              <a:t>en</a:t>
+            </a:r>
+            <a:r>
+              <a:rPr lang="en-GB" sz="4000" dirty="0"/>
+              <a:t> </a:t>
+            </a:r>
+            <a:r>
+              <a:rPr lang="en-GB" sz="4000" dirty="0" err="1"/>
+              <a:t>zichzelf</a:t>
+            </a:r>
+            <a:r>
+              <a:rPr lang="en-GB" sz="4000" dirty="0"/>
+              <a:t> (family security, national security, </a:t>
+            </a:r>
+            <a:r>
+              <a:rPr lang="en-GB" sz="4000" dirty="0" err="1"/>
+              <a:t>sociale</a:t>
+            </a:r>
+            <a:r>
+              <a:rPr lang="en-GB" sz="4000" dirty="0"/>
+              <a:t> </a:t>
+            </a:r>
+            <a:r>
+              <a:rPr lang="en-GB" sz="4000" dirty="0" err="1"/>
+              <a:t>orde</a:t>
+            </a:r>
+            <a:r>
+              <a:rPr lang="en-GB" sz="4000" dirty="0"/>
+              <a:t>.)</a:t>
+            </a:r>
+            <a:endParaRPr lang="en-NL" sz="4000" dirty="0"/>
+          </a:p>
+        </p:txBody>
+      </p:sp>
+    </p:spTree>
+    <p:extLst>
+      <p:ext uri="{BB962C8B-B14F-4D97-AF65-F5344CB8AC3E}">
+        <p14:creationId xmlns:p14="http://schemas.microsoft.com/office/powerpoint/2010/main" val="1824187628"/>
       </p:ext>
     </p:extLst>
   </p:cSld>

</xml_diff>

<commit_message>
rest van de competenties er bij
</commit_message>
<xml_diff>
--- a/Schwartz Basis Menselijke Waarden.pptx
+++ b/Schwartz Basis Menselijke Waarden.pptx
@@ -22151,7 +22151,19 @@
               <a:rPr lang="en-NL" sz="2400" dirty="0">
                 <a:latin typeface="Ubuntu" panose="020B0504030602030204" pitchFamily="34" charset="0"/>
               </a:rPr>
-              <a:t>zijn eigenschappen die ontwikkeld kunnen worden, en wanneer ze worden ingezet over het algemeen positief worden beoordeeld. De 24 gebruikte competenties zijn cross-cultureel gevalideerd, dragen bij aan zingeving, hebben morele waarde en zijn meetbaar. Inzetten van deze competenties leidt over het algemeen tot positieve uitkomsten, zowel in prestaties, welbevinden als coping.</a:t>
+              <a:t>zijn eigenschappen die ontwikkeld kunnen worden, en wanneer ze worden ingezet over het algemeen positief worden beoordeeld. </a:t>
+            </a:r>
+            <a:r>
+              <a:rPr lang="en-NL" sz="2400">
+                <a:latin typeface="Ubuntu" panose="020B0504030602030204" pitchFamily="34" charset="0"/>
+              </a:rPr>
+              <a:t>De 23 </a:t>
+            </a:r>
+            <a:r>
+              <a:rPr lang="en-NL" sz="2400" dirty="0">
+                <a:latin typeface="Ubuntu" panose="020B0504030602030204" pitchFamily="34" charset="0"/>
+              </a:rPr>
+              <a:t>gebruikte competenties zijn cross-cultureel gevalideerd, dragen bij aan zingeving, hebben morele waarde en zijn meetbaar. Inzetten van deze competenties leidt over het algemeen tot positieve uitkomsten, zowel in prestaties, welbevinden als coping.</a:t>
             </a:r>
           </a:p>
         </p:txBody>
@@ -24978,10 +24990,9 @@
           <a:lstStyle/>
           <a:p>
             <a:r>
-              <a:rPr lang="en-NL"/>
+              <a:rPr lang="en-NL" dirty="0"/>
               <a:t>Leergierigheid</a:t>
             </a:r>
-            <a:endParaRPr lang="en-NL" dirty="0"/>
           </a:p>
         </p:txBody>
       </p:sp>

</xml_diff>

<commit_message>
Beknopte achtergrond van de theorie van Schwartz basiswaarden toegevoegd aan de kaart
</commit_message>
<xml_diff>
--- a/Schwartz Basis Menselijke Waarden.pptx
+++ b/Schwartz Basis Menselijke Waarden.pptx
@@ -832,11 +832,11 @@
             </a:r>
             <a:r>
               <a:rPr lang="en-NL" dirty="0"/>
-              <a:t>ron:</a:t>
+              <a:t>ron: </a:t>
             </a:r>
             <a:r>
               <a:rPr lang="en-GB" dirty="0"/>
-              <a:t> https://</a:t>
+              <a:t>https://</a:t>
             </a:r>
             <a:r>
               <a:rPr lang="en-GB" dirty="0" err="1"/>
@@ -848,7 +848,7 @@
             </a:r>
             <a:r>
               <a:rPr lang="en-GB" dirty="0" err="1"/>
-              <a:t>Rechtvaardigheid</a:t>
+              <a:t>Schoonheid</a:t>
             </a:r>
             <a:endParaRPr lang="en-NL" dirty="0"/>
           </a:p>
@@ -871,7 +871,7 @@
           <a:p>
             <a:fld id="{00E1BD4A-1F92-B644-A197-6FBAF79CDEE2}" type="slidenum">
               <a:rPr lang="en-NL" smtClean="0"/>
-              <a:t>63</a:t>
+              <a:t>61</a:t>
             </a:fld>
             <a:endParaRPr lang="en-NL"/>
           </a:p>
@@ -880,7 +880,7 @@
     </p:spTree>
     <p:extLst>
       <p:ext uri="{BB962C8B-B14F-4D97-AF65-F5344CB8AC3E}">
-        <p14:creationId xmlns:p14="http://schemas.microsoft.com/office/powerpoint/2010/main" val="1711670782"/>
+        <p14:creationId xmlns:p14="http://schemas.microsoft.com/office/powerpoint/2010/main" val="3590136801"/>
       </p:ext>
     </p:extLst>
   </p:cSld>
@@ -940,35 +940,23 @@
             </a:r>
             <a:r>
               <a:rPr lang="en-NL" dirty="0"/>
-              <a:t>ron: </a:t>
+              <a:t>ron:</a:t>
             </a:r>
             <a:r>
               <a:rPr lang="en-GB" dirty="0"/>
-              <a:t>https://</a:t>
+              <a:t> https://</a:t>
             </a:r>
             <a:r>
               <a:rPr lang="en-GB" dirty="0" err="1"/>
-              <a:t>competentiesvoorbeelden.nl</a:t>
+              <a:t>nl.wikipedia.org</a:t>
             </a:r>
             <a:r>
               <a:rPr lang="en-GB" dirty="0"/>
-              <a:t>/</a:t>
+              <a:t>/wiki/</a:t>
             </a:r>
             <a:r>
               <a:rPr lang="en-GB" dirty="0" err="1"/>
-              <a:t>competenties</a:t>
-            </a:r>
-            <a:r>
-              <a:rPr lang="en-GB" dirty="0"/>
-              <a:t>/</a:t>
-            </a:r>
-            <a:r>
-              <a:rPr lang="en-GB" dirty="0" err="1"/>
-              <a:t>integriteit</a:t>
-            </a:r>
-            <a:r>
-              <a:rPr lang="en-GB" dirty="0"/>
-              <a:t>/</a:t>
+              <a:t>Rechtvaardigheid</a:t>
             </a:r>
             <a:endParaRPr lang="en-NL" dirty="0"/>
           </a:p>
@@ -991,7 +979,7 @@
           <a:p>
             <a:fld id="{00E1BD4A-1F92-B644-A197-6FBAF79CDEE2}" type="slidenum">
               <a:rPr lang="en-NL" smtClean="0"/>
-              <a:t>65</a:t>
+              <a:t>63</a:t>
             </a:fld>
             <a:endParaRPr lang="en-NL"/>
           </a:p>
@@ -1000,7 +988,7 @@
     </p:spTree>
     <p:extLst>
       <p:ext uri="{BB962C8B-B14F-4D97-AF65-F5344CB8AC3E}">
-        <p14:creationId xmlns:p14="http://schemas.microsoft.com/office/powerpoint/2010/main" val="3587479729"/>
+        <p14:creationId xmlns:p14="http://schemas.microsoft.com/office/powerpoint/2010/main" val="1711670782"/>
       </p:ext>
     </p:extLst>
   </p:cSld>
@@ -1076,7 +1064,7 @@
             </a:r>
             <a:r>
               <a:rPr lang="en-GB" dirty="0" err="1"/>
-              <a:t>karaktereigenschap</a:t>
+              <a:t>competenties</a:t>
             </a:r>
             <a:r>
               <a:rPr lang="en-GB" dirty="0"/>
@@ -1084,7 +1072,7 @@
             </a:r>
             <a:r>
               <a:rPr lang="en-GB" dirty="0" err="1"/>
-              <a:t>bescheiden</a:t>
+              <a:t>integriteit</a:t>
             </a:r>
             <a:r>
               <a:rPr lang="en-GB" dirty="0"/>
@@ -1111,7 +1099,7 @@
           <a:p>
             <a:fld id="{00E1BD4A-1F92-B644-A197-6FBAF79CDEE2}" type="slidenum">
               <a:rPr lang="en-NL" smtClean="0"/>
-              <a:t>67</a:t>
+              <a:t>65</a:t>
             </a:fld>
             <a:endParaRPr lang="en-NL"/>
           </a:p>
@@ -1120,7 +1108,7 @@
     </p:spTree>
     <p:extLst>
       <p:ext uri="{BB962C8B-B14F-4D97-AF65-F5344CB8AC3E}">
-        <p14:creationId xmlns:p14="http://schemas.microsoft.com/office/powerpoint/2010/main" val="1874722843"/>
+        <p14:creationId xmlns:p14="http://schemas.microsoft.com/office/powerpoint/2010/main" val="3587479729"/>
       </p:ext>
     </p:extLst>
   </p:cSld>
@@ -1196,7 +1184,7 @@
             </a:r>
             <a:r>
               <a:rPr lang="en-GB" dirty="0" err="1"/>
-              <a:t>competenties</a:t>
+              <a:t>karaktereigenschap</a:t>
             </a:r>
             <a:r>
               <a:rPr lang="en-GB" dirty="0"/>
@@ -1204,7 +1192,7 @@
             </a:r>
             <a:r>
               <a:rPr lang="en-GB" dirty="0" err="1"/>
-              <a:t>leiderschap</a:t>
+              <a:t>bescheiden</a:t>
             </a:r>
             <a:r>
               <a:rPr lang="en-GB" dirty="0"/>
@@ -1231,7 +1219,7 @@
           <a:p>
             <a:fld id="{00E1BD4A-1F92-B644-A197-6FBAF79CDEE2}" type="slidenum">
               <a:rPr lang="en-NL" smtClean="0"/>
-              <a:t>69</a:t>
+              <a:t>67</a:t>
             </a:fld>
             <a:endParaRPr lang="en-NL"/>
           </a:p>
@@ -1240,7 +1228,7 @@
     </p:spTree>
     <p:extLst>
       <p:ext uri="{BB962C8B-B14F-4D97-AF65-F5344CB8AC3E}">
-        <p14:creationId xmlns:p14="http://schemas.microsoft.com/office/powerpoint/2010/main" val="133808917"/>
+        <p14:creationId xmlns:p14="http://schemas.microsoft.com/office/powerpoint/2010/main" val="1874722843"/>
       </p:ext>
     </p:extLst>
   </p:cSld>
@@ -1316,7 +1304,7 @@
             </a:r>
             <a:r>
               <a:rPr lang="en-GB" dirty="0" err="1"/>
-              <a:t>karaktereigenschap</a:t>
+              <a:t>competenties</a:t>
             </a:r>
             <a:r>
               <a:rPr lang="en-GB" dirty="0"/>
@@ -1324,7 +1312,7 @@
             </a:r>
             <a:r>
               <a:rPr lang="en-GB" dirty="0" err="1"/>
-              <a:t>bedachtzaam</a:t>
+              <a:t>leiderschap</a:t>
             </a:r>
             <a:r>
               <a:rPr lang="en-GB" dirty="0"/>
@@ -1351,7 +1339,7 @@
           <a:p>
             <a:fld id="{00E1BD4A-1F92-B644-A197-6FBAF79CDEE2}" type="slidenum">
               <a:rPr lang="en-NL" smtClean="0"/>
-              <a:t>71</a:t>
+              <a:t>69</a:t>
             </a:fld>
             <a:endParaRPr lang="en-NL"/>
           </a:p>
@@ -1360,7 +1348,7 @@
     </p:spTree>
     <p:extLst>
       <p:ext uri="{BB962C8B-B14F-4D97-AF65-F5344CB8AC3E}">
-        <p14:creationId xmlns:p14="http://schemas.microsoft.com/office/powerpoint/2010/main" val="2470492835"/>
+        <p14:creationId xmlns:p14="http://schemas.microsoft.com/office/powerpoint/2010/main" val="133808917"/>
       </p:ext>
     </p:extLst>
   </p:cSld>
@@ -1436,7 +1424,7 @@
             </a:r>
             <a:r>
               <a:rPr lang="en-GB" dirty="0" err="1"/>
-              <a:t>vaardigheden</a:t>
+              <a:t>karaktereigenschap</a:t>
             </a:r>
             <a:r>
               <a:rPr lang="en-GB" dirty="0"/>
@@ -1444,7 +1432,7 @@
             </a:r>
             <a:r>
               <a:rPr lang="en-GB" dirty="0" err="1"/>
-              <a:t>zelfbeheersing</a:t>
+              <a:t>bedachtzaam</a:t>
             </a:r>
             <a:r>
               <a:rPr lang="en-GB" dirty="0"/>
@@ -1471,7 +1459,7 @@
           <a:p>
             <a:fld id="{00E1BD4A-1F92-B644-A197-6FBAF79CDEE2}" type="slidenum">
               <a:rPr lang="en-NL" smtClean="0"/>
-              <a:t>73</a:t>
+              <a:t>71</a:t>
             </a:fld>
             <a:endParaRPr lang="en-NL"/>
           </a:p>
@@ -1480,7 +1468,7 @@
     </p:spTree>
     <p:extLst>
       <p:ext uri="{BB962C8B-B14F-4D97-AF65-F5344CB8AC3E}">
-        <p14:creationId xmlns:p14="http://schemas.microsoft.com/office/powerpoint/2010/main" val="3409853918"/>
+        <p14:creationId xmlns:p14="http://schemas.microsoft.com/office/powerpoint/2010/main" val="2470492835"/>
       </p:ext>
     </p:extLst>
   </p:cSld>
@@ -1548,15 +1536,27 @@
             </a:r>
             <a:r>
               <a:rPr lang="en-GB" dirty="0" err="1"/>
-              <a:t>nl.wikipedia.org</a:t>
+              <a:t>competentiesvoorbeelden.nl</a:t>
             </a:r>
             <a:r>
               <a:rPr lang="en-GB" dirty="0"/>
-              <a:t>/wiki/</a:t>
+              <a:t>/</a:t>
             </a:r>
             <a:r>
               <a:rPr lang="en-GB" dirty="0" err="1"/>
-              <a:t>Liefde</a:t>
+              <a:t>vaardigheden</a:t>
+            </a:r>
+            <a:r>
+              <a:rPr lang="en-GB" dirty="0"/>
+              <a:t>/</a:t>
+            </a:r>
+            <a:r>
+              <a:rPr lang="en-GB" dirty="0" err="1"/>
+              <a:t>zelfbeheersing</a:t>
+            </a:r>
+            <a:r>
+              <a:rPr lang="en-GB" dirty="0"/>
+              <a:t>/</a:t>
             </a:r>
             <a:endParaRPr lang="en-NL" dirty="0"/>
           </a:p>
@@ -1579,7 +1579,7 @@
           <a:p>
             <a:fld id="{00E1BD4A-1F92-B644-A197-6FBAF79CDEE2}" type="slidenum">
               <a:rPr lang="en-NL" smtClean="0"/>
-              <a:t>75</a:t>
+              <a:t>73</a:t>
             </a:fld>
             <a:endParaRPr lang="en-NL"/>
           </a:p>
@@ -1588,7 +1588,7 @@
     </p:spTree>
     <p:extLst>
       <p:ext uri="{BB962C8B-B14F-4D97-AF65-F5344CB8AC3E}">
-        <p14:creationId xmlns:p14="http://schemas.microsoft.com/office/powerpoint/2010/main" val="677025906"/>
+        <p14:creationId xmlns:p14="http://schemas.microsoft.com/office/powerpoint/2010/main" val="3409853918"/>
       </p:ext>
     </p:extLst>
   </p:cSld>
@@ -1656,7 +1656,7 @@
             </a:r>
             <a:r>
               <a:rPr lang="en-GB" dirty="0" err="1"/>
-              <a:t>nl.wiktionary.org</a:t>
+              <a:t>nl.wikipedia.org</a:t>
             </a:r>
             <a:r>
               <a:rPr lang="en-GB" dirty="0"/>
@@ -1664,7 +1664,7 @@
             </a:r>
             <a:r>
               <a:rPr lang="en-GB" dirty="0" err="1"/>
-              <a:t>vriendelijk</a:t>
+              <a:t>Liefde</a:t>
             </a:r>
             <a:endParaRPr lang="en-NL" dirty="0"/>
           </a:p>
@@ -1687,7 +1687,7 @@
           <a:p>
             <a:fld id="{00E1BD4A-1F92-B644-A197-6FBAF79CDEE2}" type="slidenum">
               <a:rPr lang="en-NL" smtClean="0"/>
-              <a:t>77</a:t>
+              <a:t>75</a:t>
             </a:fld>
             <a:endParaRPr lang="en-NL"/>
           </a:p>
@@ -1696,7 +1696,7 @@
     </p:spTree>
     <p:extLst>
       <p:ext uri="{BB962C8B-B14F-4D97-AF65-F5344CB8AC3E}">
-        <p14:creationId xmlns:p14="http://schemas.microsoft.com/office/powerpoint/2010/main" val="1162969183"/>
+        <p14:creationId xmlns:p14="http://schemas.microsoft.com/office/powerpoint/2010/main" val="677025906"/>
       </p:ext>
     </p:extLst>
   </p:cSld>
@@ -1764,27 +1764,15 @@
             </a:r>
             <a:r>
               <a:rPr lang="en-GB" dirty="0" err="1"/>
-              <a:t>competentiesvoorbeelden.nl</a:t>
+              <a:t>nl.wiktionary.org</a:t>
             </a:r>
             <a:r>
               <a:rPr lang="en-GB" dirty="0"/>
-              <a:t>/</a:t>
+              <a:t>/wiki/</a:t>
             </a:r>
             <a:r>
               <a:rPr lang="en-GB" dirty="0" err="1"/>
-              <a:t>competenties</a:t>
-            </a:r>
-            <a:r>
-              <a:rPr lang="en-GB" dirty="0"/>
-              <a:t>/</a:t>
-            </a:r>
-            <a:r>
-              <a:rPr lang="en-GB" dirty="0" err="1"/>
-              <a:t>sociabiliteit</a:t>
-            </a:r>
-            <a:r>
-              <a:rPr lang="en-GB" dirty="0"/>
-              <a:t>/</a:t>
+              <a:t>vriendelijk</a:t>
             </a:r>
             <a:endParaRPr lang="en-NL" dirty="0"/>
           </a:p>
@@ -1807,7 +1795,7 @@
           <a:p>
             <a:fld id="{00E1BD4A-1F92-B644-A197-6FBAF79CDEE2}" type="slidenum">
               <a:rPr lang="en-NL" smtClean="0"/>
-              <a:t>79</a:t>
+              <a:t>77</a:t>
             </a:fld>
             <a:endParaRPr lang="en-NL"/>
           </a:p>
@@ -1816,7 +1804,7 @@
     </p:spTree>
     <p:extLst>
       <p:ext uri="{BB962C8B-B14F-4D97-AF65-F5344CB8AC3E}">
-        <p14:creationId xmlns:p14="http://schemas.microsoft.com/office/powerpoint/2010/main" val="2739621804"/>
+        <p14:creationId xmlns:p14="http://schemas.microsoft.com/office/powerpoint/2010/main" val="1162969183"/>
       </p:ext>
     </p:extLst>
   </p:cSld>
@@ -1884,27 +1872,27 @@
             </a:r>
             <a:r>
               <a:rPr lang="en-GB" dirty="0" err="1"/>
-              <a:t>nl.wikipedia.org</a:t>
+              <a:t>competentiesvoorbeelden.nl</a:t>
             </a:r>
             <a:r>
               <a:rPr lang="en-GB" dirty="0"/>
-              <a:t>/wiki/</a:t>
+              <a:t>/</a:t>
             </a:r>
             <a:r>
               <a:rPr lang="en-GB" dirty="0" err="1"/>
-              <a:t>Vergeving</a:t>
+              <a:t>competenties</a:t>
             </a:r>
             <a:r>
               <a:rPr lang="en-GB" dirty="0"/>
-              <a:t>_(</a:t>
+              <a:t>/</a:t>
             </a:r>
             <a:r>
               <a:rPr lang="en-GB" dirty="0" err="1"/>
-              <a:t>algemeen</a:t>
+              <a:t>sociabiliteit</a:t>
             </a:r>
             <a:r>
               <a:rPr lang="en-GB" dirty="0"/>
-              <a:t>)</a:t>
+              <a:t>/</a:t>
             </a:r>
             <a:endParaRPr lang="en-NL" dirty="0"/>
           </a:p>
@@ -1927,7 +1915,7 @@
           <a:p>
             <a:fld id="{00E1BD4A-1F92-B644-A197-6FBAF79CDEE2}" type="slidenum">
               <a:rPr lang="en-NL" smtClean="0"/>
-              <a:t>81</a:t>
+              <a:t>79</a:t>
             </a:fld>
             <a:endParaRPr lang="en-NL"/>
           </a:p>
@@ -1936,7 +1924,7 @@
     </p:spTree>
     <p:extLst>
       <p:ext uri="{BB962C8B-B14F-4D97-AF65-F5344CB8AC3E}">
-        <p14:creationId xmlns:p14="http://schemas.microsoft.com/office/powerpoint/2010/main" val="3985016740"/>
+        <p14:creationId xmlns:p14="http://schemas.microsoft.com/office/powerpoint/2010/main" val="2739621804"/>
       </p:ext>
     </p:extLst>
   </p:cSld>
@@ -1991,40 +1979,20 @@
           <a:lstStyle/>
           <a:p>
             <a:r>
-              <a:rPr lang="en-GB" dirty="0"/>
-              <a:t>B</a:t>
-            </a:r>
-            <a:r>
               <a:rPr lang="en-NL" dirty="0"/>
-              <a:t>ron: </a:t>
-            </a:r>
-            <a:r>
-              <a:rPr lang="en-GB" dirty="0"/>
-              <a:t>https://</a:t>
-            </a:r>
-            <a:r>
-              <a:rPr lang="en-GB" dirty="0" err="1"/>
-              <a:t>competentiesvoorbeelden.nl</a:t>
-            </a:r>
-            <a:r>
-              <a:rPr lang="en-GB" dirty="0"/>
-              <a:t>/</a:t>
-            </a:r>
-            <a:r>
-              <a:rPr lang="en-GB" dirty="0" err="1"/>
-              <a:t>karaktereigenschap</a:t>
-            </a:r>
-            <a:r>
-              <a:rPr lang="en-GB" dirty="0"/>
-              <a:t>/</a:t>
-            </a:r>
-            <a:r>
-              <a:rPr lang="en-GB" dirty="0" err="1"/>
-              <a:t>creatief</a:t>
-            </a:r>
-            <a:r>
-              <a:rPr lang="en-GB" dirty="0"/>
-              <a:t>/</a:t>
+              <a:t>Gevalideerd met 200 steekproeven in meer dan 70 landen. Maatschappelijke ontwikkeling lijkt invloed te hebben op de structuur van waarden. Hoe hoger het niveau van maatschappelijke ontwikkeling, </a:t>
+            </a:r>
+            <a:r>
+              <a:rPr lang="en-NL"/>
+              <a:t>hoe waarschijnlijkereen groep  </a:t>
+            </a:r>
+            <a:r>
+              <a:rPr lang="en-NL" dirty="0"/>
+              <a:t>de protoypische </a:t>
+            </a:r>
+            <a:r>
+              <a:rPr lang="en-NL"/>
+              <a:t>volgorde toont, waarbij Welwillendheid en Universalisme bovenaan staan en Macht onderaan.</a:t>
             </a:r>
             <a:endParaRPr lang="en-NL" dirty="0"/>
           </a:p>
@@ -2047,7 +2015,7 @@
           <a:p>
             <a:fld id="{00E1BD4A-1F92-B644-A197-6FBAF79CDEE2}" type="slidenum">
               <a:rPr lang="en-NL" smtClean="0"/>
-              <a:t>47</a:t>
+              <a:t>5</a:t>
             </a:fld>
             <a:endParaRPr lang="en-NL"/>
           </a:p>
@@ -2056,7 +2024,7 @@
     </p:spTree>
     <p:extLst>
       <p:ext uri="{BB962C8B-B14F-4D97-AF65-F5344CB8AC3E}">
-        <p14:creationId xmlns:p14="http://schemas.microsoft.com/office/powerpoint/2010/main" val="2640906339"/>
+        <p14:creationId xmlns:p14="http://schemas.microsoft.com/office/powerpoint/2010/main" val="104858881"/>
       </p:ext>
     </p:extLst>
   </p:cSld>
@@ -2124,7 +2092,7 @@
             </a:r>
             <a:r>
               <a:rPr lang="en-GB" dirty="0" err="1"/>
-              <a:t>nl.wiktionary.org</a:t>
+              <a:t>nl.wikipedia.org</a:t>
             </a:r>
             <a:r>
               <a:rPr lang="en-GB" dirty="0"/>
@@ -2132,7 +2100,19 @@
             </a:r>
             <a:r>
               <a:rPr lang="en-GB" dirty="0" err="1"/>
-              <a:t>dankbaar</a:t>
+              <a:t>Vergeving</a:t>
+            </a:r>
+            <a:r>
+              <a:rPr lang="en-GB" dirty="0"/>
+              <a:t>_(</a:t>
+            </a:r>
+            <a:r>
+              <a:rPr lang="en-GB" dirty="0" err="1"/>
+              <a:t>algemeen</a:t>
+            </a:r>
+            <a:r>
+              <a:rPr lang="en-GB" dirty="0"/>
+              <a:t>)</a:t>
             </a:r>
             <a:endParaRPr lang="en-NL" dirty="0"/>
           </a:p>
@@ -2155,7 +2135,7 @@
           <a:p>
             <a:fld id="{00E1BD4A-1F92-B644-A197-6FBAF79CDEE2}" type="slidenum">
               <a:rPr lang="en-NL" smtClean="0"/>
-              <a:t>83</a:t>
+              <a:t>81</a:t>
             </a:fld>
             <a:endParaRPr lang="en-NL"/>
           </a:p>
@@ -2164,7 +2144,7 @@
     </p:spTree>
     <p:extLst>
       <p:ext uri="{BB962C8B-B14F-4D97-AF65-F5344CB8AC3E}">
-        <p14:creationId xmlns:p14="http://schemas.microsoft.com/office/powerpoint/2010/main" val="2851429934"/>
+        <p14:creationId xmlns:p14="http://schemas.microsoft.com/office/powerpoint/2010/main" val="3985016740"/>
       </p:ext>
     </p:extLst>
   </p:cSld>
@@ -2232,27 +2212,15 @@
             </a:r>
             <a:r>
               <a:rPr lang="en-GB" dirty="0" err="1"/>
-              <a:t>competentiesvoorbeelden.nl</a:t>
+              <a:t>nl.wiktionary.org</a:t>
             </a:r>
             <a:r>
               <a:rPr lang="en-GB" dirty="0"/>
-              <a:t>/</a:t>
+              <a:t>/wiki/</a:t>
             </a:r>
             <a:r>
               <a:rPr lang="en-GB" dirty="0" err="1"/>
-              <a:t>vaardigheden</a:t>
-            </a:r>
-            <a:r>
-              <a:rPr lang="en-GB" dirty="0"/>
-              <a:t>/</a:t>
-            </a:r>
-            <a:r>
-              <a:rPr lang="en-GB" dirty="0" err="1"/>
-              <a:t>samenwerken</a:t>
-            </a:r>
-            <a:r>
-              <a:rPr lang="en-GB" dirty="0"/>
-              <a:t>/</a:t>
+              <a:t>dankbaar</a:t>
             </a:r>
             <a:endParaRPr lang="en-NL" dirty="0"/>
           </a:p>
@@ -2275,7 +2243,7 @@
           <a:p>
             <a:fld id="{00E1BD4A-1F92-B644-A197-6FBAF79CDEE2}" type="slidenum">
               <a:rPr lang="en-NL" smtClean="0"/>
-              <a:t>85</a:t>
+              <a:t>83</a:t>
             </a:fld>
             <a:endParaRPr lang="en-NL"/>
           </a:p>
@@ -2284,7 +2252,7 @@
     </p:spTree>
     <p:extLst>
       <p:ext uri="{BB962C8B-B14F-4D97-AF65-F5344CB8AC3E}">
-        <p14:creationId xmlns:p14="http://schemas.microsoft.com/office/powerpoint/2010/main" val="1452857000"/>
+        <p14:creationId xmlns:p14="http://schemas.microsoft.com/office/powerpoint/2010/main" val="2851429934"/>
       </p:ext>
     </p:extLst>
   </p:cSld>
@@ -2360,7 +2328,7 @@
             </a:r>
             <a:r>
               <a:rPr lang="en-GB" dirty="0" err="1"/>
-              <a:t>karaktereigenschap</a:t>
+              <a:t>vaardigheden</a:t>
             </a:r>
             <a:r>
               <a:rPr lang="en-GB" dirty="0"/>
@@ -2368,7 +2336,7 @@
             </a:r>
             <a:r>
               <a:rPr lang="en-GB" dirty="0" err="1"/>
-              <a:t>moedig</a:t>
+              <a:t>samenwerken</a:t>
             </a:r>
             <a:r>
               <a:rPr lang="en-GB" dirty="0"/>
@@ -2395,7 +2363,7 @@
           <a:p>
             <a:fld id="{00E1BD4A-1F92-B644-A197-6FBAF79CDEE2}" type="slidenum">
               <a:rPr lang="en-NL" smtClean="0"/>
-              <a:t>87</a:t>
+              <a:t>85</a:t>
             </a:fld>
             <a:endParaRPr lang="en-NL"/>
           </a:p>
@@ -2404,7 +2372,7 @@
     </p:spTree>
     <p:extLst>
       <p:ext uri="{BB962C8B-B14F-4D97-AF65-F5344CB8AC3E}">
-        <p14:creationId xmlns:p14="http://schemas.microsoft.com/office/powerpoint/2010/main" val="3684117996"/>
+        <p14:creationId xmlns:p14="http://schemas.microsoft.com/office/powerpoint/2010/main" val="1452857000"/>
       </p:ext>
     </p:extLst>
   </p:cSld>
@@ -2480,6 +2448,126 @@
             </a:r>
             <a:r>
               <a:rPr lang="en-GB" dirty="0" err="1"/>
+              <a:t>karaktereigenschap</a:t>
+            </a:r>
+            <a:r>
+              <a:rPr lang="en-GB" dirty="0"/>
+              <a:t>/</a:t>
+            </a:r>
+            <a:r>
+              <a:rPr lang="en-GB" dirty="0" err="1"/>
+              <a:t>moedig</a:t>
+            </a:r>
+            <a:r>
+              <a:rPr lang="en-GB" dirty="0"/>
+              <a:t>/</a:t>
+            </a:r>
+            <a:endParaRPr lang="en-NL" dirty="0"/>
+          </a:p>
+        </p:txBody>
+      </p:sp>
+      <p:sp>
+        <p:nvSpPr>
+          <p:cNvPr id="4" name="Slide Number Placeholder 3"/>
+          <p:cNvSpPr>
+            <a:spLocks noGrp="1"/>
+          </p:cNvSpPr>
+          <p:nvPr>
+            <p:ph type="sldNum" sz="quarter" idx="5"/>
+          </p:nvPr>
+        </p:nvSpPr>
+        <p:spPr/>
+        <p:txBody>
+          <a:bodyPr/>
+          <a:lstStyle/>
+          <a:p>
+            <a:fld id="{00E1BD4A-1F92-B644-A197-6FBAF79CDEE2}" type="slidenum">
+              <a:rPr lang="en-NL" smtClean="0"/>
+              <a:t>87</a:t>
+            </a:fld>
+            <a:endParaRPr lang="en-NL"/>
+          </a:p>
+        </p:txBody>
+      </p:sp>
+    </p:spTree>
+    <p:extLst>
+      <p:ext uri="{BB962C8B-B14F-4D97-AF65-F5344CB8AC3E}">
+        <p14:creationId xmlns:p14="http://schemas.microsoft.com/office/powerpoint/2010/main" val="3684117996"/>
+      </p:ext>
+    </p:extLst>
+  </p:cSld>
+  <p:clrMapOvr>
+    <a:masterClrMapping/>
+  </p:clrMapOvr>
+</p:notes>
+</file>
+
+<file path=ppt/notesSlides/notesSlide24.xml><?xml version="1.0" encoding="utf-8"?>
+<p:notes xmlns:a="http://schemas.openxmlformats.org/drawingml/2006/main" xmlns:r="http://schemas.openxmlformats.org/officeDocument/2006/relationships" xmlns:p="http://schemas.openxmlformats.org/presentationml/2006/main">
+  <p:cSld>
+    <p:spTree>
+      <p:nvGrpSpPr>
+        <p:cNvPr id="1" name=""/>
+        <p:cNvGrpSpPr/>
+        <p:nvPr/>
+      </p:nvGrpSpPr>
+      <p:grpSpPr>
+        <a:xfrm>
+          <a:off x="0" y="0"/>
+          <a:ext cx="0" cy="0"/>
+          <a:chOff x="0" y="0"/>
+          <a:chExt cx="0" cy="0"/>
+        </a:xfrm>
+      </p:grpSpPr>
+      <p:sp>
+        <p:nvSpPr>
+          <p:cNvPr id="2" name="Slide Image Placeholder 1"/>
+          <p:cNvSpPr>
+            <a:spLocks noGrp="1" noRot="1" noChangeAspect="1"/>
+          </p:cNvSpPr>
+          <p:nvPr>
+            <p:ph type="sldImg"/>
+          </p:nvPr>
+        </p:nvSpPr>
+        <p:spPr/>
+      </p:sp>
+      <p:sp>
+        <p:nvSpPr>
+          <p:cNvPr id="3" name="Notes Placeholder 2"/>
+          <p:cNvSpPr>
+            <a:spLocks noGrp="1"/>
+          </p:cNvSpPr>
+          <p:nvPr>
+            <p:ph type="body" idx="1"/>
+          </p:nvPr>
+        </p:nvSpPr>
+        <p:spPr/>
+        <p:txBody>
+          <a:bodyPr/>
+          <a:lstStyle/>
+          <a:p>
+            <a:r>
+              <a:rPr lang="en-GB" dirty="0"/>
+              <a:t>B</a:t>
+            </a:r>
+            <a:r>
+              <a:rPr lang="en-NL" dirty="0"/>
+              <a:t>ron: </a:t>
+            </a:r>
+            <a:r>
+              <a:rPr lang="en-GB" dirty="0"/>
+              <a:t>https://</a:t>
+            </a:r>
+            <a:r>
+              <a:rPr lang="en-GB" dirty="0" err="1"/>
+              <a:t>competentiesvoorbeelden.nl</a:t>
+            </a:r>
+            <a:r>
+              <a:rPr lang="en-GB" dirty="0"/>
+              <a:t>/</a:t>
+            </a:r>
+            <a:r>
+              <a:rPr lang="en-GB" dirty="0" err="1"/>
               <a:t>competenties</a:t>
             </a:r>
             <a:r>
@@ -2534,7 +2622,7 @@
 </p:notes>
 </file>
 
-<file path=ppt/notesSlides/notesSlide24.xml><?xml version="1.0" encoding="utf-8"?>
+<file path=ppt/notesSlides/notesSlide25.xml><?xml version="1.0" encoding="utf-8"?>
 <p:notes xmlns:a="http://schemas.openxmlformats.org/drawingml/2006/main" xmlns:r="http://schemas.openxmlformats.org/officeDocument/2006/relationships" xmlns:p="http://schemas.openxmlformats.org/presentationml/2006/main">
   <p:cSld>
     <p:spTree>
@@ -2716,7 +2804,7 @@
             </a:r>
             <a:r>
               <a:rPr lang="en-GB" dirty="0" err="1"/>
-              <a:t>nieuwsgierig</a:t>
+              <a:t>creatief</a:t>
             </a:r>
             <a:r>
               <a:rPr lang="en-GB" dirty="0"/>
@@ -2743,7 +2831,7 @@
           <a:p>
             <a:fld id="{00E1BD4A-1F92-B644-A197-6FBAF79CDEE2}" type="slidenum">
               <a:rPr lang="en-NL" smtClean="0"/>
-              <a:t>49</a:t>
+              <a:t>47</a:t>
             </a:fld>
             <a:endParaRPr lang="en-NL"/>
           </a:p>
@@ -2752,7 +2840,7 @@
     </p:spTree>
     <p:extLst>
       <p:ext uri="{BB962C8B-B14F-4D97-AF65-F5344CB8AC3E}">
-        <p14:creationId xmlns:p14="http://schemas.microsoft.com/office/powerpoint/2010/main" val="2764681039"/>
+        <p14:creationId xmlns:p14="http://schemas.microsoft.com/office/powerpoint/2010/main" val="2640906339"/>
       </p:ext>
     </p:extLst>
   </p:cSld>
@@ -2828,7 +2916,7 @@
             </a:r>
             <a:r>
               <a:rPr lang="en-GB" dirty="0" err="1"/>
-              <a:t>competenties</a:t>
+              <a:t>karaktereigenschap</a:t>
             </a:r>
             <a:r>
               <a:rPr lang="en-GB" dirty="0"/>
@@ -2836,7 +2924,7 @@
             </a:r>
             <a:r>
               <a:rPr lang="en-GB" dirty="0" err="1"/>
-              <a:t>oordeelsvorming</a:t>
+              <a:t>nieuwsgierig</a:t>
             </a:r>
             <a:r>
               <a:rPr lang="en-GB" dirty="0"/>
@@ -2863,7 +2951,7 @@
           <a:p>
             <a:fld id="{00E1BD4A-1F92-B644-A197-6FBAF79CDEE2}" type="slidenum">
               <a:rPr lang="en-NL" smtClean="0"/>
-              <a:t>51</a:t>
+              <a:t>49</a:t>
             </a:fld>
             <a:endParaRPr lang="en-NL"/>
           </a:p>
@@ -2872,7 +2960,7 @@
     </p:spTree>
     <p:extLst>
       <p:ext uri="{BB962C8B-B14F-4D97-AF65-F5344CB8AC3E}">
-        <p14:creationId xmlns:p14="http://schemas.microsoft.com/office/powerpoint/2010/main" val="220183043"/>
+        <p14:creationId xmlns:p14="http://schemas.microsoft.com/office/powerpoint/2010/main" val="2764681039"/>
       </p:ext>
     </p:extLst>
   </p:cSld>
@@ -2940,47 +3028,27 @@
             </a:r>
             <a:r>
               <a:rPr lang="en-GB" dirty="0" err="1"/>
-              <a:t>nl.wikipedia.org</a:t>
+              <a:t>competentiesvoorbeelden.nl</a:t>
             </a:r>
             <a:r>
               <a:rPr lang="en-GB" dirty="0"/>
-              <a:t>/wiki/</a:t>
+              <a:t>/</a:t>
             </a:r>
             <a:r>
               <a:rPr lang="en-GB" dirty="0" err="1"/>
-              <a:t>Perspectief</a:t>
+              <a:t>competenties</a:t>
             </a:r>
             <a:r>
               <a:rPr lang="en-GB" dirty="0"/>
-              <a:t>_(</a:t>
+              <a:t>/</a:t>
             </a:r>
             <a:r>
               <a:rPr lang="en-GB" dirty="0" err="1"/>
-              <a:t>cognitief</a:t>
+              <a:t>oordeelsvorming</a:t>
             </a:r>
             <a:r>
               <a:rPr lang="en-GB" dirty="0"/>
-              <a:t>) – </a:t>
-            </a:r>
-            <a:r>
-              <a:rPr lang="en-GB" dirty="0" err="1"/>
-              <a:t>bewerkt</a:t>
-            </a:r>
-            <a:r>
-              <a:rPr lang="en-GB" dirty="0"/>
-              <a:t> tot (</a:t>
-            </a:r>
-            <a:r>
-              <a:rPr lang="en-GB" dirty="0" err="1"/>
-              <a:t>positieve</a:t>
-            </a:r>
-            <a:r>
-              <a:rPr lang="en-GB" dirty="0"/>
-              <a:t>) </a:t>
-            </a:r>
-            <a:r>
-              <a:rPr lang="en-GB" dirty="0" err="1"/>
-              <a:t>competentie</a:t>
+              <a:t>/</a:t>
             </a:r>
             <a:endParaRPr lang="en-NL" dirty="0"/>
           </a:p>
@@ -3003,7 +3071,7 @@
           <a:p>
             <a:fld id="{00E1BD4A-1F92-B644-A197-6FBAF79CDEE2}" type="slidenum">
               <a:rPr lang="en-NL" smtClean="0"/>
-              <a:t>53</a:t>
+              <a:t>51</a:t>
             </a:fld>
             <a:endParaRPr lang="en-NL"/>
           </a:p>
@@ -3012,7 +3080,7 @@
     </p:spTree>
     <p:extLst>
       <p:ext uri="{BB962C8B-B14F-4D97-AF65-F5344CB8AC3E}">
-        <p14:creationId xmlns:p14="http://schemas.microsoft.com/office/powerpoint/2010/main" val="1416272564"/>
+        <p14:creationId xmlns:p14="http://schemas.microsoft.com/office/powerpoint/2010/main" val="220183043"/>
       </p:ext>
     </p:extLst>
   </p:cSld>
@@ -3080,27 +3148,47 @@
             </a:r>
             <a:r>
               <a:rPr lang="en-GB" dirty="0" err="1"/>
-              <a:t>competentiesvoorbeelden.nl</a:t>
+              <a:t>nl.wikipedia.org</a:t>
             </a:r>
             <a:r>
               <a:rPr lang="en-GB" dirty="0"/>
-              <a:t>/</a:t>
+              <a:t>/wiki/</a:t>
             </a:r>
             <a:r>
               <a:rPr lang="en-GB" dirty="0" err="1"/>
-              <a:t>karaktereigenschap</a:t>
+              <a:t>Perspectief</a:t>
             </a:r>
             <a:r>
               <a:rPr lang="en-GB" dirty="0"/>
-              <a:t>/</a:t>
+              <a:t>_(</a:t>
             </a:r>
             <a:r>
               <a:rPr lang="en-GB" dirty="0" err="1"/>
-              <a:t>enthousiast</a:t>
+              <a:t>cognitief</a:t>
             </a:r>
             <a:r>
               <a:rPr lang="en-GB" dirty="0"/>
-              <a:t>/</a:t>
+              <a:t>) – </a:t>
+            </a:r>
+            <a:r>
+              <a:rPr lang="en-GB" dirty="0" err="1"/>
+              <a:t>bewerkt</a:t>
+            </a:r>
+            <a:r>
+              <a:rPr lang="en-GB" dirty="0"/>
+              <a:t> tot (</a:t>
+            </a:r>
+            <a:r>
+              <a:rPr lang="en-GB" dirty="0" err="1"/>
+              <a:t>positieve</a:t>
+            </a:r>
+            <a:r>
+              <a:rPr lang="en-GB" dirty="0"/>
+              <a:t>) </a:t>
+            </a:r>
+            <a:r>
+              <a:rPr lang="en-GB" dirty="0" err="1"/>
+              <a:t>competentie</a:t>
             </a:r>
             <a:endParaRPr lang="en-NL" dirty="0"/>
           </a:p>
@@ -3123,7 +3211,7 @@
           <a:p>
             <a:fld id="{00E1BD4A-1F92-B644-A197-6FBAF79CDEE2}" type="slidenum">
               <a:rPr lang="en-NL" smtClean="0"/>
-              <a:t>55</a:t>
+              <a:t>53</a:t>
             </a:fld>
             <a:endParaRPr lang="en-NL"/>
           </a:p>
@@ -3132,7 +3220,7 @@
     </p:spTree>
     <p:extLst>
       <p:ext uri="{BB962C8B-B14F-4D97-AF65-F5344CB8AC3E}">
-        <p14:creationId xmlns:p14="http://schemas.microsoft.com/office/powerpoint/2010/main" val="2340544741"/>
+        <p14:creationId xmlns:p14="http://schemas.microsoft.com/office/powerpoint/2010/main" val="1416272564"/>
       </p:ext>
     </p:extLst>
   </p:cSld>
@@ -3188,11 +3276,11 @@
           <a:p>
             <a:r>
               <a:rPr lang="en-GB" dirty="0"/>
-              <a:t>S</a:t>
+              <a:t>B</a:t>
             </a:r>
             <a:r>
               <a:rPr lang="en-NL" dirty="0"/>
-              <a:t>ource </a:t>
+              <a:t>ron: </a:t>
             </a:r>
             <a:r>
               <a:rPr lang="en-GB" dirty="0"/>
@@ -3200,11 +3288,27 @@
             </a:r>
             <a:r>
               <a:rPr lang="en-GB" dirty="0" err="1"/>
-              <a:t>nl.wikipedia.org</a:t>
+              <a:t>competentiesvoorbeelden.nl</a:t>
             </a:r>
             <a:r>
               <a:rPr lang="en-GB" dirty="0"/>
-              <a:t>/wiki/Hoop</a:t>
+              <a:t>/</a:t>
+            </a:r>
+            <a:r>
+              <a:rPr lang="en-GB" dirty="0" err="1"/>
+              <a:t>karaktereigenschap</a:t>
+            </a:r>
+            <a:r>
+              <a:rPr lang="en-GB" dirty="0"/>
+              <a:t>/</a:t>
+            </a:r>
+            <a:r>
+              <a:rPr lang="en-GB" dirty="0" err="1"/>
+              <a:t>enthousiast</a:t>
+            </a:r>
+            <a:r>
+              <a:rPr lang="en-GB" dirty="0"/>
+              <a:t>/</a:t>
             </a:r>
             <a:endParaRPr lang="en-NL" dirty="0"/>
           </a:p>
@@ -3227,7 +3331,7 @@
           <a:p>
             <a:fld id="{00E1BD4A-1F92-B644-A197-6FBAF79CDEE2}" type="slidenum">
               <a:rPr lang="en-NL" smtClean="0"/>
-              <a:t>57</a:t>
+              <a:t>55</a:t>
             </a:fld>
             <a:endParaRPr lang="en-NL"/>
           </a:p>
@@ -3236,7 +3340,7 @@
     </p:spTree>
     <p:extLst>
       <p:ext uri="{BB962C8B-B14F-4D97-AF65-F5344CB8AC3E}">
-        <p14:creationId xmlns:p14="http://schemas.microsoft.com/office/powerpoint/2010/main" val="1880268986"/>
+        <p14:creationId xmlns:p14="http://schemas.microsoft.com/office/powerpoint/2010/main" val="2340544741"/>
       </p:ext>
     </p:extLst>
   </p:cSld>
@@ -3292,11 +3396,11 @@
           <a:p>
             <a:r>
               <a:rPr lang="en-GB" dirty="0"/>
-              <a:t>B</a:t>
+              <a:t>S</a:t>
             </a:r>
             <a:r>
               <a:rPr lang="en-NL" dirty="0"/>
-              <a:t>ron: </a:t>
+              <a:t>ource </a:t>
             </a:r>
             <a:r>
               <a:rPr lang="en-GB" dirty="0"/>
@@ -3304,27 +3408,11 @@
             </a:r>
             <a:r>
               <a:rPr lang="en-GB" dirty="0" err="1"/>
-              <a:t>competentiesvoorbeelden.nl</a:t>
+              <a:t>nl.wikipedia.org</a:t>
             </a:r>
             <a:r>
               <a:rPr lang="en-GB" dirty="0"/>
-              <a:t>/</a:t>
-            </a:r>
-            <a:r>
-              <a:rPr lang="en-GB" dirty="0" err="1"/>
-              <a:t>vaardigheden</a:t>
-            </a:r>
-            <a:r>
-              <a:rPr lang="en-GB" dirty="0"/>
-              <a:t>/</a:t>
-            </a:r>
-            <a:r>
-              <a:rPr lang="en-GB" dirty="0" err="1"/>
-              <a:t>gevoel-voor-humor</a:t>
-            </a:r>
-            <a:r>
-              <a:rPr lang="en-GB" dirty="0"/>
-              <a:t>/</a:t>
+              <a:t>/wiki/Hoop</a:t>
             </a:r>
             <a:endParaRPr lang="en-NL" dirty="0"/>
           </a:p>
@@ -3347,7 +3435,7 @@
           <a:p>
             <a:fld id="{00E1BD4A-1F92-B644-A197-6FBAF79CDEE2}" type="slidenum">
               <a:rPr lang="en-NL" smtClean="0"/>
-              <a:t>59</a:t>
+              <a:t>57</a:t>
             </a:fld>
             <a:endParaRPr lang="en-NL"/>
           </a:p>
@@ -3356,7 +3444,7 @@
     </p:spTree>
     <p:extLst>
       <p:ext uri="{BB962C8B-B14F-4D97-AF65-F5344CB8AC3E}">
-        <p14:creationId xmlns:p14="http://schemas.microsoft.com/office/powerpoint/2010/main" val="1347279096"/>
+        <p14:creationId xmlns:p14="http://schemas.microsoft.com/office/powerpoint/2010/main" val="1880268986"/>
       </p:ext>
     </p:extLst>
   </p:cSld>
@@ -3424,15 +3512,27 @@
             </a:r>
             <a:r>
               <a:rPr lang="en-GB" dirty="0" err="1"/>
-              <a:t>nl.wikipedia.org</a:t>
+              <a:t>competentiesvoorbeelden.nl</a:t>
             </a:r>
             <a:r>
               <a:rPr lang="en-GB" dirty="0"/>
-              <a:t>/wiki/</a:t>
+              <a:t>/</a:t>
             </a:r>
             <a:r>
               <a:rPr lang="en-GB" dirty="0" err="1"/>
-              <a:t>Schoonheid</a:t>
+              <a:t>vaardigheden</a:t>
+            </a:r>
+            <a:r>
+              <a:rPr lang="en-GB" dirty="0"/>
+              <a:t>/</a:t>
+            </a:r>
+            <a:r>
+              <a:rPr lang="en-GB" dirty="0" err="1"/>
+              <a:t>gevoel-voor-humor</a:t>
+            </a:r>
+            <a:r>
+              <a:rPr lang="en-GB" dirty="0"/>
+              <a:t>/</a:t>
             </a:r>
             <a:endParaRPr lang="en-NL" dirty="0"/>
           </a:p>
@@ -3455,7 +3555,7 @@
           <a:p>
             <a:fld id="{00E1BD4A-1F92-B644-A197-6FBAF79CDEE2}" type="slidenum">
               <a:rPr lang="en-NL" smtClean="0"/>
-              <a:t>61</a:t>
+              <a:t>59</a:t>
             </a:fld>
             <a:endParaRPr lang="en-NL"/>
           </a:p>
@@ -3464,7 +3564,7 @@
     </p:spTree>
     <p:extLst>
       <p:ext uri="{BB962C8B-B14F-4D97-AF65-F5344CB8AC3E}">
-        <p14:creationId xmlns:p14="http://schemas.microsoft.com/office/powerpoint/2010/main" val="3590136801"/>
+        <p14:creationId xmlns:p14="http://schemas.microsoft.com/office/powerpoint/2010/main" val="1347279096"/>
       </p:ext>
     </p:extLst>
   </p:cSld>
@@ -10851,8 +10951,8 @@
           </a:lstStyle>
           <a:p>
             <a:r>
-              <a:rPr lang="en-GB" dirty="0"/>
-              <a:t>V 1.2beta</a:t>
+              <a:rPr lang="en-GB"/>
+              <a:t>V 1.4</a:t>
             </a:r>
             <a:endParaRPr lang="en-NL" dirty="0"/>
           </a:p>
@@ -13848,8 +13948,8 @@
           <a:lstStyle/>
           <a:p>
             <a:r>
-              <a:rPr lang="en-GB" dirty="0"/>
-              <a:t>V 1.2beta</a:t>
+              <a:rPr lang="en-GB"/>
+              <a:t>V 1.4</a:t>
             </a:r>
             <a:endParaRPr lang="en-NL" dirty="0"/>
           </a:p>
@@ -15392,8 +15492,8 @@
           <a:lstStyle/>
           <a:p>
             <a:r>
-              <a:rPr lang="en-GB" dirty="0"/>
-              <a:t>V 1.2beta</a:t>
+              <a:rPr lang="en-GB"/>
+              <a:t>V 1.4</a:t>
             </a:r>
             <a:endParaRPr lang="en-NL" dirty="0"/>
           </a:p>
@@ -15844,8 +15944,8 @@
           <a:lstStyle/>
           <a:p>
             <a:r>
-              <a:rPr lang="en-GB" dirty="0"/>
-              <a:t>V 1.2beta</a:t>
+              <a:rPr lang="en-GB"/>
+              <a:t>V 1.4</a:t>
             </a:r>
             <a:endParaRPr lang="en-NL" dirty="0"/>
           </a:p>
@@ -19525,7 +19625,7 @@
           <a:p>
             <a:r>
               <a:rPr lang="en-GB"/>
-              <a:t>V 1.2beta</a:t>
+              <a:t>V 1.4</a:t>
             </a:r>
             <a:endParaRPr lang="en-NL" dirty="0"/>
           </a:p>
@@ -22148,7 +22248,7 @@
           <a:p>
             <a:r>
               <a:rPr lang="en-GB"/>
-              <a:t>V 1.2beta</a:t>
+              <a:t>V 1.4</a:t>
             </a:r>
             <a:endParaRPr lang="en-NL" dirty="0"/>
           </a:p>
@@ -23073,13 +23173,8 @@
           <a:p>
             <a:r>
               <a:rPr lang="en-NL" dirty="0"/>
-              <a:t>Schwartz </a:t>
-            </a:r>
-            <a:r>
-              <a:rPr lang="en-NL"/>
-              <a:t>Basiswaarden Clusters</a:t>
-            </a:r>
-            <a:endParaRPr lang="en-NL" dirty="0"/>
+              <a:t>Schwartz Basiswaarden</a:t>
+            </a:r>
           </a:p>
         </p:txBody>
       </p:sp>
@@ -24336,7 +24431,7 @@
 </file>
 
 <file path=ppt/slides/slide4.xml><?xml version="1.0" encoding="utf-8"?>
-<p:sld xmlns:a="http://schemas.openxmlformats.org/drawingml/2006/main" xmlns:r="http://schemas.openxmlformats.org/officeDocument/2006/relationships" xmlns:p="http://schemas.openxmlformats.org/presentationml/2006/main">
+<p:sld xmlns:a="http://schemas.openxmlformats.org/drawingml/2006/main" xmlns:r="http://schemas.openxmlformats.org/officeDocument/2006/relationships" xmlns:p="http://schemas.openxmlformats.org/presentationml/2006/main" show="0">
   <p:cSld>
     <p:spTree>
       <p:nvGrpSpPr>
@@ -24375,7 +24470,7 @@
           <a:p>
             <a:r>
               <a:rPr lang="en-GB"/>
-              <a:t>V 1.2beta</a:t>
+              <a:t>V 1.4</a:t>
             </a:r>
             <a:endParaRPr lang="en-NL" dirty="0"/>
           </a:p>
@@ -25608,7 +25703,7 @@
 </file>
 
 <file path=ppt/slides/slide5.xml><?xml version="1.0" encoding="utf-8"?>
-<p:sld xmlns:a="http://schemas.openxmlformats.org/drawingml/2006/main" xmlns:r="http://schemas.openxmlformats.org/officeDocument/2006/relationships" xmlns:p="http://schemas.openxmlformats.org/presentationml/2006/main" show="0">
+<p:sld xmlns:a="http://schemas.openxmlformats.org/drawingml/2006/main" xmlns:r="http://schemas.openxmlformats.org/officeDocument/2006/relationships" xmlns:p="http://schemas.openxmlformats.org/presentationml/2006/main">
   <p:cSld>
     <p:spTree>
       <p:nvGrpSpPr>
@@ -25646,10 +25741,18 @@
           <a:lstStyle/>
           <a:p>
             <a:r>
-              <a:rPr lang="en-NL" sz="4400" dirty="0">
-                <a:latin typeface="Ubuntu" panose="020B0504030602030204" pitchFamily="34" charset="0"/>
-              </a:rPr>
-              <a:t>Hier korte introductie Basiswaarden theorie invoegen!</a:t>
+              <a:rPr lang="en-NL" sz="2000" dirty="0">
+                <a:latin typeface="Ubuntu" panose="020B0504030602030204" pitchFamily="34" charset="0"/>
+              </a:rPr>
+              <a:t>De tien Menselijke Basiswaarden van Schwartz en de daaruit volgende clusters zijn gebaseerd op een evolutionair fundament: 1. biologische behoeften, 2. behoefte om samen te werken en 3. behoefte aan groepsvorming om te overleven en groeien. </a:t>
+            </a:r>
+          </a:p>
+          <a:p>
+            <a:r>
+              <a:rPr lang="en-NL" sz="2000" dirty="0">
+                <a:latin typeface="Ubuntu" panose="020B0504030602030204" pitchFamily="34" charset="0"/>
+              </a:rPr>
+              <a:t>Elk individu heeft alle waarden, maar elk individu heeft een eigen hiërarchie. De persoonlijke hiërarchie wordt beinvloed door de cultuur waarin iemand leeft. Hoe belangrijker een waarde is voor een persoon, hoe meer deze gemotiveerd is om het doel dat de waarde vertegenwoordigt te bereiken.</a:t>
             </a:r>
           </a:p>
         </p:txBody>

</xml_diff>

<commit_message>
Typfout er uit (dankzij tip Louis Reijersen van Buuren, dank) "gedachtenen -> gedachten en". Dus versienummer naar 1.4.1
</commit_message>
<xml_diff>
--- a/Schwartz Basis Menselijke Waarden.pptx
+++ b/Schwartz Basis Menselijke Waarden.pptx
@@ -427,7 +427,7 @@
           <a:p>
             <a:fld id="{B9481728-54D7-DB43-9E8B-7CD2285FE0B2}" type="datetimeFigureOut">
               <a:rPr lang="en-NL" smtClean="0"/>
-              <a:t>24/08/2024</a:t>
+              <a:t>26/08/2024</a:t>
             </a:fld>
             <a:endParaRPr lang="en-NL"/>
           </a:p>
@@ -10952,7 +10952,7 @@
           <a:p>
             <a:r>
               <a:rPr lang="en-GB"/>
-              <a:t>V 1.4</a:t>
+              <a:t>V 1.4.1</a:t>
             </a:r>
             <a:endParaRPr lang="en-NL" dirty="0"/>
           </a:p>
@@ -13949,7 +13949,7 @@
           <a:p>
             <a:r>
               <a:rPr lang="en-GB"/>
-              <a:t>V 1.4</a:t>
+              <a:t>V 1.4.1</a:t>
             </a:r>
             <a:endParaRPr lang="en-NL" dirty="0"/>
           </a:p>
@@ -14651,6 +14651,22 @@
   <p:clrMapOvr>
     <a:masterClrMapping/>
   </p:clrMapOvr>
+  <p:extLst>
+    <p:ext uri="{DCECCB84-F9BA-43D5-87BE-67443E8EF086}">
+      <p15:sldGuideLst xmlns:p15="http://schemas.microsoft.com/office/powerpoint/2012/main">
+        <p15:guide id="1" orient="horz" pos="1746" userDrawn="1">
+          <p15:clr>
+            <a:srgbClr val="FBAE40"/>
+          </p15:clr>
+        </p15:guide>
+        <p15:guide id="2" pos="2449" userDrawn="1">
+          <p15:clr>
+            <a:srgbClr val="FBAE40"/>
+          </p15:clr>
+        </p15:guide>
+      </p15:sldGuideLst>
+    </p:ext>
+  </p:extLst>
 </p:sldLayout>
 </file>
 
@@ -15493,7 +15509,7 @@
           <a:p>
             <a:r>
               <a:rPr lang="en-GB"/>
-              <a:t>V 1.4</a:t>
+              <a:t>V 1.4.1</a:t>
             </a:r>
             <a:endParaRPr lang="en-NL" dirty="0"/>
           </a:p>
@@ -15945,7 +15961,7 @@
           <a:p>
             <a:r>
               <a:rPr lang="en-GB"/>
-              <a:t>V 1.4</a:t>
+              <a:t>V 1.4.1</a:t>
             </a:r>
             <a:endParaRPr lang="en-NL" dirty="0"/>
           </a:p>
@@ -19625,7 +19641,7 @@
           <a:p>
             <a:r>
               <a:rPr lang="en-GB"/>
-              <a:t>V 1.4</a:t>
+              <a:t>V 1.4.1</a:t>
             </a:r>
             <a:endParaRPr lang="en-NL" dirty="0"/>
           </a:p>
@@ -21586,7 +21602,7 @@
           <a:p>
             <a:r>
               <a:rPr lang="en-NL" sz="4000" dirty="0"/>
-              <a:t>Autonomie van gedachtenen acties. </a:t>
+              <a:t>Autonomie van gedachten en acties. </a:t>
             </a:r>
           </a:p>
           <a:p>
@@ -21846,7 +21862,7 @@
           <a:p>
             <a:r>
               <a:rPr lang="nl-NL" sz="3600" dirty="0"/>
-              <a:t>Houden aan sociale normen/ verwachtingen en voorkeur stabiliteit en veiligheid zelf en naasten</a:t>
+              <a:t>Houden aan sociale normen/ verwachtingen. Voorkeur stabiliteit en veiligheid zelf en naasten</a:t>
             </a:r>
             <a:endParaRPr lang="en-NL" sz="3600" dirty="0"/>
           </a:p>
@@ -22248,7 +22264,7 @@
           <a:p>
             <a:r>
               <a:rPr lang="en-GB"/>
-              <a:t>V 1.4</a:t>
+              <a:t>V 1.4.1</a:t>
             </a:r>
             <a:endParaRPr lang="en-NL" dirty="0"/>
           </a:p>
@@ -24470,7 +24486,7 @@
           <a:p>
             <a:r>
               <a:rPr lang="en-GB"/>
-              <a:t>V 1.4</a:t>
+              <a:t>V 1.4.1</a:t>
             </a:r>
             <a:endParaRPr lang="en-NL" dirty="0"/>
           </a:p>

</xml_diff>

<commit_message>
Nog een typo, in de instructies 2x 'warden' gecorrigeerd naar 'waarden' - v1.4.2
</commit_message>
<xml_diff>
--- a/Schwartz Basis Menselijke Waarden.pptx
+++ b/Schwartz Basis Menselijke Waarden.pptx
@@ -10952,7 +10952,7 @@
           <a:p>
             <a:r>
               <a:rPr lang="en-GB"/>
-              <a:t>V 1.4.1</a:t>
+              <a:t>V 1.4.2</a:t>
             </a:r>
             <a:endParaRPr lang="en-NL" dirty="0"/>
           </a:p>
@@ -13949,7 +13949,7 @@
           <a:p>
             <a:r>
               <a:rPr lang="en-GB"/>
-              <a:t>V 1.4.1</a:t>
+              <a:t>V 1.4.2</a:t>
             </a:r>
             <a:endParaRPr lang="en-NL" dirty="0"/>
           </a:p>
@@ -15509,7 +15509,7 @@
           <a:p>
             <a:r>
               <a:rPr lang="en-GB"/>
-              <a:t>V 1.4.1</a:t>
+              <a:t>V 1.4.2</a:t>
             </a:r>
             <a:endParaRPr lang="en-NL" dirty="0"/>
           </a:p>
@@ -15961,7 +15961,7 @@
           <a:p>
             <a:r>
               <a:rPr lang="en-GB"/>
-              <a:t>V 1.4.1</a:t>
+              <a:t>V 1.4.2</a:t>
             </a:r>
             <a:endParaRPr lang="en-NL" dirty="0"/>
           </a:p>
@@ -19641,7 +19641,7 @@
           <a:p>
             <a:r>
               <a:rPr lang="en-GB"/>
-              <a:t>V 1.4.1</a:t>
+              <a:t>V 1.4.2</a:t>
             </a:r>
             <a:endParaRPr lang="en-NL" dirty="0"/>
           </a:p>
@@ -22212,7 +22212,15 @@
             </a:r>
             <a:r>
               <a:rPr lang="en-GB" dirty="0"/>
-              <a:t> warden </a:t>
+              <a:t> </a:t>
+            </a:r>
+            <a:r>
+              <a:rPr lang="en-GB" dirty="0" err="1"/>
+              <a:t>waarden</a:t>
+            </a:r>
+            <a:r>
+              <a:rPr lang="en-GB" dirty="0"/>
+              <a:t> </a:t>
             </a:r>
             <a:r>
               <a:rPr lang="en-GB" dirty="0" err="1"/>
@@ -22220,7 +22228,15 @@
             </a:r>
             <a:r>
               <a:rPr lang="en-GB" dirty="0"/>
-              <a:t> de warden van de </a:t>
+              <a:t> de </a:t>
+            </a:r>
+            <a:r>
+              <a:rPr lang="en-GB" dirty="0" err="1"/>
+              <a:t>waarden</a:t>
+            </a:r>
+            <a:r>
+              <a:rPr lang="en-GB" dirty="0"/>
+              <a:t> van de </a:t>
             </a:r>
             <a:r>
               <a:rPr lang="en-GB" dirty="0" err="1"/>
@@ -22264,7 +22280,7 @@
           <a:p>
             <a:r>
               <a:rPr lang="en-GB"/>
-              <a:t>V 1.4.1</a:t>
+              <a:t>V 1.4.2</a:t>
             </a:r>
             <a:endParaRPr lang="en-NL" dirty="0"/>
           </a:p>
@@ -24486,7 +24502,7 @@
           <a:p>
             <a:r>
               <a:rPr lang="en-GB"/>
-              <a:t>V 1.4.1</a:t>
+              <a:t>V 1.4.2</a:t>
             </a:r>
             <a:endParaRPr lang="en-NL" dirty="0"/>
           </a:p>

</xml_diff>

<commit_message>
Openstaan is 1 woord in het nederlands! bron: https://www.onzetaal.nl/taalloket/openstaan
</commit_message>
<xml_diff>
--- a/Schwartz Basis Menselijke Waarden.pptx
+++ b/Schwartz Basis Menselijke Waarden.pptx
@@ -427,7 +427,7 @@
           <a:p>
             <a:fld id="{B9481728-54D7-DB43-9E8B-7CD2285FE0B2}" type="datetimeFigureOut">
               <a:rPr lang="en-NL" smtClean="0"/>
-              <a:t>26/08/2024</a:t>
+              <a:t>28/08/2024</a:t>
             </a:fld>
             <a:endParaRPr lang="en-NL"/>
           </a:p>
@@ -10952,7 +10952,7 @@
           <a:p>
             <a:r>
               <a:rPr lang="en-GB"/>
-              <a:t>V 1.4.2</a:t>
+              <a:t>V 1.4.3</a:t>
             </a:r>
             <a:endParaRPr lang="en-NL" dirty="0"/>
           </a:p>
@@ -13949,7 +13949,7 @@
           <a:p>
             <a:r>
               <a:rPr lang="en-GB"/>
-              <a:t>V 1.4.2</a:t>
+              <a:t>V 1.4.3</a:t>
             </a:r>
             <a:endParaRPr lang="en-NL" dirty="0"/>
           </a:p>
@@ -15509,7 +15509,7 @@
           <a:p>
             <a:r>
               <a:rPr lang="en-GB"/>
-              <a:t>V 1.4.2</a:t>
+              <a:t>V 1.4.3</a:t>
             </a:r>
             <a:endParaRPr lang="en-NL" dirty="0"/>
           </a:p>
@@ -15961,7 +15961,7 @@
           <a:p>
             <a:r>
               <a:rPr lang="en-GB"/>
-              <a:t>V 1.4.2</a:t>
+              <a:t>V 1.4.3</a:t>
             </a:r>
             <a:endParaRPr lang="en-NL" dirty="0"/>
           </a:p>
@@ -19641,7 +19641,7 @@
           <a:p>
             <a:r>
               <a:rPr lang="en-GB"/>
-              <a:t>V 1.4.2</a:t>
+              <a:t>V 1.4.3</a:t>
             </a:r>
             <a:endParaRPr lang="en-NL" dirty="0"/>
           </a:p>
@@ -22280,7 +22280,7 @@
           <a:p>
             <a:r>
               <a:rPr lang="en-GB"/>
-              <a:t>V 1.4.2</a:t>
+              <a:t>V 1.4.3</a:t>
             </a:r>
             <a:endParaRPr lang="en-NL" dirty="0"/>
           </a:p>
@@ -24502,7 +24502,7 @@
           <a:p>
             <a:r>
               <a:rPr lang="en-GB"/>
-              <a:t>V 1.4.2</a:t>
+              <a:t>V 1.4.3</a:t>
             </a:r>
             <a:endParaRPr lang="en-NL" dirty="0"/>
           </a:p>
@@ -27475,7 +27475,7 @@
           <a:p>
             <a:r>
               <a:rPr lang="en-NL" dirty="0"/>
-              <a:t>Open staan</a:t>
+              <a:t>Openstaan</a:t>
             </a:r>
           </a:p>
           <a:p>
@@ -29107,7 +29107,7 @@
           <a:p>
             <a:r>
               <a:rPr lang="en-NL" dirty="0"/>
-              <a:t>Open Staan</a:t>
+              <a:t>OpenStaan</a:t>
             </a:r>
           </a:p>
           <a:p>

</xml_diff>

<commit_message>
In de detail waarde kaarten nu prestatie gebruikt ipv succes. Dit was inconsistent met de rest van de inhoud. Daarmee versie naar 1.5
</commit_message>
<xml_diff>
--- a/Schwartz Basis Menselijke Waarden.pptx
+++ b/Schwartz Basis Menselijke Waarden.pptx
@@ -427,7 +427,7 @@
           <a:p>
             <a:fld id="{B9481728-54D7-DB43-9E8B-7CD2285FE0B2}" type="datetimeFigureOut">
               <a:rPr lang="en-NL" smtClean="0"/>
-              <a:t>28/08/2024</a:t>
+              <a:t>29/08/2024</a:t>
             </a:fld>
             <a:endParaRPr lang="en-NL"/>
           </a:p>
@@ -10952,7 +10952,7 @@
           <a:p>
             <a:r>
               <a:rPr lang="en-GB"/>
-              <a:t>V 1.4.3</a:t>
+              <a:t>V 1.5</a:t>
             </a:r>
             <a:endParaRPr lang="en-NL" dirty="0"/>
           </a:p>
@@ -13949,7 +13949,7 @@
           <a:p>
             <a:r>
               <a:rPr lang="en-GB"/>
-              <a:t>V 1.4.3</a:t>
+              <a:t>V 1.5</a:t>
             </a:r>
             <a:endParaRPr lang="en-NL" dirty="0"/>
           </a:p>
@@ -15509,7 +15509,7 @@
           <a:p>
             <a:r>
               <a:rPr lang="en-GB"/>
-              <a:t>V 1.4.3</a:t>
+              <a:t>V 1.5</a:t>
             </a:r>
             <a:endParaRPr lang="en-NL" dirty="0"/>
           </a:p>
@@ -15961,7 +15961,7 @@
           <a:p>
             <a:r>
               <a:rPr lang="en-GB"/>
-              <a:t>V 1.4.3</a:t>
+              <a:t>V 1.5</a:t>
             </a:r>
             <a:endParaRPr lang="en-NL" dirty="0"/>
           </a:p>
@@ -19641,7 +19641,7 @@
           <a:p>
             <a:r>
               <a:rPr lang="en-GB"/>
-              <a:t>V 1.4.3</a:t>
+              <a:t>V 1.5</a:t>
             </a:r>
             <a:endParaRPr lang="en-NL" dirty="0"/>
           </a:p>
@@ -22280,7 +22280,7 @@
           <a:p>
             <a:r>
               <a:rPr lang="en-GB"/>
-              <a:t>V 1.4.3</a:t>
+              <a:t>V 1.5</a:t>
             </a:r>
             <a:endParaRPr lang="en-NL" dirty="0"/>
           </a:p>
@@ -22658,7 +22658,7 @@
           <a:p>
             <a:r>
               <a:rPr lang="en-NL" dirty="0"/>
-              <a:t>Succes</a:t>
+              <a:t>Prestatie</a:t>
             </a:r>
           </a:p>
         </p:txBody>
@@ -24502,7 +24502,7 @@
           <a:p>
             <a:r>
               <a:rPr lang="en-GB"/>
-              <a:t>V 1.4.3</a:t>
+              <a:t>V 1.5</a:t>
             </a:r>
             <a:endParaRPr lang="en-NL" dirty="0"/>
           </a:p>

</xml_diff>

<commit_message>
#3 - beschrijvingen basiskwadranten verbeterd
</commit_message>
<xml_diff>
--- a/Schwartz Basis Menselijke Waarden.pptx
+++ b/Schwartz Basis Menselijke Waarden.pptx
@@ -427,7 +427,7 @@
           <a:p>
             <a:fld id="{B9481728-54D7-DB43-9E8B-7CD2285FE0B2}" type="datetimeFigureOut">
               <a:rPr lang="en-NL" smtClean="0"/>
-              <a:t>29/08/2024</a:t>
+              <a:t>02/10/2024</a:t>
             </a:fld>
             <a:endParaRPr lang="en-NL"/>
           </a:p>
@@ -10952,7 +10952,7 @@
           <a:p>
             <a:r>
               <a:rPr lang="en-GB"/>
-              <a:t>V 1.5</a:t>
+              <a:t>V 1.6</a:t>
             </a:r>
             <a:endParaRPr lang="en-NL" dirty="0"/>
           </a:p>
@@ -13949,7 +13949,7 @@
           <a:p>
             <a:r>
               <a:rPr lang="en-GB"/>
-              <a:t>V 1.5</a:t>
+              <a:t>V 1.6</a:t>
             </a:r>
             <a:endParaRPr lang="en-NL" dirty="0"/>
           </a:p>
@@ -15509,7 +15509,7 @@
           <a:p>
             <a:r>
               <a:rPr lang="en-GB"/>
-              <a:t>V 1.5</a:t>
+              <a:t>V 1.6</a:t>
             </a:r>
             <a:endParaRPr lang="en-NL" dirty="0"/>
           </a:p>
@@ -15961,7 +15961,7 @@
           <a:p>
             <a:r>
               <a:rPr lang="en-GB"/>
-              <a:t>V 1.5</a:t>
+              <a:t>V 1.6</a:t>
             </a:r>
             <a:endParaRPr lang="en-NL" dirty="0"/>
           </a:p>
@@ -19641,7 +19641,7 @@
           <a:p>
             <a:r>
               <a:rPr lang="en-GB"/>
-              <a:t>V 1.5</a:t>
+              <a:t>V 1.6</a:t>
             </a:r>
             <a:endParaRPr lang="en-NL" dirty="0"/>
           </a:p>
@@ -21543,8 +21543,34 @@
           <a:lstStyle/>
           <a:p>
             <a:r>
-              <a:rPr lang="en-NL" dirty="0"/>
-              <a:t>Conflicteert met Conservatisme en bevat de waarden zelfsturing en stimulatie, maar deelt hedonimse met zelfoptimalisatie.</a:t>
+              <a:rPr lang="en-NL" sz="4000" dirty="0"/>
+              <a:t>Openstaan voor </a:t>
+            </a:r>
+          </a:p>
+          <a:p>
+            <a:r>
+              <a:rPr lang="en-NL" sz="4000" dirty="0"/>
+              <a:t>nieuwe ervaringen. </a:t>
+            </a:r>
+          </a:p>
+          <a:p>
+            <a:r>
+              <a:rPr lang="en-NL" sz="4000" dirty="0"/>
+              <a:t>Bevat de waarden Zelfsturing en Stimulatie, en </a:t>
+            </a:r>
+            <a:r>
+              <a:rPr lang="en-NL" sz="4000"/>
+              <a:t>deels Hedonisme</a:t>
+            </a:r>
+            <a:r>
+              <a:rPr lang="en-NL" sz="4000" dirty="0"/>
+              <a:t>.</a:t>
+            </a:r>
+          </a:p>
+          <a:p>
+            <a:r>
+              <a:rPr lang="en-NL" sz="4000" dirty="0"/>
+              <a:t>Conflicteert met Conservatisme.</a:t>
             </a:r>
           </a:p>
         </p:txBody>
@@ -21672,7 +21698,19 @@
           <a:p>
             <a:r>
               <a:rPr lang="en-NL" dirty="0"/>
-              <a:t>Conflicteert met Zelfoptimalisatie. Bevat de waarden Welwillendheid en Universalisme.</a:t>
+              <a:t>Zorg voor anderen.</a:t>
+            </a:r>
+          </a:p>
+          <a:p>
+            <a:r>
+              <a:rPr lang="en-NL" dirty="0"/>
+              <a:t>Bevat de waarden Welwillendheid en Universalisme.</a:t>
+            </a:r>
+          </a:p>
+          <a:p>
+            <a:r>
+              <a:rPr lang="en-NL" dirty="0"/>
+              <a:t>Conflicteert met Zelfoptimalisatie.</a:t>
             </a:r>
           </a:p>
         </p:txBody>
@@ -21797,8 +21835,26 @@
           <a:lstStyle/>
           <a:p>
             <a:r>
-              <a:rPr lang="en-NL" dirty="0"/>
-              <a:t>Conflicteert met Openstaan voor verandering. Bevat de waarden Veiligheid, Conformiteit en Traditie.</a:t>
+              <a:rPr lang="en-NL" sz="4000" dirty="0"/>
+              <a:t>Behouden van de </a:t>
+            </a:r>
+          </a:p>
+          <a:p>
+            <a:r>
+              <a:rPr lang="en-NL" sz="4000" dirty="0"/>
+              <a:t>status quo.</a:t>
+            </a:r>
+          </a:p>
+          <a:p>
+            <a:r>
+              <a:rPr lang="en-NL" sz="4000" dirty="0"/>
+              <a:t>Bevat de waarden Veiligheid, Conformiteit en Traditie.</a:t>
+            </a:r>
+          </a:p>
+          <a:p>
+            <a:r>
+              <a:rPr lang="en-NL" sz="4000" dirty="0"/>
+              <a:t>Conflicteert met Openstaan voor verandering.</a:t>
             </a:r>
           </a:p>
         </p:txBody>
@@ -22280,7 +22336,7 @@
           <a:p>
             <a:r>
               <a:rPr lang="en-GB"/>
-              <a:t>V 1.5</a:t>
+              <a:t>V 1.6</a:t>
             </a:r>
             <a:endParaRPr lang="en-NL" dirty="0"/>
           </a:p>
@@ -22339,7 +22395,19 @@
           <a:p>
             <a:r>
               <a:rPr lang="en-NL" dirty="0"/>
-              <a:t>Conflicteert met Zelf-transcententie. Bevat de waarden Prestatie en Macht. Deelt Hedonisme met Openstaan voor verandering.</a:t>
+              <a:t>Nastreven van eigenbelang.</a:t>
+            </a:r>
+          </a:p>
+          <a:p>
+            <a:r>
+              <a:rPr lang="en-NL" dirty="0"/>
+              <a:t>Bevat de waarden Prestatie en Macht, en deels Hedonisme.</a:t>
+            </a:r>
+          </a:p>
+          <a:p>
+            <a:r>
+              <a:rPr lang="en-NL" dirty="0"/>
+              <a:t>Conflicteert met Zelf-transcententie.</a:t>
             </a:r>
           </a:p>
         </p:txBody>
@@ -24502,7 +24570,7 @@
           <a:p>
             <a:r>
               <a:rPr lang="en-GB"/>
-              <a:t>V 1.5</a:t>
+              <a:t>V 1.6</a:t>
             </a:r>
             <a:endParaRPr lang="en-NL" dirty="0"/>
           </a:p>
@@ -25784,7 +25852,7 @@
               <a:rPr lang="en-NL" sz="2000" dirty="0">
                 <a:latin typeface="Ubuntu" panose="020B0504030602030204" pitchFamily="34" charset="0"/>
               </a:rPr>
-              <a:t>Elk individu heeft alle waarden, maar elk individu heeft een eigen hiërarchie. De persoonlijke hiërarchie wordt beinvloed door de cultuur waarin iemand leeft. Hoe belangrijker een waarde is voor een persoon, hoe meer deze gemotiveerd is om het doel dat de waarde vertegenwoordigt te bereiken.</a:t>
+              <a:t>Elk individu heeft alle waarden, maar elk individu heeft een eigen hiërarchie. De persoonlijke hiërarchie wordt beïnvloed door de cultuur waarin iemand leeft. Hoe belangrijker een waarde is voor een persoon, hoe meer deze gemotiveerd is om het doel dat de waarde vertegenwoordigt te bereiken.</a:t>
             </a:r>
           </a:p>
         </p:txBody>

</xml_diff>

<commit_message>
Op basis van materiaal uit #1 de beschrijving van de basiswaarden aangescherpt met verwijzing naar cirumplex en assenstelsel.
</commit_message>
<xml_diff>
--- a/Schwartz Basis Menselijke Waarden.pptx
+++ b/Schwartz Basis Menselijke Waarden.pptx
@@ -115,16 +115,21 @@
       <p:regular r:id="rId98"/>
     </p:embeddedFont>
     <p:embeddedFont>
-      <p:font typeface="Ubuntu" panose="020B0504030602030204" pitchFamily="34" charset="0"/>
+      <p:font typeface="Roboto" pitchFamily="2" charset="0"/>
       <p:regular r:id="rId99"/>
       <p:bold r:id="rId100"/>
-      <p:italic r:id="rId101"/>
-      <p:boldItalic r:id="rId102"/>
+    </p:embeddedFont>
+    <p:embeddedFont>
+      <p:font typeface="Ubuntu" panose="020B0504030602030204" pitchFamily="34" charset="0"/>
+      <p:regular r:id="rId101"/>
+      <p:bold r:id="rId102"/>
+      <p:italic r:id="rId103"/>
+      <p:boldItalic r:id="rId104"/>
     </p:embeddedFont>
     <p:embeddedFont>
       <p:font typeface="Ubuntu Light" panose="020B0304030602030204" pitchFamily="34" charset="0"/>
-      <p:regular r:id="rId103"/>
-      <p:italic r:id="rId104"/>
+      <p:regular r:id="rId105"/>
+      <p:italic r:id="rId106"/>
     </p:embeddedFont>
   </p:embeddedFontLst>
   <p:defaultTextStyle>
@@ -840,15 +845,27 @@
             </a:r>
             <a:r>
               <a:rPr lang="en-GB" dirty="0" err="1"/>
-              <a:t>nl.wikipedia.org</a:t>
+              <a:t>competentiesvoorbeelden.nl</a:t>
             </a:r>
             <a:r>
               <a:rPr lang="en-GB" dirty="0"/>
-              <a:t>/wiki/</a:t>
+              <a:t>/</a:t>
             </a:r>
             <a:r>
               <a:rPr lang="en-GB" dirty="0" err="1"/>
-              <a:t>Schoonheid</a:t>
+              <a:t>vaardigheden</a:t>
+            </a:r>
+            <a:r>
+              <a:rPr lang="en-GB" dirty="0"/>
+              <a:t>/</a:t>
+            </a:r>
+            <a:r>
+              <a:rPr lang="en-GB" dirty="0" err="1"/>
+              <a:t>gevoel-voor-humor</a:t>
+            </a:r>
+            <a:r>
+              <a:rPr lang="en-GB" dirty="0"/>
+              <a:t>/</a:t>
             </a:r>
             <a:endParaRPr lang="en-NL" dirty="0"/>
           </a:p>
@@ -871,7 +888,7 @@
           <a:p>
             <a:fld id="{00E1BD4A-1F92-B644-A197-6FBAF79CDEE2}" type="slidenum">
               <a:rPr lang="en-NL" smtClean="0"/>
-              <a:t>61</a:t>
+              <a:t>59</a:t>
             </a:fld>
             <a:endParaRPr lang="en-NL"/>
           </a:p>
@@ -880,7 +897,7 @@
     </p:spTree>
     <p:extLst>
       <p:ext uri="{BB962C8B-B14F-4D97-AF65-F5344CB8AC3E}">
-        <p14:creationId xmlns:p14="http://schemas.microsoft.com/office/powerpoint/2010/main" val="3590136801"/>
+        <p14:creationId xmlns:p14="http://schemas.microsoft.com/office/powerpoint/2010/main" val="1347279096"/>
       </p:ext>
     </p:extLst>
   </p:cSld>
@@ -940,11 +957,11 @@
             </a:r>
             <a:r>
               <a:rPr lang="en-NL" dirty="0"/>
-              <a:t>ron:</a:t>
+              <a:t>ron: </a:t>
             </a:r>
             <a:r>
               <a:rPr lang="en-GB" dirty="0"/>
-              <a:t> https://</a:t>
+              <a:t>https://</a:t>
             </a:r>
             <a:r>
               <a:rPr lang="en-GB" dirty="0" err="1"/>
@@ -956,7 +973,7 @@
             </a:r>
             <a:r>
               <a:rPr lang="en-GB" dirty="0" err="1"/>
-              <a:t>Rechtvaardigheid</a:t>
+              <a:t>Schoonheid</a:t>
             </a:r>
             <a:endParaRPr lang="en-NL" dirty="0"/>
           </a:p>
@@ -979,7 +996,7 @@
           <a:p>
             <a:fld id="{00E1BD4A-1F92-B644-A197-6FBAF79CDEE2}" type="slidenum">
               <a:rPr lang="en-NL" smtClean="0"/>
-              <a:t>63</a:t>
+              <a:t>61</a:t>
             </a:fld>
             <a:endParaRPr lang="en-NL"/>
           </a:p>
@@ -988,7 +1005,7 @@
     </p:spTree>
     <p:extLst>
       <p:ext uri="{BB962C8B-B14F-4D97-AF65-F5344CB8AC3E}">
-        <p14:creationId xmlns:p14="http://schemas.microsoft.com/office/powerpoint/2010/main" val="1711670782"/>
+        <p14:creationId xmlns:p14="http://schemas.microsoft.com/office/powerpoint/2010/main" val="3590136801"/>
       </p:ext>
     </p:extLst>
   </p:cSld>
@@ -1048,35 +1065,23 @@
             </a:r>
             <a:r>
               <a:rPr lang="en-NL" dirty="0"/>
-              <a:t>ron: </a:t>
+              <a:t>ron:</a:t>
             </a:r>
             <a:r>
               <a:rPr lang="en-GB" dirty="0"/>
-              <a:t>https://</a:t>
+              <a:t> https://</a:t>
             </a:r>
             <a:r>
               <a:rPr lang="en-GB" dirty="0" err="1"/>
-              <a:t>competentiesvoorbeelden.nl</a:t>
+              <a:t>nl.wikipedia.org</a:t>
             </a:r>
             <a:r>
               <a:rPr lang="en-GB" dirty="0"/>
-              <a:t>/</a:t>
+              <a:t>/wiki/</a:t>
             </a:r>
             <a:r>
               <a:rPr lang="en-GB" dirty="0" err="1"/>
-              <a:t>competenties</a:t>
-            </a:r>
-            <a:r>
-              <a:rPr lang="en-GB" dirty="0"/>
-              <a:t>/</a:t>
-            </a:r>
-            <a:r>
-              <a:rPr lang="en-GB" dirty="0" err="1"/>
-              <a:t>integriteit</a:t>
-            </a:r>
-            <a:r>
-              <a:rPr lang="en-GB" dirty="0"/>
-              <a:t>/</a:t>
+              <a:t>Rechtvaardigheid</a:t>
             </a:r>
             <a:endParaRPr lang="en-NL" dirty="0"/>
           </a:p>
@@ -1099,7 +1104,7 @@
           <a:p>
             <a:fld id="{00E1BD4A-1F92-B644-A197-6FBAF79CDEE2}" type="slidenum">
               <a:rPr lang="en-NL" smtClean="0"/>
-              <a:t>65</a:t>
+              <a:t>63</a:t>
             </a:fld>
             <a:endParaRPr lang="en-NL"/>
           </a:p>
@@ -1108,7 +1113,7 @@
     </p:spTree>
     <p:extLst>
       <p:ext uri="{BB962C8B-B14F-4D97-AF65-F5344CB8AC3E}">
-        <p14:creationId xmlns:p14="http://schemas.microsoft.com/office/powerpoint/2010/main" val="3587479729"/>
+        <p14:creationId xmlns:p14="http://schemas.microsoft.com/office/powerpoint/2010/main" val="1711670782"/>
       </p:ext>
     </p:extLst>
   </p:cSld>
@@ -1184,7 +1189,7 @@
             </a:r>
             <a:r>
               <a:rPr lang="en-GB" dirty="0" err="1"/>
-              <a:t>karaktereigenschap</a:t>
+              <a:t>competenties</a:t>
             </a:r>
             <a:r>
               <a:rPr lang="en-GB" dirty="0"/>
@@ -1192,7 +1197,7 @@
             </a:r>
             <a:r>
               <a:rPr lang="en-GB" dirty="0" err="1"/>
-              <a:t>bescheiden</a:t>
+              <a:t>integriteit</a:t>
             </a:r>
             <a:r>
               <a:rPr lang="en-GB" dirty="0"/>
@@ -1219,7 +1224,7 @@
           <a:p>
             <a:fld id="{00E1BD4A-1F92-B644-A197-6FBAF79CDEE2}" type="slidenum">
               <a:rPr lang="en-NL" smtClean="0"/>
-              <a:t>67</a:t>
+              <a:t>65</a:t>
             </a:fld>
             <a:endParaRPr lang="en-NL"/>
           </a:p>
@@ -1228,7 +1233,7 @@
     </p:spTree>
     <p:extLst>
       <p:ext uri="{BB962C8B-B14F-4D97-AF65-F5344CB8AC3E}">
-        <p14:creationId xmlns:p14="http://schemas.microsoft.com/office/powerpoint/2010/main" val="1874722843"/>
+        <p14:creationId xmlns:p14="http://schemas.microsoft.com/office/powerpoint/2010/main" val="3587479729"/>
       </p:ext>
     </p:extLst>
   </p:cSld>
@@ -1304,7 +1309,7 @@
             </a:r>
             <a:r>
               <a:rPr lang="en-GB" dirty="0" err="1"/>
-              <a:t>competenties</a:t>
+              <a:t>karaktereigenschap</a:t>
             </a:r>
             <a:r>
               <a:rPr lang="en-GB" dirty="0"/>
@@ -1312,7 +1317,7 @@
             </a:r>
             <a:r>
               <a:rPr lang="en-GB" dirty="0" err="1"/>
-              <a:t>leiderschap</a:t>
+              <a:t>bescheiden</a:t>
             </a:r>
             <a:r>
               <a:rPr lang="en-GB" dirty="0"/>
@@ -1339,7 +1344,7 @@
           <a:p>
             <a:fld id="{00E1BD4A-1F92-B644-A197-6FBAF79CDEE2}" type="slidenum">
               <a:rPr lang="en-NL" smtClean="0"/>
-              <a:t>69</a:t>
+              <a:t>67</a:t>
             </a:fld>
             <a:endParaRPr lang="en-NL"/>
           </a:p>
@@ -1348,7 +1353,7 @@
     </p:spTree>
     <p:extLst>
       <p:ext uri="{BB962C8B-B14F-4D97-AF65-F5344CB8AC3E}">
-        <p14:creationId xmlns:p14="http://schemas.microsoft.com/office/powerpoint/2010/main" val="133808917"/>
+        <p14:creationId xmlns:p14="http://schemas.microsoft.com/office/powerpoint/2010/main" val="1874722843"/>
       </p:ext>
     </p:extLst>
   </p:cSld>
@@ -1424,7 +1429,7 @@
             </a:r>
             <a:r>
               <a:rPr lang="en-GB" dirty="0" err="1"/>
-              <a:t>karaktereigenschap</a:t>
+              <a:t>competenties</a:t>
             </a:r>
             <a:r>
               <a:rPr lang="en-GB" dirty="0"/>
@@ -1432,7 +1437,7 @@
             </a:r>
             <a:r>
               <a:rPr lang="en-GB" dirty="0" err="1"/>
-              <a:t>bedachtzaam</a:t>
+              <a:t>leiderschap</a:t>
             </a:r>
             <a:r>
               <a:rPr lang="en-GB" dirty="0"/>
@@ -1459,7 +1464,7 @@
           <a:p>
             <a:fld id="{00E1BD4A-1F92-B644-A197-6FBAF79CDEE2}" type="slidenum">
               <a:rPr lang="en-NL" smtClean="0"/>
-              <a:t>71</a:t>
+              <a:t>69</a:t>
             </a:fld>
             <a:endParaRPr lang="en-NL"/>
           </a:p>
@@ -1468,7 +1473,7 @@
     </p:spTree>
     <p:extLst>
       <p:ext uri="{BB962C8B-B14F-4D97-AF65-F5344CB8AC3E}">
-        <p14:creationId xmlns:p14="http://schemas.microsoft.com/office/powerpoint/2010/main" val="2470492835"/>
+        <p14:creationId xmlns:p14="http://schemas.microsoft.com/office/powerpoint/2010/main" val="133808917"/>
       </p:ext>
     </p:extLst>
   </p:cSld>
@@ -1544,7 +1549,7 @@
             </a:r>
             <a:r>
               <a:rPr lang="en-GB" dirty="0" err="1"/>
-              <a:t>vaardigheden</a:t>
+              <a:t>karaktereigenschap</a:t>
             </a:r>
             <a:r>
               <a:rPr lang="en-GB" dirty="0"/>
@@ -1552,7 +1557,7 @@
             </a:r>
             <a:r>
               <a:rPr lang="en-GB" dirty="0" err="1"/>
-              <a:t>zelfbeheersing</a:t>
+              <a:t>bedachtzaam</a:t>
             </a:r>
             <a:r>
               <a:rPr lang="en-GB" dirty="0"/>
@@ -1579,7 +1584,7 @@
           <a:p>
             <a:fld id="{00E1BD4A-1F92-B644-A197-6FBAF79CDEE2}" type="slidenum">
               <a:rPr lang="en-NL" smtClean="0"/>
-              <a:t>73</a:t>
+              <a:t>71</a:t>
             </a:fld>
             <a:endParaRPr lang="en-NL"/>
           </a:p>
@@ -1588,7 +1593,7 @@
     </p:spTree>
     <p:extLst>
       <p:ext uri="{BB962C8B-B14F-4D97-AF65-F5344CB8AC3E}">
-        <p14:creationId xmlns:p14="http://schemas.microsoft.com/office/powerpoint/2010/main" val="3409853918"/>
+        <p14:creationId xmlns:p14="http://schemas.microsoft.com/office/powerpoint/2010/main" val="2470492835"/>
       </p:ext>
     </p:extLst>
   </p:cSld>
@@ -1656,15 +1661,27 @@
             </a:r>
             <a:r>
               <a:rPr lang="en-GB" dirty="0" err="1"/>
-              <a:t>nl.wikipedia.org</a:t>
+              <a:t>competentiesvoorbeelden.nl</a:t>
             </a:r>
             <a:r>
               <a:rPr lang="en-GB" dirty="0"/>
-              <a:t>/wiki/</a:t>
+              <a:t>/</a:t>
             </a:r>
             <a:r>
               <a:rPr lang="en-GB" dirty="0" err="1"/>
-              <a:t>Liefde</a:t>
+              <a:t>vaardigheden</a:t>
+            </a:r>
+            <a:r>
+              <a:rPr lang="en-GB" dirty="0"/>
+              <a:t>/</a:t>
+            </a:r>
+            <a:r>
+              <a:rPr lang="en-GB" dirty="0" err="1"/>
+              <a:t>zelfbeheersing</a:t>
+            </a:r>
+            <a:r>
+              <a:rPr lang="en-GB" dirty="0"/>
+              <a:t>/</a:t>
             </a:r>
             <a:endParaRPr lang="en-NL" dirty="0"/>
           </a:p>
@@ -1687,7 +1704,7 @@
           <a:p>
             <a:fld id="{00E1BD4A-1F92-B644-A197-6FBAF79CDEE2}" type="slidenum">
               <a:rPr lang="en-NL" smtClean="0"/>
-              <a:t>75</a:t>
+              <a:t>73</a:t>
             </a:fld>
             <a:endParaRPr lang="en-NL"/>
           </a:p>
@@ -1696,7 +1713,7 @@
     </p:spTree>
     <p:extLst>
       <p:ext uri="{BB962C8B-B14F-4D97-AF65-F5344CB8AC3E}">
-        <p14:creationId xmlns:p14="http://schemas.microsoft.com/office/powerpoint/2010/main" val="677025906"/>
+        <p14:creationId xmlns:p14="http://schemas.microsoft.com/office/powerpoint/2010/main" val="3409853918"/>
       </p:ext>
     </p:extLst>
   </p:cSld>
@@ -1764,7 +1781,7 @@
             </a:r>
             <a:r>
               <a:rPr lang="en-GB" dirty="0" err="1"/>
-              <a:t>nl.wiktionary.org</a:t>
+              <a:t>nl.wikipedia.org</a:t>
             </a:r>
             <a:r>
               <a:rPr lang="en-GB" dirty="0"/>
@@ -1772,7 +1789,7 @@
             </a:r>
             <a:r>
               <a:rPr lang="en-GB" dirty="0" err="1"/>
-              <a:t>vriendelijk</a:t>
+              <a:t>Liefde</a:t>
             </a:r>
             <a:endParaRPr lang="en-NL" dirty="0"/>
           </a:p>
@@ -1795,7 +1812,7 @@
           <a:p>
             <a:fld id="{00E1BD4A-1F92-B644-A197-6FBAF79CDEE2}" type="slidenum">
               <a:rPr lang="en-NL" smtClean="0"/>
-              <a:t>77</a:t>
+              <a:t>75</a:t>
             </a:fld>
             <a:endParaRPr lang="en-NL"/>
           </a:p>
@@ -1804,7 +1821,7 @@
     </p:spTree>
     <p:extLst>
       <p:ext uri="{BB962C8B-B14F-4D97-AF65-F5344CB8AC3E}">
-        <p14:creationId xmlns:p14="http://schemas.microsoft.com/office/powerpoint/2010/main" val="1162969183"/>
+        <p14:creationId xmlns:p14="http://schemas.microsoft.com/office/powerpoint/2010/main" val="677025906"/>
       </p:ext>
     </p:extLst>
   </p:cSld>
@@ -1872,27 +1889,15 @@
             </a:r>
             <a:r>
               <a:rPr lang="en-GB" dirty="0" err="1"/>
-              <a:t>competentiesvoorbeelden.nl</a:t>
+              <a:t>nl.wiktionary.org</a:t>
             </a:r>
             <a:r>
               <a:rPr lang="en-GB" dirty="0"/>
-              <a:t>/</a:t>
+              <a:t>/wiki/</a:t>
             </a:r>
             <a:r>
               <a:rPr lang="en-GB" dirty="0" err="1"/>
-              <a:t>competenties</a:t>
-            </a:r>
-            <a:r>
-              <a:rPr lang="en-GB" dirty="0"/>
-              <a:t>/</a:t>
-            </a:r>
-            <a:r>
-              <a:rPr lang="en-GB" dirty="0" err="1"/>
-              <a:t>sociabiliteit</a:t>
-            </a:r>
-            <a:r>
-              <a:rPr lang="en-GB" dirty="0"/>
-              <a:t>/</a:t>
+              <a:t>vriendelijk</a:t>
             </a:r>
             <a:endParaRPr lang="en-NL" dirty="0"/>
           </a:p>
@@ -1915,7 +1920,7 @@
           <a:p>
             <a:fld id="{00E1BD4A-1F92-B644-A197-6FBAF79CDEE2}" type="slidenum">
               <a:rPr lang="en-NL" smtClean="0"/>
-              <a:t>79</a:t>
+              <a:t>77</a:t>
             </a:fld>
             <a:endParaRPr lang="en-NL"/>
           </a:p>
@@ -1924,7 +1929,7 @@
     </p:spTree>
     <p:extLst>
       <p:ext uri="{BB962C8B-B14F-4D97-AF65-F5344CB8AC3E}">
-        <p14:creationId xmlns:p14="http://schemas.microsoft.com/office/powerpoint/2010/main" val="2739621804"/>
+        <p14:creationId xmlns:p14="http://schemas.microsoft.com/office/powerpoint/2010/main" val="1162969183"/>
       </p:ext>
     </p:extLst>
   </p:cSld>
@@ -1980,20 +1985,48 @@
           <a:p>
             <a:r>
               <a:rPr lang="en-NL" dirty="0"/>
-              <a:t>Gevalideerd met 200 steekproeven in meer dan 70 landen. Maatschappelijke ontwikkeling lijkt invloed te hebben op de structuur van waarden. Hoe hoger het niveau van maatschappelijke ontwikkeling, </a:t>
-            </a:r>
-            <a:r>
-              <a:rPr lang="en-NL"/>
-              <a:t>hoe waarschijnlijkereen groep  </a:t>
-            </a:r>
+              <a:t>Gevalideerd met 200 steekproeven in meer dan 70 landen. Maatschappelijke ontwikkeling lijkt invloed te hebben op de structuur van waarden. Hoe hoger het niveau van maatschappelijke ontwikkeling, hoe waarschijnlijkereen groep  de protoypische volgorde toont, waarbij Welwillendheid en Universalisme bovenaan staan en Macht onderaan.</a:t>
+            </a:r>
+          </a:p>
+          <a:p>
+            <a:endParaRPr lang="en-NL" dirty="0"/>
+          </a:p>
+          <a:p>
             <a:r>
               <a:rPr lang="en-NL" dirty="0"/>
-              <a:t>de protoypische </a:t>
-            </a:r>
-            <a:r>
-              <a:rPr lang="en-NL"/>
-              <a:t>volgorde toont, waarbij Welwillendheid en Universalisme bovenaan staan en Macht onderaan.</a:t>
-            </a:r>
+              <a:t>Zie figuur 1 uit “</a:t>
+            </a:r>
+            <a:r>
+              <a:rPr lang="en-GB" dirty="0">
+                <a:solidFill>
+                  <a:srgbClr val="000000"/>
+                </a:solidFill>
+                <a:effectLst/>
+                <a:latin typeface="Roboto" pitchFamily="2" charset="0"/>
+              </a:rPr>
+              <a:t>A Repository of Schwartz Value Scales with Instructions and an Introduction” Schwartz 2021 - </a:t>
+            </a:r>
+            <a:r>
+              <a:rPr lang="en-GB" dirty="0"/>
+              <a:t>https://</a:t>
+            </a:r>
+            <a:r>
+              <a:rPr lang="en-GB" dirty="0" err="1"/>
+              <a:t>doi.org</a:t>
+            </a:r>
+            <a:r>
+              <a:rPr lang="en-GB"/>
+              <a:t>/10.9707/2307-0919.1173</a:t>
+            </a:r>
+            <a:endParaRPr lang="en-GB" dirty="0">
+              <a:solidFill>
+                <a:srgbClr val="000000"/>
+              </a:solidFill>
+              <a:effectLst/>
+              <a:latin typeface="Roboto" pitchFamily="2" charset="0"/>
+            </a:endParaRPr>
+          </a:p>
+          <a:p>
             <a:endParaRPr lang="en-NL" dirty="0"/>
           </a:p>
         </p:txBody>
@@ -2092,27 +2125,27 @@
             </a:r>
             <a:r>
               <a:rPr lang="en-GB" dirty="0" err="1"/>
-              <a:t>nl.wikipedia.org</a:t>
+              <a:t>competentiesvoorbeelden.nl</a:t>
             </a:r>
             <a:r>
               <a:rPr lang="en-GB" dirty="0"/>
-              <a:t>/wiki/</a:t>
+              <a:t>/</a:t>
             </a:r>
             <a:r>
               <a:rPr lang="en-GB" dirty="0" err="1"/>
-              <a:t>Vergeving</a:t>
+              <a:t>competenties</a:t>
             </a:r>
             <a:r>
               <a:rPr lang="en-GB" dirty="0"/>
-              <a:t>_(</a:t>
+              <a:t>/</a:t>
             </a:r>
             <a:r>
               <a:rPr lang="en-GB" dirty="0" err="1"/>
-              <a:t>algemeen</a:t>
+              <a:t>sociabiliteit</a:t>
             </a:r>
             <a:r>
               <a:rPr lang="en-GB" dirty="0"/>
-              <a:t>)</a:t>
+              <a:t>/</a:t>
             </a:r>
             <a:endParaRPr lang="en-NL" dirty="0"/>
           </a:p>
@@ -2135,7 +2168,7 @@
           <a:p>
             <a:fld id="{00E1BD4A-1F92-B644-A197-6FBAF79CDEE2}" type="slidenum">
               <a:rPr lang="en-NL" smtClean="0"/>
-              <a:t>81</a:t>
+              <a:t>79</a:t>
             </a:fld>
             <a:endParaRPr lang="en-NL"/>
           </a:p>
@@ -2144,7 +2177,7 @@
     </p:spTree>
     <p:extLst>
       <p:ext uri="{BB962C8B-B14F-4D97-AF65-F5344CB8AC3E}">
-        <p14:creationId xmlns:p14="http://schemas.microsoft.com/office/powerpoint/2010/main" val="3985016740"/>
+        <p14:creationId xmlns:p14="http://schemas.microsoft.com/office/powerpoint/2010/main" val="2739621804"/>
       </p:ext>
     </p:extLst>
   </p:cSld>
@@ -2212,7 +2245,7 @@
             </a:r>
             <a:r>
               <a:rPr lang="en-GB" dirty="0" err="1"/>
-              <a:t>nl.wiktionary.org</a:t>
+              <a:t>nl.wikipedia.org</a:t>
             </a:r>
             <a:r>
               <a:rPr lang="en-GB" dirty="0"/>
@@ -2220,7 +2253,19 @@
             </a:r>
             <a:r>
               <a:rPr lang="en-GB" dirty="0" err="1"/>
-              <a:t>dankbaar</a:t>
+              <a:t>Vergeving</a:t>
+            </a:r>
+            <a:r>
+              <a:rPr lang="en-GB" dirty="0"/>
+              <a:t>_(</a:t>
+            </a:r>
+            <a:r>
+              <a:rPr lang="en-GB" dirty="0" err="1"/>
+              <a:t>algemeen</a:t>
+            </a:r>
+            <a:r>
+              <a:rPr lang="en-GB" dirty="0"/>
+              <a:t>)</a:t>
             </a:r>
             <a:endParaRPr lang="en-NL" dirty="0"/>
           </a:p>
@@ -2243,7 +2288,7 @@
           <a:p>
             <a:fld id="{00E1BD4A-1F92-B644-A197-6FBAF79CDEE2}" type="slidenum">
               <a:rPr lang="en-NL" smtClean="0"/>
-              <a:t>83</a:t>
+              <a:t>81</a:t>
             </a:fld>
             <a:endParaRPr lang="en-NL"/>
           </a:p>
@@ -2252,7 +2297,7 @@
     </p:spTree>
     <p:extLst>
       <p:ext uri="{BB962C8B-B14F-4D97-AF65-F5344CB8AC3E}">
-        <p14:creationId xmlns:p14="http://schemas.microsoft.com/office/powerpoint/2010/main" val="2851429934"/>
+        <p14:creationId xmlns:p14="http://schemas.microsoft.com/office/powerpoint/2010/main" val="3985016740"/>
       </p:ext>
     </p:extLst>
   </p:cSld>
@@ -2320,27 +2365,15 @@
             </a:r>
             <a:r>
               <a:rPr lang="en-GB" dirty="0" err="1"/>
-              <a:t>competentiesvoorbeelden.nl</a:t>
+              <a:t>nl.wiktionary.org</a:t>
             </a:r>
             <a:r>
               <a:rPr lang="en-GB" dirty="0"/>
-              <a:t>/</a:t>
+              <a:t>/wiki/</a:t>
             </a:r>
             <a:r>
               <a:rPr lang="en-GB" dirty="0" err="1"/>
-              <a:t>vaardigheden</a:t>
-            </a:r>
-            <a:r>
-              <a:rPr lang="en-GB" dirty="0"/>
-              <a:t>/</a:t>
-            </a:r>
-            <a:r>
-              <a:rPr lang="en-GB" dirty="0" err="1"/>
-              <a:t>samenwerken</a:t>
-            </a:r>
-            <a:r>
-              <a:rPr lang="en-GB" dirty="0"/>
-              <a:t>/</a:t>
+              <a:t>dankbaar</a:t>
             </a:r>
             <a:endParaRPr lang="en-NL" dirty="0"/>
           </a:p>
@@ -2363,7 +2396,7 @@
           <a:p>
             <a:fld id="{00E1BD4A-1F92-B644-A197-6FBAF79CDEE2}" type="slidenum">
               <a:rPr lang="en-NL" smtClean="0"/>
-              <a:t>85</a:t>
+              <a:t>83</a:t>
             </a:fld>
             <a:endParaRPr lang="en-NL"/>
           </a:p>
@@ -2372,7 +2405,7 @@
     </p:spTree>
     <p:extLst>
       <p:ext uri="{BB962C8B-B14F-4D97-AF65-F5344CB8AC3E}">
-        <p14:creationId xmlns:p14="http://schemas.microsoft.com/office/powerpoint/2010/main" val="1452857000"/>
+        <p14:creationId xmlns:p14="http://schemas.microsoft.com/office/powerpoint/2010/main" val="2851429934"/>
       </p:ext>
     </p:extLst>
   </p:cSld>
@@ -2448,7 +2481,7 @@
             </a:r>
             <a:r>
               <a:rPr lang="en-GB" dirty="0" err="1"/>
-              <a:t>karaktereigenschap</a:t>
+              <a:t>vaardigheden</a:t>
             </a:r>
             <a:r>
               <a:rPr lang="en-GB" dirty="0"/>
@@ -2456,7 +2489,7 @@
             </a:r>
             <a:r>
               <a:rPr lang="en-GB" dirty="0" err="1"/>
-              <a:t>moedig</a:t>
+              <a:t>samenwerken</a:t>
             </a:r>
             <a:r>
               <a:rPr lang="en-GB" dirty="0"/>
@@ -2483,7 +2516,7 @@
           <a:p>
             <a:fld id="{00E1BD4A-1F92-B644-A197-6FBAF79CDEE2}" type="slidenum">
               <a:rPr lang="en-NL" smtClean="0"/>
-              <a:t>87</a:t>
+              <a:t>85</a:t>
             </a:fld>
             <a:endParaRPr lang="en-NL"/>
           </a:p>
@@ -2492,7 +2525,7 @@
     </p:spTree>
     <p:extLst>
       <p:ext uri="{BB962C8B-B14F-4D97-AF65-F5344CB8AC3E}">
-        <p14:creationId xmlns:p14="http://schemas.microsoft.com/office/powerpoint/2010/main" val="3684117996"/>
+        <p14:creationId xmlns:p14="http://schemas.microsoft.com/office/powerpoint/2010/main" val="1452857000"/>
       </p:ext>
     </p:extLst>
   </p:cSld>
@@ -2568,6 +2601,126 @@
             </a:r>
             <a:r>
               <a:rPr lang="en-GB" dirty="0" err="1"/>
+              <a:t>karaktereigenschap</a:t>
+            </a:r>
+            <a:r>
+              <a:rPr lang="en-GB" dirty="0"/>
+              <a:t>/</a:t>
+            </a:r>
+            <a:r>
+              <a:rPr lang="en-GB" dirty="0" err="1"/>
+              <a:t>moedig</a:t>
+            </a:r>
+            <a:r>
+              <a:rPr lang="en-GB" dirty="0"/>
+              <a:t>/</a:t>
+            </a:r>
+            <a:endParaRPr lang="en-NL" dirty="0"/>
+          </a:p>
+        </p:txBody>
+      </p:sp>
+      <p:sp>
+        <p:nvSpPr>
+          <p:cNvPr id="4" name="Slide Number Placeholder 3"/>
+          <p:cNvSpPr>
+            <a:spLocks noGrp="1"/>
+          </p:cNvSpPr>
+          <p:nvPr>
+            <p:ph type="sldNum" sz="quarter" idx="5"/>
+          </p:nvPr>
+        </p:nvSpPr>
+        <p:spPr/>
+        <p:txBody>
+          <a:bodyPr/>
+          <a:lstStyle/>
+          <a:p>
+            <a:fld id="{00E1BD4A-1F92-B644-A197-6FBAF79CDEE2}" type="slidenum">
+              <a:rPr lang="en-NL" smtClean="0"/>
+              <a:t>87</a:t>
+            </a:fld>
+            <a:endParaRPr lang="en-NL"/>
+          </a:p>
+        </p:txBody>
+      </p:sp>
+    </p:spTree>
+    <p:extLst>
+      <p:ext uri="{BB962C8B-B14F-4D97-AF65-F5344CB8AC3E}">
+        <p14:creationId xmlns:p14="http://schemas.microsoft.com/office/powerpoint/2010/main" val="3684117996"/>
+      </p:ext>
+    </p:extLst>
+  </p:cSld>
+  <p:clrMapOvr>
+    <a:masterClrMapping/>
+  </p:clrMapOvr>
+</p:notes>
+</file>
+
+<file path=ppt/notesSlides/notesSlide25.xml><?xml version="1.0" encoding="utf-8"?>
+<p:notes xmlns:a="http://schemas.openxmlformats.org/drawingml/2006/main" xmlns:r="http://schemas.openxmlformats.org/officeDocument/2006/relationships" xmlns:p="http://schemas.openxmlformats.org/presentationml/2006/main">
+  <p:cSld>
+    <p:spTree>
+      <p:nvGrpSpPr>
+        <p:cNvPr id="1" name=""/>
+        <p:cNvGrpSpPr/>
+        <p:nvPr/>
+      </p:nvGrpSpPr>
+      <p:grpSpPr>
+        <a:xfrm>
+          <a:off x="0" y="0"/>
+          <a:ext cx="0" cy="0"/>
+          <a:chOff x="0" y="0"/>
+          <a:chExt cx="0" cy="0"/>
+        </a:xfrm>
+      </p:grpSpPr>
+      <p:sp>
+        <p:nvSpPr>
+          <p:cNvPr id="2" name="Slide Image Placeholder 1"/>
+          <p:cNvSpPr>
+            <a:spLocks noGrp="1" noRot="1" noChangeAspect="1"/>
+          </p:cNvSpPr>
+          <p:nvPr>
+            <p:ph type="sldImg"/>
+          </p:nvPr>
+        </p:nvSpPr>
+        <p:spPr/>
+      </p:sp>
+      <p:sp>
+        <p:nvSpPr>
+          <p:cNvPr id="3" name="Notes Placeholder 2"/>
+          <p:cNvSpPr>
+            <a:spLocks noGrp="1"/>
+          </p:cNvSpPr>
+          <p:nvPr>
+            <p:ph type="body" idx="1"/>
+          </p:nvPr>
+        </p:nvSpPr>
+        <p:spPr/>
+        <p:txBody>
+          <a:bodyPr/>
+          <a:lstStyle/>
+          <a:p>
+            <a:r>
+              <a:rPr lang="en-GB" dirty="0"/>
+              <a:t>B</a:t>
+            </a:r>
+            <a:r>
+              <a:rPr lang="en-NL" dirty="0"/>
+              <a:t>ron: </a:t>
+            </a:r>
+            <a:r>
+              <a:rPr lang="en-GB" dirty="0"/>
+              <a:t>https://</a:t>
+            </a:r>
+            <a:r>
+              <a:rPr lang="en-GB" dirty="0" err="1"/>
+              <a:t>competentiesvoorbeelden.nl</a:t>
+            </a:r>
+            <a:r>
+              <a:rPr lang="en-GB" dirty="0"/>
+              <a:t>/</a:t>
+            </a:r>
+            <a:r>
+              <a:rPr lang="en-GB" dirty="0" err="1"/>
               <a:t>competenties</a:t>
             </a:r>
             <a:r>
@@ -2622,7 +2775,7 @@
 </p:notes>
 </file>
 
-<file path=ppt/notesSlides/notesSlide25.xml><?xml version="1.0" encoding="utf-8"?>
+<file path=ppt/notesSlides/notesSlide26.xml><?xml version="1.0" encoding="utf-8"?>
 <p:notes xmlns:a="http://schemas.openxmlformats.org/drawingml/2006/main" xmlns:r="http://schemas.openxmlformats.org/officeDocument/2006/relationships" xmlns:p="http://schemas.openxmlformats.org/presentationml/2006/main">
   <p:cSld>
     <p:spTree>
@@ -2774,42 +2927,6 @@
           <a:bodyPr/>
           <a:lstStyle/>
           <a:p>
-            <a:r>
-              <a:rPr lang="en-GB" dirty="0"/>
-              <a:t>B</a:t>
-            </a:r>
-            <a:r>
-              <a:rPr lang="en-NL" dirty="0"/>
-              <a:t>ron: </a:t>
-            </a:r>
-            <a:r>
-              <a:rPr lang="en-GB" dirty="0"/>
-              <a:t>https://</a:t>
-            </a:r>
-            <a:r>
-              <a:rPr lang="en-GB" dirty="0" err="1"/>
-              <a:t>competentiesvoorbeelden.nl</a:t>
-            </a:r>
-            <a:r>
-              <a:rPr lang="en-GB" dirty="0"/>
-              <a:t>/</a:t>
-            </a:r>
-            <a:r>
-              <a:rPr lang="en-GB" dirty="0" err="1"/>
-              <a:t>karaktereigenschap</a:t>
-            </a:r>
-            <a:r>
-              <a:rPr lang="en-GB" dirty="0"/>
-              <a:t>/</a:t>
-            </a:r>
-            <a:r>
-              <a:rPr lang="en-GB" dirty="0" err="1"/>
-              <a:t>creatief</a:t>
-            </a:r>
-            <a:r>
-              <a:rPr lang="en-GB" dirty="0"/>
-              <a:t>/</a:t>
-            </a:r>
             <a:endParaRPr lang="en-NL" dirty="0"/>
           </a:p>
         </p:txBody>
@@ -2831,7 +2948,7 @@
           <a:p>
             <a:fld id="{00E1BD4A-1F92-B644-A197-6FBAF79CDEE2}" type="slidenum">
               <a:rPr lang="en-NL" smtClean="0"/>
-              <a:t>47</a:t>
+              <a:t>13</a:t>
             </a:fld>
             <a:endParaRPr lang="en-NL"/>
           </a:p>
@@ -2840,7 +2957,7 @@
     </p:spTree>
     <p:extLst>
       <p:ext uri="{BB962C8B-B14F-4D97-AF65-F5344CB8AC3E}">
-        <p14:creationId xmlns:p14="http://schemas.microsoft.com/office/powerpoint/2010/main" val="2640906339"/>
+        <p14:creationId xmlns:p14="http://schemas.microsoft.com/office/powerpoint/2010/main" val="1908528901"/>
       </p:ext>
     </p:extLst>
   </p:cSld>
@@ -2924,7 +3041,7 @@
             </a:r>
             <a:r>
               <a:rPr lang="en-GB" dirty="0" err="1"/>
-              <a:t>nieuwsgierig</a:t>
+              <a:t>creatief</a:t>
             </a:r>
             <a:r>
               <a:rPr lang="en-GB" dirty="0"/>
@@ -2951,7 +3068,7 @@
           <a:p>
             <a:fld id="{00E1BD4A-1F92-B644-A197-6FBAF79CDEE2}" type="slidenum">
               <a:rPr lang="en-NL" smtClean="0"/>
-              <a:t>49</a:t>
+              <a:t>47</a:t>
             </a:fld>
             <a:endParaRPr lang="en-NL"/>
           </a:p>
@@ -2960,7 +3077,7 @@
     </p:spTree>
     <p:extLst>
       <p:ext uri="{BB962C8B-B14F-4D97-AF65-F5344CB8AC3E}">
-        <p14:creationId xmlns:p14="http://schemas.microsoft.com/office/powerpoint/2010/main" val="2764681039"/>
+        <p14:creationId xmlns:p14="http://schemas.microsoft.com/office/powerpoint/2010/main" val="2640906339"/>
       </p:ext>
     </p:extLst>
   </p:cSld>
@@ -3036,7 +3153,7 @@
             </a:r>
             <a:r>
               <a:rPr lang="en-GB" dirty="0" err="1"/>
-              <a:t>competenties</a:t>
+              <a:t>karaktereigenschap</a:t>
             </a:r>
             <a:r>
               <a:rPr lang="en-GB" dirty="0"/>
@@ -3044,7 +3161,7 @@
             </a:r>
             <a:r>
               <a:rPr lang="en-GB" dirty="0" err="1"/>
-              <a:t>oordeelsvorming</a:t>
+              <a:t>nieuwsgierig</a:t>
             </a:r>
             <a:r>
               <a:rPr lang="en-GB" dirty="0"/>
@@ -3071,7 +3188,7 @@
           <a:p>
             <a:fld id="{00E1BD4A-1F92-B644-A197-6FBAF79CDEE2}" type="slidenum">
               <a:rPr lang="en-NL" smtClean="0"/>
-              <a:t>51</a:t>
+              <a:t>49</a:t>
             </a:fld>
             <a:endParaRPr lang="en-NL"/>
           </a:p>
@@ -3080,7 +3197,7 @@
     </p:spTree>
     <p:extLst>
       <p:ext uri="{BB962C8B-B14F-4D97-AF65-F5344CB8AC3E}">
-        <p14:creationId xmlns:p14="http://schemas.microsoft.com/office/powerpoint/2010/main" val="220183043"/>
+        <p14:creationId xmlns:p14="http://schemas.microsoft.com/office/powerpoint/2010/main" val="2764681039"/>
       </p:ext>
     </p:extLst>
   </p:cSld>
@@ -3148,47 +3265,27 @@
             </a:r>
             <a:r>
               <a:rPr lang="en-GB" dirty="0" err="1"/>
-              <a:t>nl.wikipedia.org</a:t>
+              <a:t>competentiesvoorbeelden.nl</a:t>
             </a:r>
             <a:r>
               <a:rPr lang="en-GB" dirty="0"/>
-              <a:t>/wiki/</a:t>
+              <a:t>/</a:t>
             </a:r>
             <a:r>
               <a:rPr lang="en-GB" dirty="0" err="1"/>
-              <a:t>Perspectief</a:t>
+              <a:t>competenties</a:t>
             </a:r>
             <a:r>
               <a:rPr lang="en-GB" dirty="0"/>
-              <a:t>_(</a:t>
+              <a:t>/</a:t>
             </a:r>
             <a:r>
               <a:rPr lang="en-GB" dirty="0" err="1"/>
-              <a:t>cognitief</a:t>
+              <a:t>oordeelsvorming</a:t>
             </a:r>
             <a:r>
               <a:rPr lang="en-GB" dirty="0"/>
-              <a:t>) – </a:t>
-            </a:r>
-            <a:r>
-              <a:rPr lang="en-GB" dirty="0" err="1"/>
-              <a:t>bewerkt</a:t>
-            </a:r>
-            <a:r>
-              <a:rPr lang="en-GB" dirty="0"/>
-              <a:t> tot (</a:t>
-            </a:r>
-            <a:r>
-              <a:rPr lang="en-GB" dirty="0" err="1"/>
-              <a:t>positieve</a:t>
-            </a:r>
-            <a:r>
-              <a:rPr lang="en-GB" dirty="0"/>
-              <a:t>) </a:t>
-            </a:r>
-            <a:r>
-              <a:rPr lang="en-GB" dirty="0" err="1"/>
-              <a:t>competentie</a:t>
+              <a:t>/</a:t>
             </a:r>
             <a:endParaRPr lang="en-NL" dirty="0"/>
           </a:p>
@@ -3211,7 +3308,7 @@
           <a:p>
             <a:fld id="{00E1BD4A-1F92-B644-A197-6FBAF79CDEE2}" type="slidenum">
               <a:rPr lang="en-NL" smtClean="0"/>
-              <a:t>53</a:t>
+              <a:t>51</a:t>
             </a:fld>
             <a:endParaRPr lang="en-NL"/>
           </a:p>
@@ -3220,7 +3317,7 @@
     </p:spTree>
     <p:extLst>
       <p:ext uri="{BB962C8B-B14F-4D97-AF65-F5344CB8AC3E}">
-        <p14:creationId xmlns:p14="http://schemas.microsoft.com/office/powerpoint/2010/main" val="1416272564"/>
+        <p14:creationId xmlns:p14="http://schemas.microsoft.com/office/powerpoint/2010/main" val="220183043"/>
       </p:ext>
     </p:extLst>
   </p:cSld>
@@ -3288,27 +3385,47 @@
             </a:r>
             <a:r>
               <a:rPr lang="en-GB" dirty="0" err="1"/>
-              <a:t>competentiesvoorbeelden.nl</a:t>
+              <a:t>nl.wikipedia.org</a:t>
             </a:r>
             <a:r>
               <a:rPr lang="en-GB" dirty="0"/>
-              <a:t>/</a:t>
+              <a:t>/wiki/</a:t>
             </a:r>
             <a:r>
               <a:rPr lang="en-GB" dirty="0" err="1"/>
-              <a:t>karaktereigenschap</a:t>
+              <a:t>Perspectief</a:t>
             </a:r>
             <a:r>
               <a:rPr lang="en-GB" dirty="0"/>
-              <a:t>/</a:t>
+              <a:t>_(</a:t>
             </a:r>
             <a:r>
               <a:rPr lang="en-GB" dirty="0" err="1"/>
-              <a:t>enthousiast</a:t>
+              <a:t>cognitief</a:t>
             </a:r>
             <a:r>
               <a:rPr lang="en-GB" dirty="0"/>
-              <a:t>/</a:t>
+              <a:t>) – </a:t>
+            </a:r>
+            <a:r>
+              <a:rPr lang="en-GB" dirty="0" err="1"/>
+              <a:t>bewerkt</a:t>
+            </a:r>
+            <a:r>
+              <a:rPr lang="en-GB" dirty="0"/>
+              <a:t> tot (</a:t>
+            </a:r>
+            <a:r>
+              <a:rPr lang="en-GB" dirty="0" err="1"/>
+              <a:t>positieve</a:t>
+            </a:r>
+            <a:r>
+              <a:rPr lang="en-GB" dirty="0"/>
+              <a:t>) </a:t>
+            </a:r>
+            <a:r>
+              <a:rPr lang="en-GB" dirty="0" err="1"/>
+              <a:t>competentie</a:t>
             </a:r>
             <a:endParaRPr lang="en-NL" dirty="0"/>
           </a:p>
@@ -3331,7 +3448,7 @@
           <a:p>
             <a:fld id="{00E1BD4A-1F92-B644-A197-6FBAF79CDEE2}" type="slidenum">
               <a:rPr lang="en-NL" smtClean="0"/>
-              <a:t>55</a:t>
+              <a:t>53</a:t>
             </a:fld>
             <a:endParaRPr lang="en-NL"/>
           </a:p>
@@ -3340,7 +3457,7 @@
     </p:spTree>
     <p:extLst>
       <p:ext uri="{BB962C8B-B14F-4D97-AF65-F5344CB8AC3E}">
-        <p14:creationId xmlns:p14="http://schemas.microsoft.com/office/powerpoint/2010/main" val="2340544741"/>
+        <p14:creationId xmlns:p14="http://schemas.microsoft.com/office/powerpoint/2010/main" val="1416272564"/>
       </p:ext>
     </p:extLst>
   </p:cSld>
@@ -3396,11 +3513,11 @@
           <a:p>
             <a:r>
               <a:rPr lang="en-GB" dirty="0"/>
-              <a:t>S</a:t>
+              <a:t>B</a:t>
             </a:r>
             <a:r>
               <a:rPr lang="en-NL" dirty="0"/>
-              <a:t>ource </a:t>
+              <a:t>ron: </a:t>
             </a:r>
             <a:r>
               <a:rPr lang="en-GB" dirty="0"/>
@@ -3408,11 +3525,27 @@
             </a:r>
             <a:r>
               <a:rPr lang="en-GB" dirty="0" err="1"/>
-              <a:t>nl.wikipedia.org</a:t>
+              <a:t>competentiesvoorbeelden.nl</a:t>
             </a:r>
             <a:r>
               <a:rPr lang="en-GB" dirty="0"/>
-              <a:t>/wiki/Hoop</a:t>
+              <a:t>/</a:t>
+            </a:r>
+            <a:r>
+              <a:rPr lang="en-GB" dirty="0" err="1"/>
+              <a:t>karaktereigenschap</a:t>
+            </a:r>
+            <a:r>
+              <a:rPr lang="en-GB" dirty="0"/>
+              <a:t>/</a:t>
+            </a:r>
+            <a:r>
+              <a:rPr lang="en-GB" dirty="0" err="1"/>
+              <a:t>enthousiast</a:t>
+            </a:r>
+            <a:r>
+              <a:rPr lang="en-GB" dirty="0"/>
+              <a:t>/</a:t>
             </a:r>
             <a:endParaRPr lang="en-NL" dirty="0"/>
           </a:p>
@@ -3435,7 +3568,7 @@
           <a:p>
             <a:fld id="{00E1BD4A-1F92-B644-A197-6FBAF79CDEE2}" type="slidenum">
               <a:rPr lang="en-NL" smtClean="0"/>
-              <a:t>57</a:t>
+              <a:t>55</a:t>
             </a:fld>
             <a:endParaRPr lang="en-NL"/>
           </a:p>
@@ -3444,7 +3577,7 @@
     </p:spTree>
     <p:extLst>
       <p:ext uri="{BB962C8B-B14F-4D97-AF65-F5344CB8AC3E}">
-        <p14:creationId xmlns:p14="http://schemas.microsoft.com/office/powerpoint/2010/main" val="1880268986"/>
+        <p14:creationId xmlns:p14="http://schemas.microsoft.com/office/powerpoint/2010/main" val="2340544741"/>
       </p:ext>
     </p:extLst>
   </p:cSld>
@@ -3500,11 +3633,11 @@
           <a:p>
             <a:r>
               <a:rPr lang="en-GB" dirty="0"/>
-              <a:t>B</a:t>
+              <a:t>S</a:t>
             </a:r>
             <a:r>
               <a:rPr lang="en-NL" dirty="0"/>
-              <a:t>ron: </a:t>
+              <a:t>ource </a:t>
             </a:r>
             <a:r>
               <a:rPr lang="en-GB" dirty="0"/>
@@ -3512,27 +3645,11 @@
             </a:r>
             <a:r>
               <a:rPr lang="en-GB" dirty="0" err="1"/>
-              <a:t>competentiesvoorbeelden.nl</a:t>
+              <a:t>nl.wikipedia.org</a:t>
             </a:r>
             <a:r>
               <a:rPr lang="en-GB" dirty="0"/>
-              <a:t>/</a:t>
-            </a:r>
-            <a:r>
-              <a:rPr lang="en-GB" dirty="0" err="1"/>
-              <a:t>vaardigheden</a:t>
-            </a:r>
-            <a:r>
-              <a:rPr lang="en-GB" dirty="0"/>
-              <a:t>/</a:t>
-            </a:r>
-            <a:r>
-              <a:rPr lang="en-GB" dirty="0" err="1"/>
-              <a:t>gevoel-voor-humor</a:t>
-            </a:r>
-            <a:r>
-              <a:rPr lang="en-GB" dirty="0"/>
-              <a:t>/</a:t>
+              <a:t>/wiki/Hoop</a:t>
             </a:r>
             <a:endParaRPr lang="en-NL" dirty="0"/>
           </a:p>
@@ -3555,7 +3672,7 @@
           <a:p>
             <a:fld id="{00E1BD4A-1F92-B644-A197-6FBAF79CDEE2}" type="slidenum">
               <a:rPr lang="en-NL" smtClean="0"/>
-              <a:t>59</a:t>
+              <a:t>57</a:t>
             </a:fld>
             <a:endParaRPr lang="en-NL"/>
           </a:p>
@@ -3564,7 +3681,7 @@
     </p:spTree>
     <p:extLst>
       <p:ext uri="{BB962C8B-B14F-4D97-AF65-F5344CB8AC3E}">
-        <p14:creationId xmlns:p14="http://schemas.microsoft.com/office/powerpoint/2010/main" val="1347279096"/>
+        <p14:creationId xmlns:p14="http://schemas.microsoft.com/office/powerpoint/2010/main" val="1880268986"/>
       </p:ext>
     </p:extLst>
   </p:cSld>
@@ -21361,6 +21478,18 @@
               <a:t>Veiligheid : Conformiteit : Traditie</a:t>
             </a:r>
           </a:p>
+          <a:p>
+            <a:r>
+              <a:rPr lang="en-NL" sz="2000" i="1" dirty="0">
+                <a:solidFill>
+                  <a:schemeClr val="bg1">
+                    <a:lumMod val="75000"/>
+                  </a:schemeClr>
+                </a:solidFill>
+              </a:rPr>
+              <a:t>Sociale Zelfbescherming</a:t>
+            </a:r>
+          </a:p>
         </p:txBody>
       </p:sp>
     </p:spTree>
@@ -21489,6 +21618,18 @@
               <a:t>Macht : Prestatie : Hedonisme</a:t>
             </a:r>
           </a:p>
+          <a:p>
+            <a:r>
+              <a:rPr lang="en-NL" sz="2000" i="1" dirty="0">
+                <a:solidFill>
+                  <a:schemeClr val="bg1">
+                    <a:lumMod val="75000"/>
+                  </a:schemeClr>
+                </a:solidFill>
+              </a:rPr>
+              <a:t>Persoonlijke Zelfbescherming</a:t>
+            </a:r>
+          </a:p>
         </p:txBody>
       </p:sp>
     </p:spTree>
@@ -21556,15 +21697,7 @@
           <a:p>
             <a:r>
               <a:rPr lang="en-NL" sz="4000" dirty="0"/>
-              <a:t>Bevat de waarden Zelfsturing en Stimulatie, en </a:t>
-            </a:r>
-            <a:r>
-              <a:rPr lang="en-NL" sz="4000"/>
-              <a:t>deels Hedonisme</a:t>
-            </a:r>
-            <a:r>
-              <a:rPr lang="en-NL" sz="4000" dirty="0"/>
-              <a:t>.</a:t>
+              <a:t>Bevat de waarden Zelfsturing en Stimulatie, en deels Hedonisme.</a:t>
             </a:r>
           </a:p>
           <a:p>
@@ -25844,7 +25977,7 @@
               <a:rPr lang="en-NL" sz="2000" dirty="0">
                 <a:latin typeface="Ubuntu" panose="020B0504030602030204" pitchFamily="34" charset="0"/>
               </a:rPr>
-              <a:t>De tien Menselijke Basiswaarden van Schwartz en de daaruit volgende clusters zijn gebaseerd op een evolutionair fundament: 1. biologische behoeften, 2. behoefte om samen te werken en 3. behoefte aan groepsvorming om te overleven en groeien. </a:t>
+              <a:t>De tien Menselijke Basiswaarden van Schwartz en de vier hoofdclusters zijn gebaseerd op een evolutionair fundament: 1. biologische behoeften, 2. behoefte om samen te werken en 3. behoefte aan groepsvorming om te overleven en groeien. </a:t>
             </a:r>
           </a:p>
           <a:p>
@@ -25852,7 +25985,15 @@
               <a:rPr lang="en-NL" sz="2000" dirty="0">
                 <a:latin typeface="Ubuntu" panose="020B0504030602030204" pitchFamily="34" charset="0"/>
               </a:rPr>
-              <a:t>Elk individu heeft alle waarden, maar elk individu heeft een eigen hiërarchie. De persoonlijke hiërarchie wordt beïnvloed door de cultuur waarin iemand leeft. Hoe belangrijker een waarde is voor een persoon, hoe meer deze gemotiveerd is om het doel dat de waarde vertegenwoordigt te bereiken.</a:t>
+              <a:t>Elk individu heeft alle waarden, gerangschikt in een eigen hiërarchie. Deze wordt beïnvloed door de cultuur waarin iemand leeft. Hoe belangrijker een waarde is, hoe meer men gemotiveerd is om een bijbehorend doel te bereiken.</a:t>
+            </a:r>
+          </a:p>
+          <a:p>
+            <a:r>
+              <a:rPr lang="en-NL" sz="2000" dirty="0">
+                <a:latin typeface="Ubuntu" panose="020B0504030602030204" pitchFamily="34" charset="0"/>
+              </a:rPr>
+              <a:t>De waarden verhouden zich tot elkaar in de vorm van een circumplex met twee assen: van Sociale focus tot Persoonlijke focus, en van Groei (angst-vrij) tot Zelfbescherming (angst-vermijdend). </a:t>
             </a:r>
           </a:p>
         </p:txBody>
@@ -29190,6 +29331,18 @@
               <a:t>Zelfsturing : Stimulatie : Hedonisme</a:t>
             </a:r>
           </a:p>
+          <a:p>
+            <a:r>
+              <a:rPr lang="en-NL" sz="2000" i="1" dirty="0">
+                <a:solidFill>
+                  <a:schemeClr val="bg1">
+                    <a:lumMod val="75000"/>
+                  </a:schemeClr>
+                </a:solidFill>
+              </a:rPr>
+              <a:t>Persoonlijke groei</a:t>
+            </a:r>
+          </a:p>
         </p:txBody>
       </p:sp>
     </p:spTree>
@@ -32451,6 +32604,18 @@
                 </a:solidFill>
               </a:rPr>
               <a:t>Universalisme : Welwillendheid</a:t>
+            </a:r>
+          </a:p>
+          <a:p>
+            <a:r>
+              <a:rPr lang="en-NL" sz="2000" i="1" dirty="0">
+                <a:solidFill>
+                  <a:schemeClr val="bg1">
+                    <a:lumMod val="75000"/>
+                  </a:schemeClr>
+                </a:solidFill>
+              </a:rPr>
+              <a:t>Sociale Groei</a:t>
             </a:r>
           </a:p>
         </p:txBody>

</xml_diff>

<commit_message>
Toevoeging aan de facilitatiesuggestie om bij de missie/visie niet allen de clusters maar ook de 10 basiswaarden te betrekken.
</commit_message>
<xml_diff>
--- a/Schwartz Basis Menselijke Waarden.pptx
+++ b/Schwartz Basis Menselijke Waarden.pptx
@@ -2015,7 +2015,7 @@
               <a:t>doi.org</a:t>
             </a:r>
             <a:r>
-              <a:rPr lang="en-GB"/>
+              <a:rPr lang="en-GB" dirty="0"/>
               <a:t>/10.9707/2307-0919.1173</a:t>
             </a:r>
             <a:endParaRPr lang="en-GB" dirty="0">
@@ -22133,7 +22133,7 @@
         </p:nvSpPr>
         <p:spPr>
           <a:xfrm>
-            <a:off x="203200" y="2276958"/>
+            <a:off x="203200" y="2342274"/>
             <a:ext cx="3471863" cy="2960158"/>
           </a:xfrm>
         </p:spPr>
@@ -22142,39 +22142,33 @@
           <a:lstStyle/>
           <a:p>
             <a:r>
-              <a:rPr lang="en-NL" dirty="0"/>
+              <a:rPr lang="en-NL" sz="900" dirty="0"/>
               <a:t>Laat in groepjes de deelnemers onderzoek doen naar de vier waardenclusters. Bijvoorbeeld één cluster per groepje. </a:t>
             </a:r>
           </a:p>
           <a:p>
             <a:r>
-              <a:rPr lang="en-NL" dirty="0"/>
+              <a:rPr lang="en-NL" sz="900" dirty="0"/>
               <a:t>Elk groepje bereidt een mini presentatie voor (liefst met illustraties op een flipover), waarbij ze ook een voorbeeld geven, hoe je een meevaller van 1000 euro zou besteden, vanuit dit cluster.</a:t>
             </a:r>
           </a:p>
           <a:p>
             <a:r>
-              <a:rPr lang="en-NL" dirty="0"/>
+              <a:rPr lang="en-NL" sz="900" dirty="0"/>
               <a:t>Vraag iedereen om individueel de 10 waarden op volgorde te leggen van meest belangrijk naar minst belangrijk, en bij de 2 belangrijkste ook een voorbeeld te bedenken van een besluit waar deze waarde bepalend was.</a:t>
             </a:r>
           </a:p>
           <a:p>
             <a:r>
-              <a:rPr lang="en-NL" dirty="0"/>
+              <a:rPr lang="en-NL" sz="900" dirty="0"/>
               <a:t>Vertel in groepjes van drie ombeurten je besluit ZONDER de waarde te benoemen. De anderen moeten raden welke waarde er bij hoort.</a:t>
             </a:r>
           </a:p>
           <a:p>
             <a:r>
-              <a:rPr lang="en-NL" dirty="0"/>
-              <a:t>Laat de groep bespreken welk waardencluster het belangrijkst is voor de missie/visie, en hoe zich dit verhoudt tot de individueel gekozen waarden.</a:t>
-            </a:r>
-          </a:p>
-          <a:p>
-            <a:endParaRPr lang="en-NL" dirty="0"/>
-          </a:p>
-          <a:p>
-            <a:endParaRPr lang="en-NL" dirty="0"/>
+              <a:rPr lang="en-NL" sz="900" dirty="0"/>
+              <a:t>Laat de groep bespreken welk waardencluster het belangrijkst is voor de missie/visie, en hoe zich dit verhoudt tot de individueel gekozen waarden. Verdiep eventueel met welke van de 10 basiswaarden het beste passen.</a:t>
+            </a:r>
           </a:p>
         </p:txBody>
       </p:sp>

</xml_diff>

<commit_message>
#5 - prestatie vervangen door succes - want prestatie kan ook onder zelfoptimalisatie vallen, bv gemotiveerd worden van competitie kan los staan van erkenning van buitenaf.
</commit_message>
<xml_diff>
--- a/Schwartz Basis Menselijke Waarden.pptx
+++ b/Schwartz Basis Menselijke Waarden.pptx
@@ -432,7 +432,7 @@
           <a:p>
             <a:fld id="{B9481728-54D7-DB43-9E8B-7CD2285FE0B2}" type="datetimeFigureOut">
               <a:rPr lang="en-NL" smtClean="0"/>
-              <a:t>02/10/2024</a:t>
+              <a:t>06/10/2024</a:t>
             </a:fld>
             <a:endParaRPr lang="en-NL"/>
           </a:p>
@@ -11069,7 +11069,7 @@
           <a:p>
             <a:r>
               <a:rPr lang="en-GB"/>
-              <a:t>V 1.6</a:t>
+              <a:t>V 1.7</a:t>
             </a:r>
             <a:endParaRPr lang="en-NL" dirty="0"/>
           </a:p>
@@ -14066,7 +14066,7 @@
           <a:p>
             <a:r>
               <a:rPr lang="en-GB"/>
-              <a:t>V 1.6</a:t>
+              <a:t>V 1.7</a:t>
             </a:r>
             <a:endParaRPr lang="en-NL" dirty="0"/>
           </a:p>
@@ -15626,7 +15626,7 @@
           <a:p>
             <a:r>
               <a:rPr lang="en-GB"/>
-              <a:t>V 1.6</a:t>
+              <a:t>V 1.7</a:t>
             </a:r>
             <a:endParaRPr lang="en-NL" dirty="0"/>
           </a:p>
@@ -16078,7 +16078,7 @@
           <a:p>
             <a:r>
               <a:rPr lang="en-GB"/>
-              <a:t>V 1.6</a:t>
+              <a:t>V 1.7</a:t>
             </a:r>
             <a:endParaRPr lang="en-NL" dirty="0"/>
           </a:p>
@@ -19758,7 +19758,7 @@
           <a:p>
             <a:r>
               <a:rPr lang="en-GB"/>
-              <a:t>V 1.6</a:t>
+              <a:t>V 1.7</a:t>
             </a:r>
             <a:endParaRPr lang="en-NL" dirty="0"/>
           </a:p>
@@ -21615,7 +21615,7 @@
                   </a:schemeClr>
                 </a:solidFill>
               </a:rPr>
-              <a:t>Macht : Prestatie : Hedonisme</a:t>
+              <a:t>Macht : Succes : Hedonisme</a:t>
             </a:r>
           </a:p>
           <a:p>
@@ -22463,7 +22463,7 @@
           <a:p>
             <a:r>
               <a:rPr lang="en-GB"/>
-              <a:t>V 1.6</a:t>
+              <a:t>V 1.7</a:t>
             </a:r>
             <a:endParaRPr lang="en-NL" dirty="0"/>
           </a:p>
@@ -22528,7 +22528,15 @@
           <a:p>
             <a:r>
               <a:rPr lang="en-NL" dirty="0"/>
-              <a:t>Bevat de waarden Prestatie en Macht, en deels Hedonisme.</a:t>
+              <a:t>Bevat de waarden </a:t>
+            </a:r>
+            <a:r>
+              <a:rPr lang="en-GB" dirty="0" err="1"/>
+              <a:t>Succes</a:t>
+            </a:r>
+            <a:r>
+              <a:rPr lang="en-NL" dirty="0"/>
+              <a:t> en Macht, en deels Hedonisme.</a:t>
             </a:r>
           </a:p>
           <a:p>
@@ -22852,9 +22860,10 @@
           <a:lstStyle/>
           <a:p>
             <a:r>
-              <a:rPr lang="en-NL" dirty="0"/>
-              <a:t>Prestatie</a:t>
-            </a:r>
+              <a:rPr lang="en-GB" dirty="0" err="1"/>
+              <a:t>Succes</a:t>
+            </a:r>
+            <a:endParaRPr lang="en-NL" dirty="0"/>
           </a:p>
         </p:txBody>
       </p:sp>
@@ -24697,7 +24706,7 @@
           <a:p>
             <a:r>
               <a:rPr lang="en-GB"/>
-              <a:t>V 1.6</a:t>
+              <a:t>V 1.7</a:t>
             </a:r>
             <a:endParaRPr lang="en-NL" dirty="0"/>
           </a:p>
@@ -25258,19 +25267,7 @@
               <a:rPr lang="en-NL" sz="2400" dirty="0">
                 <a:latin typeface="Ubuntu" panose="020B0504030602030204" pitchFamily="34" charset="0"/>
               </a:rPr>
-              <a:t>zijn eigenschappen die ontwikkeld kunnen worden, en wanneer ze worden ingezet over het algemeen positief worden beoordeeld. </a:t>
-            </a:r>
-            <a:r>
-              <a:rPr lang="en-NL" sz="2400">
-                <a:latin typeface="Ubuntu" panose="020B0504030602030204" pitchFamily="34" charset="0"/>
-              </a:rPr>
-              <a:t>De 23 </a:t>
-            </a:r>
-            <a:r>
-              <a:rPr lang="en-NL" sz="2400" dirty="0">
-                <a:latin typeface="Ubuntu" panose="020B0504030602030204" pitchFamily="34" charset="0"/>
-              </a:rPr>
-              <a:t>gebruikte competenties zijn cross-cultureel gevalideerd, dragen bij aan zingeving, hebben morele waarde en zijn meetbaar. Inzetten van deze competenties leidt over het algemeen tot positieve uitkomsten, zowel in prestaties, welbevinden als coping.</a:t>
+              <a:t>zijn eigenschappen die ontwikkeld kunnen worden, en wanneer ze worden ingezet over het algemeen positief worden beoordeeld. De 23 gebruikte competenties zijn cross-cultureel gevalideerd, dragen bij aan zingeving, hebben morele waarde en zijn meetbaar. Inzetten van deze competenties leidt over het algemeen tot positieve uitkomsten, zowel in prestaties, welbevinden als coping.</a:t>
             </a:r>
           </a:p>
         </p:txBody>

</xml_diff>